<commit_message>
add the experimental result
</commit_message>
<xml_diff>
--- a/PPT/End-to-End Training of Deep Visuomotor Policies.pptx
+++ b/PPT/End-to-End Training of Deep Visuomotor Policies.pptx
@@ -15,6 +15,8 @@
     <p:sldId id="263" r:id="rId9"/>
     <p:sldId id="264" r:id="rId10"/>
     <p:sldId id="265" r:id="rId11"/>
+    <p:sldId id="266" r:id="rId12"/>
+    <p:sldId id="267" r:id="rId13"/>
   </p:sldIdLst>
   <p:sldSz cx="12192000" cy="6858000"/>
   <p:notesSz cx="6858000" cy="9144000"/>
@@ -113,6 +115,11 @@
       </a:defRPr>
     </a:lvl9pPr>
   </p:defaultTextStyle>
+  <p:extLst>
+    <p:ext uri="{EFAFB233-063F-42B5-8137-9DF3F51BA10A}">
+      <p15:sldGuideLst xmlns:p15="http://schemas.microsoft.com/office/powerpoint/2012/main"/>
+    </p:ext>
+  </p:extLst>
 </p:presentation>
 </file>
 
@@ -3348,6 +3355,114 @@
 </p:sld>
 </file>
 
+<file path=ppt/slides/slide11.xml><?xml version="1.0" encoding="utf-8"?>
+<p:sld xmlns:a="http://schemas.openxmlformats.org/drawingml/2006/main" xmlns:r="http://schemas.openxmlformats.org/officeDocument/2006/relationships" xmlns:p="http://schemas.openxmlformats.org/presentationml/2006/main">
+  <p:cSld>
+    <p:spTree>
+      <p:nvGrpSpPr>
+        <p:cNvPr id="1" name=""/>
+        <p:cNvGrpSpPr/>
+        <p:nvPr/>
+      </p:nvGrpSpPr>
+      <p:grpSpPr>
+        <a:xfrm>
+          <a:off x="0" y="0"/>
+          <a:ext cx="0" cy="0"/>
+          <a:chOff x="0" y="0"/>
+          <a:chExt cx="0" cy="0"/>
+        </a:xfrm>
+      </p:grpSpPr>
+      <p:pic>
+        <p:nvPicPr>
+          <p:cNvPr id="4" name="图片 3"/>
+          <p:cNvPicPr>
+            <a:picLocks noChangeAspect="1"/>
+          </p:cNvPicPr>
+          <p:nvPr/>
+        </p:nvPicPr>
+        <p:blipFill>
+          <a:blip r:embed="rId2"/>
+          <a:stretch>
+            <a:fillRect/>
+          </a:stretch>
+        </p:blipFill>
+        <p:spPr>
+          <a:xfrm>
+            <a:off x="1324654" y="649176"/>
+            <a:ext cx="9476190" cy="5609524"/>
+          </a:xfrm>
+          <a:prstGeom prst="rect">
+            <a:avLst/>
+          </a:prstGeom>
+        </p:spPr>
+      </p:pic>
+    </p:spTree>
+    <p:extLst>
+      <p:ext uri="{BB962C8B-B14F-4D97-AF65-F5344CB8AC3E}">
+        <p14:creationId xmlns:p14="http://schemas.microsoft.com/office/powerpoint/2010/main" val="2710511602"/>
+      </p:ext>
+    </p:extLst>
+  </p:cSld>
+  <p:clrMapOvr>
+    <a:masterClrMapping/>
+  </p:clrMapOvr>
+</p:sld>
+</file>
+
+<file path=ppt/slides/slide12.xml><?xml version="1.0" encoding="utf-8"?>
+<p:sld xmlns:a="http://schemas.openxmlformats.org/drawingml/2006/main" xmlns:r="http://schemas.openxmlformats.org/officeDocument/2006/relationships" xmlns:p="http://schemas.openxmlformats.org/presentationml/2006/main">
+  <p:cSld>
+    <p:spTree>
+      <p:nvGrpSpPr>
+        <p:cNvPr id="1" name=""/>
+        <p:cNvGrpSpPr/>
+        <p:nvPr/>
+      </p:nvGrpSpPr>
+      <p:grpSpPr>
+        <a:xfrm>
+          <a:off x="0" y="0"/>
+          <a:ext cx="0" cy="0"/>
+          <a:chOff x="0" y="0"/>
+          <a:chExt cx="0" cy="0"/>
+        </a:xfrm>
+      </p:grpSpPr>
+      <p:pic>
+        <p:nvPicPr>
+          <p:cNvPr id="2" name="图片 1"/>
+          <p:cNvPicPr>
+            <a:picLocks noChangeAspect="1"/>
+          </p:cNvPicPr>
+          <p:nvPr/>
+        </p:nvPicPr>
+        <p:blipFill>
+          <a:blip r:embed="rId2"/>
+          <a:stretch>
+            <a:fillRect/>
+          </a:stretch>
+        </p:blipFill>
+        <p:spPr>
+          <a:xfrm>
+            <a:off x="1429333" y="781381"/>
+            <a:ext cx="9333333" cy="5295238"/>
+          </a:xfrm>
+          <a:prstGeom prst="rect">
+            <a:avLst/>
+          </a:prstGeom>
+        </p:spPr>
+      </p:pic>
+    </p:spTree>
+    <p:extLst>
+      <p:ext uri="{BB962C8B-B14F-4D97-AF65-F5344CB8AC3E}">
+        <p14:creationId xmlns:p14="http://schemas.microsoft.com/office/powerpoint/2010/main" val="4179404666"/>
+      </p:ext>
+    </p:extLst>
+  </p:cSld>
+  <p:clrMapOvr>
+    <a:masterClrMapping/>
+  </p:clrMapOvr>
+</p:sld>
+</file>
+
 <file path=ppt/slides/slide2.xml><?xml version="1.0" encoding="utf-8"?>
 <p:sld xmlns:a="http://schemas.openxmlformats.org/drawingml/2006/main" xmlns:r="http://schemas.openxmlformats.org/officeDocument/2006/relationships" xmlns:p="http://schemas.openxmlformats.org/presentationml/2006/main">
   <p:cSld>

</xml_diff>

<commit_message>
add the related work
</commit_message>
<xml_diff>
--- a/PPT/End-to-End Training of Deep Visuomotor Policies.pptx
+++ b/PPT/End-to-End Training of Deep Visuomotor Policies.pptx
@@ -6,17 +6,19 @@
   </p:sldMasterIdLst>
   <p:sldIdLst>
     <p:sldId id="256" r:id="rId2"/>
-    <p:sldId id="257" r:id="rId3"/>
-    <p:sldId id="259" r:id="rId4"/>
-    <p:sldId id="258" r:id="rId5"/>
-    <p:sldId id="260" r:id="rId6"/>
-    <p:sldId id="261" r:id="rId7"/>
-    <p:sldId id="262" r:id="rId8"/>
-    <p:sldId id="263" r:id="rId9"/>
-    <p:sldId id="264" r:id="rId10"/>
-    <p:sldId id="265" r:id="rId11"/>
-    <p:sldId id="266" r:id="rId12"/>
-    <p:sldId id="267" r:id="rId13"/>
+    <p:sldId id="268" r:id="rId3"/>
+    <p:sldId id="269" r:id="rId4"/>
+    <p:sldId id="257" r:id="rId5"/>
+    <p:sldId id="259" r:id="rId6"/>
+    <p:sldId id="258" r:id="rId7"/>
+    <p:sldId id="260" r:id="rId8"/>
+    <p:sldId id="261" r:id="rId9"/>
+    <p:sldId id="262" r:id="rId10"/>
+    <p:sldId id="263" r:id="rId11"/>
+    <p:sldId id="264" r:id="rId12"/>
+    <p:sldId id="265" r:id="rId13"/>
+    <p:sldId id="266" r:id="rId14"/>
+    <p:sldId id="267" r:id="rId15"/>
   </p:sldIdLst>
   <p:sldSz cx="12192000" cy="6858000"/>
   <p:notesSz cx="6858000" cy="9144000"/>
@@ -3039,12 +3041,8 @@
           </a:p>
           <a:p>
             <a:r>
-              <a:rPr lang="en-US" altLang="zh-CN" smtClean="0"/>
-              <a:t>                     Division </a:t>
-            </a:r>
-            <a:r>
               <a:rPr lang="en-US" altLang="zh-CN" dirty="0" smtClean="0"/>
-              <a:t>of Computer Science University of California Berkeley, CA 94720-1776, USA</a:t>
+              <a:t>                     Division of Computer Science University of California Berkeley, CA 94720-1776, USA</a:t>
             </a:r>
             <a:endParaRPr lang="zh-CN" altLang="en-US" dirty="0"/>
           </a:p>
@@ -3088,6 +3086,546 @@
 </file>
 
 <file path=ppt/slides/slide10.xml><?xml version="1.0" encoding="utf-8"?>
+<p:sld xmlns:a="http://schemas.openxmlformats.org/drawingml/2006/main" xmlns:r="http://schemas.openxmlformats.org/officeDocument/2006/relationships" xmlns:p="http://schemas.openxmlformats.org/presentationml/2006/main">
+  <p:cSld>
+    <p:spTree>
+      <p:nvGrpSpPr>
+        <p:cNvPr id="1" name=""/>
+        <p:cNvGrpSpPr/>
+        <p:nvPr/>
+      </p:nvGrpSpPr>
+      <p:grpSpPr>
+        <a:xfrm>
+          <a:off x="0" y="0"/>
+          <a:ext cx="0" cy="0"/>
+          <a:chOff x="0" y="0"/>
+          <a:chExt cx="0" cy="0"/>
+        </a:xfrm>
+      </p:grpSpPr>
+      <p:sp>
+        <p:nvSpPr>
+          <p:cNvPr id="4" name="文本框 3"/>
+          <p:cNvSpPr txBox="1"/>
+          <p:nvPr/>
+        </p:nvSpPr>
+        <p:spPr>
+          <a:xfrm>
+            <a:off x="897148" y="508959"/>
+            <a:ext cx="10705380" cy="830997"/>
+          </a:xfrm>
+          <a:prstGeom prst="rect">
+            <a:avLst/>
+          </a:prstGeom>
+          <a:noFill/>
+        </p:spPr>
+        <p:txBody>
+          <a:bodyPr wrap="square" rtlCol="0">
+            <a:spAutoFit/>
+          </a:bodyPr>
+          <a:lstStyle/>
+          <a:p>
+            <a:r>
+              <a:rPr lang="en-US" altLang="zh-CN" sz="2400" b="1" dirty="0" smtClean="0">
+                <a:latin typeface="Times New Roman" panose="02020603050405020304" pitchFamily="18" charset="0"/>
+                <a:cs typeface="Times New Roman" panose="02020603050405020304" pitchFamily="18" charset="0"/>
+              </a:rPr>
+              <a:t>Pre-training: </a:t>
+            </a:r>
+            <a:r>
+              <a:rPr lang="en-US" altLang="zh-CN" sz="2400" dirty="0">
+                <a:latin typeface="Times New Roman" panose="02020603050405020304" pitchFamily="18" charset="0"/>
+                <a:cs typeface="Times New Roman" panose="02020603050405020304" pitchFamily="18" charset="0"/>
+              </a:rPr>
+              <a:t>introduce a </a:t>
+            </a:r>
+            <a:r>
+              <a:rPr lang="en-US" altLang="zh-CN" sz="2400" dirty="0" smtClean="0">
+                <a:latin typeface="Times New Roman" panose="02020603050405020304" pitchFamily="18" charset="0"/>
+                <a:cs typeface="Times New Roman" panose="02020603050405020304" pitchFamily="18" charset="0"/>
+              </a:rPr>
+              <a:t>pretraining scheme </a:t>
+            </a:r>
+            <a:r>
+              <a:rPr lang="en-US" altLang="zh-CN" sz="2400" dirty="0">
+                <a:latin typeface="Times New Roman" panose="02020603050405020304" pitchFamily="18" charset="0"/>
+                <a:cs typeface="Times New Roman" panose="02020603050405020304" pitchFamily="18" charset="0"/>
+              </a:rPr>
+              <a:t>that allows </a:t>
+            </a:r>
+            <a:r>
+              <a:rPr lang="en-US" altLang="zh-CN" sz="2400" dirty="0" smtClean="0">
+                <a:latin typeface="Times New Roman" panose="02020603050405020304" pitchFamily="18" charset="0"/>
+                <a:cs typeface="Times New Roman" panose="02020603050405020304" pitchFamily="18" charset="0"/>
+              </a:rPr>
+              <a:t>to </a:t>
+            </a:r>
+            <a:r>
+              <a:rPr lang="en-US" altLang="zh-CN" sz="2400" dirty="0">
+                <a:latin typeface="Times New Roman" panose="02020603050405020304" pitchFamily="18" charset="0"/>
+                <a:cs typeface="Times New Roman" panose="02020603050405020304" pitchFamily="18" charset="0"/>
+              </a:rPr>
+              <a:t>train effective policies </a:t>
+            </a:r>
+            <a:r>
+              <a:rPr lang="en-US" altLang="zh-CN" sz="2400" dirty="0" smtClean="0">
+                <a:latin typeface="Times New Roman" panose="02020603050405020304" pitchFamily="18" charset="0"/>
+                <a:cs typeface="Times New Roman" panose="02020603050405020304" pitchFamily="18" charset="0"/>
+              </a:rPr>
+              <a:t>with a </a:t>
+            </a:r>
+            <a:r>
+              <a:rPr lang="en-US" altLang="zh-CN" sz="2400" dirty="0">
+                <a:latin typeface="Times New Roman" panose="02020603050405020304" pitchFamily="18" charset="0"/>
+                <a:cs typeface="Times New Roman" panose="02020603050405020304" pitchFamily="18" charset="0"/>
+              </a:rPr>
+              <a:t>relatively small number of iterations</a:t>
+            </a:r>
+            <a:r>
+              <a:rPr lang="en-US" altLang="zh-CN" sz="2400" dirty="0" smtClean="0">
+                <a:latin typeface="Times New Roman" panose="02020603050405020304" pitchFamily="18" charset="0"/>
+                <a:cs typeface="Times New Roman" panose="02020603050405020304" pitchFamily="18" charset="0"/>
+              </a:rPr>
+              <a:t> </a:t>
+            </a:r>
+            <a:endParaRPr lang="zh-CN" altLang="en-US" sz="2400" b="1" dirty="0">
+              <a:latin typeface="Times New Roman" panose="02020603050405020304" pitchFamily="18" charset="0"/>
+              <a:cs typeface="Times New Roman" panose="02020603050405020304" pitchFamily="18" charset="0"/>
+            </a:endParaRPr>
+          </a:p>
+        </p:txBody>
+      </p:sp>
+      <p:pic>
+        <p:nvPicPr>
+          <p:cNvPr id="5" name="图片 4"/>
+          <p:cNvPicPr>
+            <a:picLocks noChangeAspect="1"/>
+          </p:cNvPicPr>
+          <p:nvPr/>
+        </p:nvPicPr>
+        <p:blipFill>
+          <a:blip r:embed="rId2"/>
+          <a:stretch>
+            <a:fillRect/>
+          </a:stretch>
+        </p:blipFill>
+        <p:spPr>
+          <a:xfrm>
+            <a:off x="718729" y="1607318"/>
+            <a:ext cx="3542857" cy="4609524"/>
+          </a:xfrm>
+          <a:prstGeom prst="rect">
+            <a:avLst/>
+          </a:prstGeom>
+        </p:spPr>
+      </p:pic>
+      <p:sp>
+        <p:nvSpPr>
+          <p:cNvPr id="6" name="文本框 5"/>
+          <p:cNvSpPr txBox="1"/>
+          <p:nvPr/>
+        </p:nvSpPr>
+        <p:spPr>
+          <a:xfrm>
+            <a:off x="5080959" y="1607318"/>
+            <a:ext cx="6323162" cy="4401205"/>
+          </a:xfrm>
+          <a:prstGeom prst="rect">
+            <a:avLst/>
+          </a:prstGeom>
+          <a:noFill/>
+        </p:spPr>
+        <p:txBody>
+          <a:bodyPr wrap="square" rtlCol="0">
+            <a:spAutoFit/>
+          </a:bodyPr>
+          <a:lstStyle/>
+          <a:p>
+            <a:r>
+              <a:rPr lang="en-US" altLang="zh-CN" sz="2000" b="1" dirty="0" smtClean="0">
+                <a:latin typeface="Times New Roman" panose="02020603050405020304" pitchFamily="18" charset="0"/>
+                <a:cs typeface="Times New Roman" panose="02020603050405020304" pitchFamily="18" charset="0"/>
+              </a:rPr>
+              <a:t>1. Initial visual features:</a:t>
+            </a:r>
+          </a:p>
+          <a:p>
+            <a:r>
+              <a:rPr lang="en-US" altLang="zh-CN" sz="2000" dirty="0">
+                <a:latin typeface="Times New Roman" panose="02020603050405020304" pitchFamily="18" charset="0"/>
+                <a:cs typeface="Times New Roman" panose="02020603050405020304" pitchFamily="18" charset="0"/>
+              </a:rPr>
+              <a:t> </a:t>
+            </a:r>
+            <a:r>
+              <a:rPr lang="en-US" altLang="zh-CN" sz="2000" dirty="0" smtClean="0">
+                <a:latin typeface="Times New Roman" panose="02020603050405020304" pitchFamily="18" charset="0"/>
+                <a:cs typeface="Times New Roman" panose="02020603050405020304" pitchFamily="18" charset="0"/>
+              </a:rPr>
+              <a:t>          pretrain the convolutional layers of our network by  </a:t>
+            </a:r>
+          </a:p>
+          <a:p>
+            <a:r>
+              <a:rPr lang="en-US" altLang="zh-CN" sz="2000" dirty="0" smtClean="0">
+                <a:latin typeface="Times New Roman" panose="02020603050405020304" pitchFamily="18" charset="0"/>
+                <a:cs typeface="Times New Roman" panose="02020603050405020304" pitchFamily="18" charset="0"/>
+              </a:rPr>
+              <a:t>       predicting elements of xt that are not provided in the </a:t>
+            </a:r>
+          </a:p>
+          <a:p>
+            <a:r>
+              <a:rPr lang="en-US" altLang="zh-CN" sz="2000" dirty="0" smtClean="0">
+                <a:latin typeface="Times New Roman" panose="02020603050405020304" pitchFamily="18" charset="0"/>
+                <a:cs typeface="Times New Roman" panose="02020603050405020304" pitchFamily="18" charset="0"/>
+              </a:rPr>
+              <a:t>       observation ot, such as the positions of objects in the  </a:t>
+            </a:r>
+          </a:p>
+          <a:p>
+            <a:r>
+              <a:rPr lang="en-US" altLang="zh-CN" sz="2000" dirty="0" smtClean="0">
+                <a:latin typeface="Times New Roman" panose="02020603050405020304" pitchFamily="18" charset="0"/>
+                <a:cs typeface="Times New Roman" panose="02020603050405020304" pitchFamily="18" charset="0"/>
+              </a:rPr>
+              <a:t>       scene.</a:t>
+            </a:r>
+          </a:p>
+          <a:p>
+            <a:r>
+              <a:rPr lang="en-US" altLang="zh-CN" sz="2000" dirty="0">
+                <a:latin typeface="Times New Roman" panose="02020603050405020304" pitchFamily="18" charset="0"/>
+                <a:cs typeface="Times New Roman" panose="02020603050405020304" pitchFamily="18" charset="0"/>
+              </a:rPr>
+              <a:t> </a:t>
+            </a:r>
+            <a:r>
+              <a:rPr lang="en-US" altLang="zh-CN" sz="2000" dirty="0" smtClean="0">
+                <a:latin typeface="Times New Roman" panose="02020603050405020304" pitchFamily="18" charset="0"/>
+                <a:cs typeface="Times New Roman" panose="02020603050405020304" pitchFamily="18" charset="0"/>
+              </a:rPr>
+              <a:t>          </a:t>
+            </a:r>
+            <a:r>
+              <a:rPr lang="en-US" altLang="zh-CN" sz="2000" dirty="0">
+                <a:latin typeface="Times New Roman" panose="02020603050405020304" pitchFamily="18" charset="0"/>
+                <a:cs typeface="Times New Roman" panose="02020603050405020304" pitchFamily="18" charset="0"/>
+              </a:rPr>
+              <a:t>initialize the first layer filters from the model </a:t>
+            </a:r>
+            <a:r>
+              <a:rPr lang="en-US" altLang="zh-CN" sz="2000" dirty="0" smtClean="0">
+                <a:latin typeface="Times New Roman" panose="02020603050405020304" pitchFamily="18" charset="0"/>
+                <a:cs typeface="Times New Roman" panose="02020603050405020304" pitchFamily="18" charset="0"/>
+              </a:rPr>
+              <a:t>of </a:t>
+            </a:r>
+          </a:p>
+          <a:p>
+            <a:r>
+              <a:rPr lang="en-US" altLang="zh-CN" sz="2000" dirty="0" smtClean="0">
+                <a:latin typeface="Times New Roman" panose="02020603050405020304" pitchFamily="18" charset="0"/>
+                <a:cs typeface="Times New Roman" panose="02020603050405020304" pitchFamily="18" charset="0"/>
+              </a:rPr>
+              <a:t>       Szegedy et </a:t>
+            </a:r>
+            <a:r>
+              <a:rPr lang="en-US" altLang="zh-CN" sz="2000" dirty="0">
+                <a:latin typeface="Times New Roman" panose="02020603050405020304" pitchFamily="18" charset="0"/>
+                <a:cs typeface="Times New Roman" panose="02020603050405020304" pitchFamily="18" charset="0"/>
+              </a:rPr>
+              <a:t>al. (2014), which is trained on ImageNet </a:t>
+            </a:r>
+            <a:endParaRPr lang="en-US" altLang="zh-CN" sz="2000" dirty="0" smtClean="0">
+              <a:latin typeface="Times New Roman" panose="02020603050405020304" pitchFamily="18" charset="0"/>
+              <a:cs typeface="Times New Roman" panose="02020603050405020304" pitchFamily="18" charset="0"/>
+            </a:endParaRPr>
+          </a:p>
+          <a:p>
+            <a:r>
+              <a:rPr lang="en-US" altLang="zh-CN" sz="2000" dirty="0" smtClean="0">
+                <a:latin typeface="Times New Roman" panose="02020603050405020304" pitchFamily="18" charset="0"/>
+                <a:cs typeface="Times New Roman" panose="02020603050405020304" pitchFamily="18" charset="0"/>
+              </a:rPr>
+              <a:t>       (</a:t>
+            </a:r>
+            <a:r>
+              <a:rPr lang="en-US" altLang="zh-CN" sz="2000" dirty="0">
+                <a:latin typeface="Times New Roman" panose="02020603050405020304" pitchFamily="18" charset="0"/>
+                <a:cs typeface="Times New Roman" panose="02020603050405020304" pitchFamily="18" charset="0"/>
+              </a:rPr>
+              <a:t>Deng et </a:t>
+            </a:r>
+            <a:r>
+              <a:rPr lang="en-US" altLang="zh-CN" sz="2000" dirty="0" smtClean="0">
+                <a:latin typeface="Times New Roman" panose="02020603050405020304" pitchFamily="18" charset="0"/>
+                <a:cs typeface="Times New Roman" panose="02020603050405020304" pitchFamily="18" charset="0"/>
+              </a:rPr>
+              <a:t>al., 2009</a:t>
+            </a:r>
+            <a:r>
+              <a:rPr lang="en-US" altLang="zh-CN" sz="2000" dirty="0">
+                <a:latin typeface="Times New Roman" panose="02020603050405020304" pitchFamily="18" charset="0"/>
+                <a:cs typeface="Times New Roman" panose="02020603050405020304" pitchFamily="18" charset="0"/>
+              </a:rPr>
+              <a:t>) classification.</a:t>
+            </a:r>
+            <a:r>
+              <a:rPr lang="en-US" altLang="zh-CN" sz="2000" dirty="0" smtClean="0">
+                <a:latin typeface="Times New Roman" panose="02020603050405020304" pitchFamily="18" charset="0"/>
+                <a:cs typeface="Times New Roman" panose="02020603050405020304" pitchFamily="18" charset="0"/>
+              </a:rPr>
+              <a:t> </a:t>
+            </a:r>
+          </a:p>
+          <a:p>
+            <a:r>
+              <a:rPr lang="en-US" altLang="zh-CN" sz="2000" b="1" dirty="0" smtClean="0">
+                <a:latin typeface="Times New Roman" panose="02020603050405020304" pitchFamily="18" charset="0"/>
+                <a:cs typeface="Times New Roman" panose="02020603050405020304" pitchFamily="18" charset="0"/>
+              </a:rPr>
+              <a:t>2. Initial controllers</a:t>
+            </a:r>
+          </a:p>
+          <a:p>
+            <a:r>
+              <a:rPr lang="en-US" altLang="zh-CN" sz="2000" b="1" dirty="0">
+                <a:latin typeface="Times New Roman" panose="02020603050405020304" pitchFamily="18" charset="0"/>
+                <a:cs typeface="Times New Roman" panose="02020603050405020304" pitchFamily="18" charset="0"/>
+              </a:rPr>
+              <a:t> </a:t>
+            </a:r>
+            <a:r>
+              <a:rPr lang="en-US" altLang="zh-CN" sz="2000" b="1" dirty="0" smtClean="0">
+                <a:latin typeface="Times New Roman" panose="02020603050405020304" pitchFamily="18" charset="0"/>
+                <a:cs typeface="Times New Roman" panose="02020603050405020304" pitchFamily="18" charset="0"/>
+              </a:rPr>
+              <a:t>          </a:t>
+            </a:r>
+            <a:r>
+              <a:rPr lang="en-US" altLang="zh-CN" sz="2000" dirty="0" smtClean="0">
+                <a:latin typeface="Times New Roman" panose="02020603050405020304" pitchFamily="18" charset="0"/>
+                <a:cs typeface="Times New Roman" panose="02020603050405020304" pitchFamily="18" charset="0"/>
+              </a:rPr>
+              <a:t>initially train the guiding trajectory distributions </a:t>
+            </a:r>
+          </a:p>
+          <a:p>
+            <a:r>
+              <a:rPr lang="en-US" altLang="zh-CN" sz="2000" dirty="0" smtClean="0">
+                <a:latin typeface="Times New Roman" panose="02020603050405020304" pitchFamily="18" charset="0"/>
+                <a:cs typeface="Times New Roman" panose="02020603050405020304" pitchFamily="18" charset="0"/>
+              </a:rPr>
+              <a:t>       pi(ut|xt) independently of the convolutional network </a:t>
+            </a:r>
+          </a:p>
+          <a:p>
+            <a:r>
+              <a:rPr lang="en-US" altLang="zh-CN" sz="2000" dirty="0" smtClean="0">
+                <a:latin typeface="Times New Roman" panose="02020603050405020304" pitchFamily="18" charset="0"/>
+                <a:cs typeface="Times New Roman" panose="02020603050405020304" pitchFamily="18" charset="0"/>
+              </a:rPr>
+              <a:t>       until the trajectories achieve a basic level of    </a:t>
+            </a:r>
+          </a:p>
+          <a:p>
+            <a:r>
+              <a:rPr lang="en-US" altLang="zh-CN" sz="2000" dirty="0" smtClean="0">
+                <a:latin typeface="Times New Roman" panose="02020603050405020304" pitchFamily="18" charset="0"/>
+                <a:cs typeface="Times New Roman" panose="02020603050405020304" pitchFamily="18" charset="0"/>
+              </a:rPr>
+              <a:t>       competence at the task, and then switch to full guided </a:t>
+            </a:r>
+          </a:p>
+          <a:p>
+            <a:r>
+              <a:rPr lang="en-US" altLang="zh-CN" sz="2000" dirty="0" smtClean="0">
+                <a:latin typeface="Times New Roman" panose="02020603050405020304" pitchFamily="18" charset="0"/>
+                <a:cs typeface="Times New Roman" panose="02020603050405020304" pitchFamily="18" charset="0"/>
+              </a:rPr>
+              <a:t>       policy search with end-to-end training of πθ(ut|ot)</a:t>
+            </a:r>
+          </a:p>
+        </p:txBody>
+      </p:sp>
+    </p:spTree>
+    <p:extLst>
+      <p:ext uri="{BB962C8B-B14F-4D97-AF65-F5344CB8AC3E}">
+        <p14:creationId xmlns:p14="http://schemas.microsoft.com/office/powerpoint/2010/main" val="149065458"/>
+      </p:ext>
+    </p:extLst>
+  </p:cSld>
+  <p:clrMapOvr>
+    <a:masterClrMapping/>
+  </p:clrMapOvr>
+  <p:timing>
+    <p:tnLst>
+      <p:par>
+        <p:cTn id="1" dur="indefinite" restart="never" nodeType="tmRoot"/>
+      </p:par>
+    </p:tnLst>
+  </p:timing>
+</p:sld>
+</file>
+
+<file path=ppt/slides/slide11.xml><?xml version="1.0" encoding="utf-8"?>
+<p:sld xmlns:a="http://schemas.openxmlformats.org/drawingml/2006/main" xmlns:r="http://schemas.openxmlformats.org/officeDocument/2006/relationships" xmlns:p="http://schemas.openxmlformats.org/presentationml/2006/main">
+  <p:cSld>
+    <p:spTree>
+      <p:nvGrpSpPr>
+        <p:cNvPr id="1" name=""/>
+        <p:cNvGrpSpPr/>
+        <p:nvPr/>
+      </p:nvGrpSpPr>
+      <p:grpSpPr>
+        <a:xfrm>
+          <a:off x="0" y="0"/>
+          <a:ext cx="0" cy="0"/>
+          <a:chOff x="0" y="0"/>
+          <a:chExt cx="0" cy="0"/>
+        </a:xfrm>
+      </p:grpSpPr>
+      <p:pic>
+        <p:nvPicPr>
+          <p:cNvPr id="4" name="图片 3"/>
+          <p:cNvPicPr>
+            <a:picLocks noChangeAspect="1"/>
+          </p:cNvPicPr>
+          <p:nvPr/>
+        </p:nvPicPr>
+        <p:blipFill>
+          <a:blip r:embed="rId2"/>
+          <a:stretch>
+            <a:fillRect/>
+          </a:stretch>
+        </p:blipFill>
+        <p:spPr>
+          <a:xfrm>
+            <a:off x="4314676" y="1180301"/>
+            <a:ext cx="3388399" cy="3924693"/>
+          </a:xfrm>
+          <a:prstGeom prst="rect">
+            <a:avLst/>
+          </a:prstGeom>
+        </p:spPr>
+      </p:pic>
+      <p:sp>
+        <p:nvSpPr>
+          <p:cNvPr id="5" name="文本框 4"/>
+          <p:cNvSpPr txBox="1"/>
+          <p:nvPr/>
+        </p:nvSpPr>
+        <p:spPr>
+          <a:xfrm>
+            <a:off x="1121433" y="621102"/>
+            <a:ext cx="9946257" cy="461665"/>
+          </a:xfrm>
+          <a:prstGeom prst="rect">
+            <a:avLst/>
+          </a:prstGeom>
+          <a:noFill/>
+        </p:spPr>
+        <p:txBody>
+          <a:bodyPr wrap="square" rtlCol="0">
+            <a:spAutoFit/>
+          </a:bodyPr>
+          <a:lstStyle/>
+          <a:p>
+            <a:r>
+              <a:rPr lang="en-US" altLang="zh-CN" sz="2400" b="1" dirty="0" smtClean="0">
+                <a:latin typeface="Times New Roman" panose="02020603050405020304" pitchFamily="18" charset="0"/>
+                <a:cs typeface="Times New Roman" panose="02020603050405020304" pitchFamily="18" charset="0"/>
+              </a:rPr>
+              <a:t>The whole alogrithm:</a:t>
+            </a:r>
+            <a:endParaRPr lang="zh-CN" altLang="en-US" sz="2400" b="1" dirty="0">
+              <a:latin typeface="Times New Roman" panose="02020603050405020304" pitchFamily="18" charset="0"/>
+              <a:cs typeface="Times New Roman" panose="02020603050405020304" pitchFamily="18" charset="0"/>
+            </a:endParaRPr>
+          </a:p>
+        </p:txBody>
+      </p:sp>
+      <p:sp>
+        <p:nvSpPr>
+          <p:cNvPr id="6" name="文本框 5"/>
+          <p:cNvSpPr txBox="1"/>
+          <p:nvPr/>
+        </p:nvSpPr>
+        <p:spPr>
+          <a:xfrm>
+            <a:off x="955964" y="5685905"/>
+            <a:ext cx="9867207" cy="400110"/>
+          </a:xfrm>
+          <a:prstGeom prst="rect">
+            <a:avLst/>
+          </a:prstGeom>
+          <a:noFill/>
+        </p:spPr>
+        <p:txBody>
+          <a:bodyPr wrap="square" rtlCol="0">
+            <a:spAutoFit/>
+          </a:bodyPr>
+          <a:lstStyle/>
+          <a:p>
+            <a:r>
+              <a:rPr lang="en-US" altLang="zh-CN" sz="2000" dirty="0" smtClean="0">
+                <a:latin typeface="Times New Roman" panose="02020603050405020304" pitchFamily="18" charset="0"/>
+                <a:cs typeface="Times New Roman" panose="02020603050405020304" pitchFamily="18" charset="0"/>
+              </a:rPr>
+              <a:t>                        supplementary video: </a:t>
+            </a:r>
+            <a:r>
+              <a:rPr lang="en-US" altLang="zh-CN" sz="2000" dirty="0" smtClean="0">
+                <a:latin typeface="Times New Roman" panose="02020603050405020304" pitchFamily="18" charset="0"/>
+                <a:cs typeface="Times New Roman" panose="02020603050405020304" pitchFamily="18" charset="0"/>
+                <a:hlinkClick r:id="rId3"/>
+              </a:rPr>
+              <a:t>http</a:t>
+            </a:r>
+            <a:r>
+              <a:rPr lang="en-US" altLang="zh-CN" sz="2000" dirty="0">
+                <a:latin typeface="Times New Roman" panose="02020603050405020304" pitchFamily="18" charset="0"/>
+                <a:cs typeface="Times New Roman" panose="02020603050405020304" pitchFamily="18" charset="0"/>
+                <a:hlinkClick r:id="rId3"/>
+              </a:rPr>
+              <a:t>://sites.google.com/site/visuomotorpolicy</a:t>
+            </a:r>
+            <a:r>
+              <a:rPr lang="en-US" altLang="zh-CN" sz="2000" dirty="0" smtClean="0">
+                <a:latin typeface="Times New Roman" panose="02020603050405020304" pitchFamily="18" charset="0"/>
+                <a:cs typeface="Times New Roman" panose="02020603050405020304" pitchFamily="18" charset="0"/>
+                <a:hlinkClick r:id="rId3"/>
+              </a:rPr>
+              <a:t> </a:t>
+            </a:r>
+            <a:endParaRPr lang="zh-CN" altLang="en-US" sz="2000" dirty="0">
+              <a:latin typeface="Times New Roman" panose="02020603050405020304" pitchFamily="18" charset="0"/>
+              <a:cs typeface="Times New Roman" panose="02020603050405020304" pitchFamily="18" charset="0"/>
+            </a:endParaRPr>
+          </a:p>
+        </p:txBody>
+      </p:sp>
+    </p:spTree>
+    <p:extLst>
+      <p:ext uri="{BB962C8B-B14F-4D97-AF65-F5344CB8AC3E}">
+        <p14:creationId xmlns:p14="http://schemas.microsoft.com/office/powerpoint/2010/main" val="1757077222"/>
+      </p:ext>
+    </p:extLst>
+  </p:cSld>
+  <p:clrMapOvr>
+    <a:masterClrMapping/>
+  </p:clrMapOvr>
+  <p:timing>
+    <p:tnLst>
+      <p:par>
+        <p:cTn id="1" dur="indefinite" restart="never" nodeType="tmRoot"/>
+      </p:par>
+    </p:tnLst>
+  </p:timing>
+</p:sld>
+</file>
+
+<file path=ppt/slides/slide12.xml><?xml version="1.0" encoding="utf-8"?>
 <p:sld xmlns:a="http://schemas.openxmlformats.org/drawingml/2006/main" xmlns:r="http://schemas.openxmlformats.org/officeDocument/2006/relationships" xmlns:p="http://schemas.openxmlformats.org/presentationml/2006/main">
   <p:cSld>
     <p:spTree>
@@ -3355,7 +3893,7 @@
 </p:sld>
 </file>
 
-<file path=ppt/slides/slide11.xml><?xml version="1.0" encoding="utf-8"?>
+<file path=ppt/slides/slide13.xml><?xml version="1.0" encoding="utf-8"?>
 <p:sld xmlns:a="http://schemas.openxmlformats.org/drawingml/2006/main" xmlns:r="http://schemas.openxmlformats.org/officeDocument/2006/relationships" xmlns:p="http://schemas.openxmlformats.org/presentationml/2006/main">
   <p:cSld>
     <p:spTree>
@@ -3409,7 +3947,7 @@
 </p:sld>
 </file>
 
-<file path=ppt/slides/slide12.xml><?xml version="1.0" encoding="utf-8"?>
+<file path=ppt/slides/slide14.xml><?xml version="1.0" encoding="utf-8"?>
 <p:sld xmlns:a="http://schemas.openxmlformats.org/drawingml/2006/main" xmlns:r="http://schemas.openxmlformats.org/officeDocument/2006/relationships" xmlns:p="http://schemas.openxmlformats.org/presentationml/2006/main">
   <p:cSld>
     <p:spTree>
@@ -3482,6 +4020,756 @@
       </p:grpSpPr>
       <p:sp>
         <p:nvSpPr>
+          <p:cNvPr id="5" name="文本框 4"/>
+          <p:cNvSpPr txBox="1"/>
+          <p:nvPr/>
+        </p:nvSpPr>
+        <p:spPr>
+          <a:xfrm>
+            <a:off x="731519" y="532012"/>
+            <a:ext cx="10881360" cy="5386090"/>
+          </a:xfrm>
+          <a:prstGeom prst="rect">
+            <a:avLst/>
+          </a:prstGeom>
+          <a:noFill/>
+        </p:spPr>
+        <p:txBody>
+          <a:bodyPr wrap="square" rtlCol="0">
+            <a:spAutoFit/>
+          </a:bodyPr>
+          <a:lstStyle/>
+          <a:p>
+            <a:r>
+              <a:rPr lang="en-US" altLang="zh-CN" sz="2400" b="1" dirty="0" smtClean="0">
+                <a:latin typeface="Times New Roman" panose="02020603050405020304" pitchFamily="18" charset="0"/>
+                <a:cs typeface="Times New Roman" panose="02020603050405020304" pitchFamily="18" charset="0"/>
+              </a:rPr>
+              <a:t>The related works of </a:t>
+            </a:r>
+            <a:r>
+              <a:rPr lang="en-US" altLang="zh-CN" sz="2400" b="1" dirty="0">
+                <a:latin typeface="Times New Roman" panose="02020603050405020304" pitchFamily="18" charset="0"/>
+                <a:cs typeface="Times New Roman" panose="02020603050405020304" pitchFamily="18" charset="0"/>
+              </a:rPr>
+              <a:t>Sergey Leviney</a:t>
+            </a:r>
+            <a:r>
+              <a:rPr lang="en-US" altLang="zh-CN" sz="2400" b="1" dirty="0" smtClean="0">
+                <a:latin typeface="Times New Roman" panose="02020603050405020304" pitchFamily="18" charset="0"/>
+                <a:cs typeface="Times New Roman" panose="02020603050405020304" pitchFamily="18" charset="0"/>
+              </a:rPr>
+              <a:t> </a:t>
+            </a:r>
+            <a:r>
+              <a:rPr lang="en-US" altLang="zh-CN" sz="2400" dirty="0" smtClean="0">
+                <a:latin typeface="Times New Roman" panose="02020603050405020304" pitchFamily="18" charset="0"/>
+                <a:cs typeface="Times New Roman" panose="02020603050405020304" pitchFamily="18" charset="0"/>
+              </a:rPr>
+              <a:t>:</a:t>
+            </a:r>
+          </a:p>
+          <a:p>
+            <a:endParaRPr lang="en-US" altLang="zh-CN" sz="2000" dirty="0">
+              <a:latin typeface="Times New Roman" panose="02020603050405020304" pitchFamily="18" charset="0"/>
+              <a:cs typeface="Times New Roman" panose="02020603050405020304" pitchFamily="18" charset="0"/>
+            </a:endParaRPr>
+          </a:p>
+          <a:p>
+            <a:pPr marL="457200" indent="-457200">
+              <a:buAutoNum type="arabicPeriod"/>
+            </a:pPr>
+            <a:r>
+              <a:rPr lang="en-US" altLang="zh-CN" sz="2000" b="1" dirty="0" smtClean="0"/>
+              <a:t>S</a:t>
+            </a:r>
+            <a:r>
+              <a:rPr lang="en-US" altLang="zh-CN" sz="2000" b="1" dirty="0"/>
+              <a:t>. Levine </a:t>
+            </a:r>
+            <a:r>
+              <a:rPr lang="en-US" altLang="zh-CN" sz="2000" dirty="0"/>
+              <a:t>and V. Koltun. </a:t>
+            </a:r>
+            <a:r>
+              <a:rPr lang="en-US" altLang="zh-CN" sz="2000" b="1" dirty="0"/>
+              <a:t>Guided policy search</a:t>
+            </a:r>
+            <a:r>
+              <a:rPr lang="en-US" altLang="zh-CN" sz="2000" dirty="0"/>
+              <a:t>. In </a:t>
+            </a:r>
+            <a:r>
+              <a:rPr lang="en-US" altLang="zh-CN" sz="2000" i="1" dirty="0"/>
+              <a:t>International Conference on </a:t>
+            </a:r>
+            <a:r>
+              <a:rPr lang="en-US" altLang="zh-CN" sz="2000" i="1" dirty="0" smtClean="0"/>
+              <a:t>Machine Learning </a:t>
+            </a:r>
+            <a:r>
+              <a:rPr lang="en-US" altLang="zh-CN" sz="2000" i="1" dirty="0"/>
+              <a:t>(</a:t>
+            </a:r>
+            <a:r>
+              <a:rPr lang="en-US" altLang="zh-CN" sz="2000" b="1" i="1" dirty="0"/>
+              <a:t>ICML</a:t>
+            </a:r>
+            <a:r>
+              <a:rPr lang="en-US" altLang="zh-CN" sz="2000" i="1" dirty="0"/>
+              <a:t>)</a:t>
+            </a:r>
+            <a:r>
+              <a:rPr lang="en-US" altLang="zh-CN" sz="2000" dirty="0"/>
+              <a:t>, 2013a.</a:t>
+            </a:r>
+            <a:r>
+              <a:rPr lang="en-US" altLang="zh-CN" sz="2000" dirty="0"/>
+              <a:t> </a:t>
+            </a:r>
+            <a:r>
+              <a:rPr lang="en-US" altLang="zh-CN" sz="2000" dirty="0" smtClean="0"/>
+              <a:t>       </a:t>
+            </a:r>
+            <a:r>
+              <a:rPr lang="en-US" altLang="zh-CN" sz="2000" dirty="0">
+                <a:latin typeface="Times New Roman" panose="02020603050405020304" pitchFamily="18" charset="0"/>
+                <a:cs typeface="Times New Roman" panose="02020603050405020304" pitchFamily="18" charset="0"/>
+              </a:rPr>
+              <a:t/>
+            </a:r>
+            <a:br>
+              <a:rPr lang="en-US" altLang="zh-CN" sz="2000" dirty="0">
+                <a:latin typeface="Times New Roman" panose="02020603050405020304" pitchFamily="18" charset="0"/>
+                <a:cs typeface="Times New Roman" panose="02020603050405020304" pitchFamily="18" charset="0"/>
+              </a:rPr>
+            </a:br>
+            <a:endParaRPr lang="en-US" altLang="zh-CN" sz="2000" dirty="0" smtClean="0">
+              <a:latin typeface="Times New Roman" panose="02020603050405020304" pitchFamily="18" charset="0"/>
+              <a:cs typeface="Times New Roman" panose="02020603050405020304" pitchFamily="18" charset="0"/>
+            </a:endParaRPr>
+          </a:p>
+          <a:p>
+            <a:pPr marL="457200" indent="-457200">
+              <a:buAutoNum type="arabicPeriod" startAt="2"/>
+            </a:pPr>
+            <a:r>
+              <a:rPr lang="en-US" altLang="zh-CN" sz="2000" b="1" dirty="0" smtClean="0"/>
+              <a:t>S</a:t>
+            </a:r>
+            <a:r>
+              <a:rPr lang="en-US" altLang="zh-CN" sz="2000" b="1" dirty="0"/>
+              <a:t>. Levine </a:t>
+            </a:r>
+            <a:r>
+              <a:rPr lang="en-US" altLang="zh-CN" sz="2000" dirty="0"/>
+              <a:t>and V. Koltun. </a:t>
+            </a:r>
+            <a:r>
+              <a:rPr lang="en-US" altLang="zh-CN" sz="2000" b="1" dirty="0"/>
+              <a:t>Variational policy search via trajectory optimization</a:t>
+            </a:r>
+            <a:r>
+              <a:rPr lang="en-US" altLang="zh-CN" sz="2000" dirty="0"/>
+              <a:t>. In </a:t>
+            </a:r>
+            <a:r>
+              <a:rPr lang="en-US" altLang="zh-CN" sz="2000" i="1" dirty="0" smtClean="0"/>
+              <a:t>Advances in </a:t>
+            </a:r>
+            <a:r>
+              <a:rPr lang="en-US" altLang="zh-CN" sz="2000" i="1" dirty="0"/>
+              <a:t>Neural Information Processing Systems (</a:t>
+            </a:r>
+            <a:r>
+              <a:rPr lang="en-US" altLang="zh-CN" sz="2000" b="1" i="1" dirty="0"/>
+              <a:t>NIPS</a:t>
+            </a:r>
+            <a:r>
+              <a:rPr lang="en-US" altLang="zh-CN" sz="2000" i="1" dirty="0"/>
+              <a:t>)</a:t>
+            </a:r>
+            <a:r>
+              <a:rPr lang="en-US" altLang="zh-CN" sz="2000" dirty="0"/>
+              <a:t>, 2013b.</a:t>
+            </a:r>
+            <a:r>
+              <a:rPr lang="en-US" altLang="zh-CN" sz="2000" dirty="0"/>
+              <a:t> </a:t>
+            </a:r>
+            <a:r>
+              <a:rPr lang="en-US" altLang="zh-CN" sz="2000" dirty="0" smtClean="0"/>
+              <a:t>      </a:t>
+            </a:r>
+            <a:r>
+              <a:rPr lang="en-US" altLang="zh-CN" sz="2000" dirty="0"/>
+              <a:t/>
+            </a:r>
+            <a:br>
+              <a:rPr lang="en-US" altLang="zh-CN" sz="2000" dirty="0"/>
+            </a:br>
+            <a:endParaRPr lang="en-US" altLang="zh-CN" sz="2000" dirty="0" smtClean="0"/>
+          </a:p>
+          <a:p>
+            <a:r>
+              <a:rPr lang="en-US" altLang="zh-CN" sz="2000" b="1" dirty="0" smtClean="0"/>
+              <a:t>3.    S</a:t>
+            </a:r>
+            <a:r>
+              <a:rPr lang="en-US" altLang="zh-CN" sz="2000" b="1" dirty="0"/>
+              <a:t>. Levine </a:t>
+            </a:r>
+            <a:r>
+              <a:rPr lang="en-US" altLang="zh-CN" sz="2000" dirty="0"/>
+              <a:t>and V. Koltun. </a:t>
+            </a:r>
+            <a:r>
+              <a:rPr lang="en-US" altLang="zh-CN" sz="2000" b="1" dirty="0"/>
+              <a:t>Learning complex neural network policies with trajectory </a:t>
+            </a:r>
+            <a:r>
+              <a:rPr lang="en-US" altLang="zh-CN" sz="2000" b="1" dirty="0" smtClean="0"/>
+              <a:t>   </a:t>
+            </a:r>
+          </a:p>
+          <a:p>
+            <a:r>
+              <a:rPr lang="en-US" altLang="zh-CN" sz="2000" b="1" dirty="0" smtClean="0"/>
+              <a:t>       optimization</a:t>
+            </a:r>
+            <a:r>
+              <a:rPr lang="en-US" altLang="zh-CN" sz="2000" dirty="0"/>
+              <a:t>. In </a:t>
+            </a:r>
+            <a:r>
+              <a:rPr lang="en-US" altLang="zh-CN" sz="2000" i="1" dirty="0"/>
+              <a:t>International Conference on Machine Learning (</a:t>
+            </a:r>
+            <a:r>
+              <a:rPr lang="en-US" altLang="zh-CN" sz="2000" b="1" i="1" dirty="0"/>
+              <a:t>ICML</a:t>
+            </a:r>
+            <a:r>
+              <a:rPr lang="en-US" altLang="zh-CN" sz="2000" i="1" dirty="0"/>
+              <a:t>)</a:t>
+            </a:r>
+            <a:r>
+              <a:rPr lang="en-US" altLang="zh-CN" sz="2000" dirty="0"/>
+              <a:t>, 2014.</a:t>
+            </a:r>
+            <a:r>
+              <a:rPr lang="en-US" altLang="zh-CN" sz="2000" dirty="0"/>
+              <a:t> </a:t>
+            </a:r>
+            <a:r>
+              <a:rPr lang="en-US" altLang="zh-CN" sz="2000" dirty="0" smtClean="0"/>
+              <a:t>    </a:t>
+            </a:r>
+          </a:p>
+          <a:p>
+            <a:endParaRPr lang="en-US" altLang="zh-CN" sz="2000" b="1" dirty="0"/>
+          </a:p>
+          <a:p>
+            <a:pPr marL="457200" indent="-457200">
+              <a:buAutoNum type="arabicPeriod" startAt="4"/>
+            </a:pPr>
+            <a:r>
+              <a:rPr lang="en-US" altLang="zh-CN" sz="2000" b="1" dirty="0" smtClean="0"/>
+              <a:t>S</a:t>
+            </a:r>
+            <a:r>
+              <a:rPr lang="en-US" altLang="zh-CN" sz="2000" b="1" dirty="0"/>
+              <a:t>. Levine </a:t>
+            </a:r>
+            <a:r>
+              <a:rPr lang="en-US" altLang="zh-CN" sz="2000" dirty="0"/>
+              <a:t>and P. Abbeel. </a:t>
+            </a:r>
+            <a:r>
+              <a:rPr lang="en-US" altLang="zh-CN" sz="2000" b="1" dirty="0"/>
+              <a:t>Learning neural network policies with guided policy search </a:t>
+            </a:r>
+            <a:r>
+              <a:rPr lang="en-US" altLang="zh-CN" sz="2000" b="1" dirty="0" smtClean="0"/>
+              <a:t>under unknown </a:t>
+            </a:r>
+            <a:r>
+              <a:rPr lang="en-US" altLang="zh-CN" sz="2000" b="1" dirty="0"/>
+              <a:t>dynamics</a:t>
+            </a:r>
+            <a:r>
+              <a:rPr lang="en-US" altLang="zh-CN" sz="2000" dirty="0"/>
+              <a:t>. In </a:t>
+            </a:r>
+            <a:r>
+              <a:rPr lang="en-US" altLang="zh-CN" sz="2000" i="1" dirty="0"/>
+              <a:t>Advances in Neural Information Processing Systems (</a:t>
+            </a:r>
+            <a:r>
+              <a:rPr lang="en-US" altLang="zh-CN" sz="2000" b="1" i="1" dirty="0"/>
+              <a:t>NIPS</a:t>
+            </a:r>
+            <a:r>
+              <a:rPr lang="en-US" altLang="zh-CN" sz="2000" i="1" dirty="0"/>
+              <a:t>)</a:t>
+            </a:r>
+            <a:r>
+              <a:rPr lang="en-US" altLang="zh-CN" sz="2000" dirty="0"/>
+              <a:t>, 2014.</a:t>
+            </a:r>
+            <a:r>
+              <a:rPr lang="en-US" altLang="zh-CN" sz="2000" dirty="0"/>
+              <a:t> </a:t>
+            </a:r>
+            <a:br>
+              <a:rPr lang="en-US" altLang="zh-CN" sz="2000" dirty="0"/>
+            </a:br>
+            <a:endParaRPr lang="en-US" altLang="zh-CN" sz="2000" dirty="0" smtClean="0"/>
+          </a:p>
+          <a:p>
+            <a:pPr marL="457200" indent="-457200">
+              <a:buAutoNum type="arabicPeriod" startAt="5"/>
+            </a:pPr>
+            <a:r>
+              <a:rPr lang="en-US" altLang="zh-CN" sz="2000" b="1" dirty="0" smtClean="0"/>
+              <a:t>S</a:t>
+            </a:r>
+            <a:r>
+              <a:rPr lang="en-US" altLang="zh-CN" sz="2000" b="1" dirty="0"/>
+              <a:t>. Levine</a:t>
+            </a:r>
+            <a:r>
+              <a:rPr lang="en-US" altLang="zh-CN" sz="2000" dirty="0"/>
+              <a:t>, N. Wagener, and P. Abbeel. </a:t>
+            </a:r>
+            <a:r>
+              <a:rPr lang="en-US" altLang="zh-CN" sz="2000" b="1" dirty="0"/>
+              <a:t>Learning contact-rich manipulation skills </a:t>
+            </a:r>
+            <a:endParaRPr lang="en-US" altLang="zh-CN" sz="2000" b="1" dirty="0" smtClean="0"/>
+          </a:p>
+          <a:p>
+            <a:r>
+              <a:rPr lang="en-US" altLang="zh-CN" sz="2000" b="1" dirty="0" smtClean="0"/>
+              <a:t>        with guided policy </a:t>
+            </a:r>
+            <a:r>
+              <a:rPr lang="en-US" altLang="zh-CN" sz="2000" b="1" dirty="0"/>
+              <a:t>search</a:t>
+            </a:r>
+            <a:r>
+              <a:rPr lang="en-US" altLang="zh-CN" sz="2000" dirty="0"/>
+              <a:t>. In </a:t>
+            </a:r>
+            <a:r>
+              <a:rPr lang="en-US" altLang="zh-CN" sz="2000" i="1" dirty="0"/>
+              <a:t>International Conference on Robotics and </a:t>
+            </a:r>
+            <a:r>
+              <a:rPr lang="en-US" altLang="zh-CN" sz="2000" i="1" dirty="0" smtClean="0"/>
+              <a:t>  </a:t>
+            </a:r>
+          </a:p>
+          <a:p>
+            <a:r>
+              <a:rPr lang="en-US" altLang="zh-CN" sz="2000" i="1" dirty="0" smtClean="0"/>
+              <a:t>        Automation </a:t>
+            </a:r>
+            <a:r>
+              <a:rPr lang="en-US" altLang="zh-CN" sz="2000" i="1" dirty="0"/>
+              <a:t>(</a:t>
+            </a:r>
+            <a:r>
+              <a:rPr lang="en-US" altLang="zh-CN" sz="2000" b="1" i="1" dirty="0"/>
+              <a:t>ICRA</a:t>
+            </a:r>
+            <a:r>
+              <a:rPr lang="en-US" altLang="zh-CN" sz="2000" i="1" dirty="0"/>
+              <a:t>)</a:t>
+            </a:r>
+            <a:r>
+              <a:rPr lang="en-US" altLang="zh-CN" sz="2000" dirty="0"/>
+              <a:t>, 2015.</a:t>
+            </a:r>
+            <a:r>
+              <a:rPr lang="en-US" altLang="zh-CN" sz="2000" dirty="0"/>
+              <a:t> </a:t>
+            </a:r>
+            <a:endParaRPr lang="en-US" altLang="zh-CN" sz="2000" dirty="0" smtClean="0"/>
+          </a:p>
+        </p:txBody>
+      </p:sp>
+    </p:spTree>
+    <p:extLst>
+      <p:ext uri="{BB962C8B-B14F-4D97-AF65-F5344CB8AC3E}">
+        <p14:creationId xmlns:p14="http://schemas.microsoft.com/office/powerpoint/2010/main" val="3752888215"/>
+      </p:ext>
+    </p:extLst>
+  </p:cSld>
+  <p:clrMapOvr>
+    <a:masterClrMapping/>
+  </p:clrMapOvr>
+</p:sld>
+</file>
+
+<file path=ppt/slides/slide3.xml><?xml version="1.0" encoding="utf-8"?>
+<p:sld xmlns:a="http://schemas.openxmlformats.org/drawingml/2006/main" xmlns:r="http://schemas.openxmlformats.org/officeDocument/2006/relationships" xmlns:p="http://schemas.openxmlformats.org/presentationml/2006/main">
+  <p:cSld>
+    <p:spTree>
+      <p:nvGrpSpPr>
+        <p:cNvPr id="1" name=""/>
+        <p:cNvGrpSpPr/>
+        <p:nvPr/>
+      </p:nvGrpSpPr>
+      <p:grpSpPr>
+        <a:xfrm>
+          <a:off x="0" y="0"/>
+          <a:ext cx="0" cy="0"/>
+          <a:chOff x="0" y="0"/>
+          <a:chExt cx="0" cy="0"/>
+        </a:xfrm>
+      </p:grpSpPr>
+      <p:sp>
+        <p:nvSpPr>
+          <p:cNvPr id="5" name="文本框 4"/>
+          <p:cNvSpPr txBox="1"/>
+          <p:nvPr/>
+        </p:nvSpPr>
+        <p:spPr>
+          <a:xfrm>
+            <a:off x="764770" y="473822"/>
+            <a:ext cx="10881360" cy="5447645"/>
+          </a:xfrm>
+          <a:prstGeom prst="rect">
+            <a:avLst/>
+          </a:prstGeom>
+          <a:noFill/>
+        </p:spPr>
+        <p:txBody>
+          <a:bodyPr wrap="square" rtlCol="0">
+            <a:spAutoFit/>
+          </a:bodyPr>
+          <a:lstStyle/>
+          <a:p>
+            <a:r>
+              <a:rPr lang="en-US" altLang="zh-CN" sz="2400" b="1" dirty="0" smtClean="0">
+                <a:latin typeface="Times New Roman" panose="02020603050405020304" pitchFamily="18" charset="0"/>
+                <a:cs typeface="Times New Roman" panose="02020603050405020304" pitchFamily="18" charset="0"/>
+              </a:rPr>
+              <a:t>The related works by </a:t>
+            </a:r>
+            <a:r>
+              <a:rPr lang="en-US" altLang="zh-CN" sz="2400" b="1" dirty="0">
+                <a:latin typeface="Times New Roman" panose="02020603050405020304" pitchFamily="18" charset="0"/>
+                <a:cs typeface="Times New Roman" panose="02020603050405020304" pitchFamily="18" charset="0"/>
+              </a:rPr>
+              <a:t>Sergey Leviney</a:t>
+            </a:r>
+            <a:r>
+              <a:rPr lang="en-US" altLang="zh-CN" sz="2400" b="1" dirty="0" smtClean="0">
+                <a:latin typeface="Times New Roman" panose="02020603050405020304" pitchFamily="18" charset="0"/>
+                <a:cs typeface="Times New Roman" panose="02020603050405020304" pitchFamily="18" charset="0"/>
+              </a:rPr>
+              <a:t> </a:t>
+            </a:r>
+            <a:r>
+              <a:rPr lang="en-US" altLang="zh-CN" sz="2400" dirty="0" smtClean="0">
+                <a:latin typeface="Times New Roman" panose="02020603050405020304" pitchFamily="18" charset="0"/>
+                <a:cs typeface="Times New Roman" panose="02020603050405020304" pitchFamily="18" charset="0"/>
+              </a:rPr>
+              <a:t>:</a:t>
+            </a:r>
+          </a:p>
+          <a:p>
+            <a:endParaRPr lang="en-US" altLang="zh-CN" sz="2400" dirty="0" smtClean="0">
+              <a:latin typeface="Times New Roman" panose="02020603050405020304" pitchFamily="18" charset="0"/>
+              <a:cs typeface="Times New Roman" panose="02020603050405020304" pitchFamily="18" charset="0"/>
+            </a:endParaRPr>
+          </a:p>
+          <a:p>
+            <a:r>
+              <a:rPr lang="en-US" altLang="zh-CN" sz="2000" dirty="0" smtClean="0">
+                <a:latin typeface="Times New Roman" panose="02020603050405020304" pitchFamily="18" charset="0"/>
+                <a:cs typeface="Times New Roman" panose="02020603050405020304" pitchFamily="18" charset="0"/>
+              </a:rPr>
+              <a:t>Paper 1: this paper that introduced the Guided policy search (GPS) alogrithm.The policy search is </a:t>
+            </a:r>
+          </a:p>
+          <a:p>
+            <a:r>
+              <a:rPr lang="en-US" altLang="zh-CN" sz="2000" dirty="0">
+                <a:latin typeface="Times New Roman" panose="02020603050405020304" pitchFamily="18" charset="0"/>
+                <a:cs typeface="Times New Roman" panose="02020603050405020304" pitchFamily="18" charset="0"/>
+              </a:rPr>
+              <a:t> </a:t>
+            </a:r>
+            <a:r>
+              <a:rPr lang="en-US" altLang="zh-CN" sz="2000" dirty="0" smtClean="0">
+                <a:latin typeface="Times New Roman" panose="02020603050405020304" pitchFamily="18" charset="0"/>
+                <a:cs typeface="Times New Roman" panose="02020603050405020304" pitchFamily="18" charset="0"/>
+              </a:rPr>
+              <a:t>             model-free, it is guided by a model-based DDP alogrithm, which generate the guided samples.</a:t>
+            </a:r>
+          </a:p>
+          <a:p>
+            <a:endParaRPr lang="en-US" altLang="zh-CN" sz="2000" dirty="0" smtClean="0">
+              <a:latin typeface="Times New Roman" panose="02020603050405020304" pitchFamily="18" charset="0"/>
+              <a:cs typeface="Times New Roman" panose="02020603050405020304" pitchFamily="18" charset="0"/>
+            </a:endParaRPr>
+          </a:p>
+          <a:p>
+            <a:r>
+              <a:rPr lang="en-US" altLang="zh-CN" sz="2000" dirty="0" smtClean="0">
+                <a:latin typeface="Times New Roman" panose="02020603050405020304" pitchFamily="18" charset="0"/>
+                <a:cs typeface="Times New Roman" panose="02020603050405020304" pitchFamily="18" charset="0"/>
+              </a:rPr>
+              <a:t>Paper 2: this paper introduced </a:t>
+            </a:r>
+            <a:r>
+              <a:rPr lang="en-US" altLang="zh-CN" sz="2000" dirty="0">
+                <a:latin typeface="Times New Roman" panose="02020603050405020304" pitchFamily="18" charset="0"/>
+                <a:cs typeface="Times New Roman" panose="02020603050405020304" pitchFamily="18" charset="0"/>
+              </a:rPr>
+              <a:t>the Variational Guided Policy </a:t>
+            </a:r>
+            <a:r>
+              <a:rPr lang="en-US" altLang="zh-CN" sz="2000" dirty="0" smtClean="0">
+                <a:latin typeface="Times New Roman" panose="02020603050405020304" pitchFamily="18" charset="0"/>
+                <a:cs typeface="Times New Roman" panose="02020603050405020304" pitchFamily="18" charset="0"/>
+              </a:rPr>
+              <a:t>Search alogrithm based on trajectory  </a:t>
+            </a:r>
+          </a:p>
+          <a:p>
+            <a:r>
+              <a:rPr lang="en-US" altLang="zh-CN" sz="2000" dirty="0" smtClean="0">
+                <a:latin typeface="Times New Roman" panose="02020603050405020304" pitchFamily="18" charset="0"/>
+                <a:cs typeface="Times New Roman" panose="02020603050405020304" pitchFamily="18" charset="0"/>
+              </a:rPr>
+              <a:t>              optimization.</a:t>
+            </a:r>
+          </a:p>
+          <a:p>
+            <a:endParaRPr lang="en-US" altLang="zh-CN" sz="2000" dirty="0">
+              <a:latin typeface="Times New Roman" panose="02020603050405020304" pitchFamily="18" charset="0"/>
+              <a:cs typeface="Times New Roman" panose="02020603050405020304" pitchFamily="18" charset="0"/>
+            </a:endParaRPr>
+          </a:p>
+          <a:p>
+            <a:r>
+              <a:rPr lang="en-US" altLang="zh-CN" sz="2000" dirty="0">
+                <a:latin typeface="Times New Roman" panose="02020603050405020304" pitchFamily="18" charset="0"/>
+                <a:cs typeface="Times New Roman" panose="02020603050405020304" pitchFamily="18" charset="0"/>
+              </a:rPr>
+              <a:t>Paper </a:t>
+            </a:r>
+            <a:r>
+              <a:rPr lang="en-US" altLang="zh-CN" sz="2000" dirty="0" smtClean="0">
+                <a:latin typeface="Times New Roman" panose="02020603050405020304" pitchFamily="18" charset="0"/>
+                <a:cs typeface="Times New Roman" panose="02020603050405020304" pitchFamily="18" charset="0"/>
+              </a:rPr>
+              <a:t>3: this </a:t>
+            </a:r>
+            <a:r>
+              <a:rPr lang="en-US" altLang="zh-CN" sz="2000" dirty="0">
+                <a:latin typeface="Times New Roman" panose="02020603050405020304" pitchFamily="18" charset="0"/>
+                <a:cs typeface="Times New Roman" panose="02020603050405020304" pitchFamily="18" charset="0"/>
+              </a:rPr>
+              <a:t>paper </a:t>
+            </a:r>
+            <a:r>
+              <a:rPr lang="en-US" altLang="zh-CN" sz="2000" dirty="0" smtClean="0">
+                <a:latin typeface="Times New Roman" panose="02020603050405020304" pitchFamily="18" charset="0"/>
+                <a:cs typeface="Times New Roman" panose="02020603050405020304" pitchFamily="18" charset="0"/>
+              </a:rPr>
+              <a:t>introduced the </a:t>
+            </a:r>
+            <a:r>
+              <a:rPr lang="en-US" altLang="zh-CN" sz="2000" dirty="0">
+                <a:latin typeface="Times New Roman" panose="02020603050405020304" pitchFamily="18" charset="0"/>
+                <a:cs typeface="Times New Roman" panose="02020603050405020304" pitchFamily="18" charset="0"/>
+              </a:rPr>
+              <a:t>Constrained guided policy </a:t>
+            </a:r>
+            <a:r>
+              <a:rPr lang="en-US" altLang="zh-CN" sz="2000" dirty="0" smtClean="0">
+                <a:latin typeface="Times New Roman" panose="02020603050405020304" pitchFamily="18" charset="0"/>
+                <a:cs typeface="Times New Roman" panose="02020603050405020304" pitchFamily="18" charset="0"/>
+              </a:rPr>
+              <a:t>search alogrithm based on trajectory </a:t>
+            </a:r>
+          </a:p>
+          <a:p>
+            <a:r>
+              <a:rPr lang="en-US" altLang="zh-CN" sz="2000" dirty="0" smtClean="0">
+                <a:latin typeface="Times New Roman" panose="02020603050405020304" pitchFamily="18" charset="0"/>
+                <a:cs typeface="Times New Roman" panose="02020603050405020304" pitchFamily="18" charset="0"/>
+              </a:rPr>
+              <a:t>              optimization.</a:t>
+            </a:r>
+          </a:p>
+          <a:p>
+            <a:endParaRPr lang="en-US" altLang="zh-CN" sz="2000" dirty="0">
+              <a:latin typeface="Times New Roman" panose="02020603050405020304" pitchFamily="18" charset="0"/>
+              <a:cs typeface="Times New Roman" panose="02020603050405020304" pitchFamily="18" charset="0"/>
+            </a:endParaRPr>
+          </a:p>
+          <a:p>
+            <a:r>
+              <a:rPr lang="en-US" altLang="zh-CN" sz="2000" dirty="0" smtClean="0">
+                <a:latin typeface="Times New Roman" panose="02020603050405020304" pitchFamily="18" charset="0"/>
+                <a:cs typeface="Times New Roman" panose="02020603050405020304" pitchFamily="18" charset="0"/>
+              </a:rPr>
+              <a:t>Paper 4: this paper introduced a method to fit the system dynamics with the trajectory’s samples, so that </a:t>
+            </a:r>
+          </a:p>
+          <a:p>
+            <a:r>
+              <a:rPr lang="en-US" altLang="zh-CN" sz="2000" dirty="0" smtClean="0">
+                <a:latin typeface="Times New Roman" panose="02020603050405020304" pitchFamily="18" charset="0"/>
+                <a:cs typeface="Times New Roman" panose="02020603050405020304" pitchFamily="18" charset="0"/>
+              </a:rPr>
+              <a:t>              in the GPS alogrithm, the guided DDP alogrithm can work model-free.</a:t>
+            </a:r>
+            <a:endParaRPr lang="en-US" altLang="zh-CN" sz="2000" dirty="0">
+              <a:latin typeface="Times New Roman" panose="02020603050405020304" pitchFamily="18" charset="0"/>
+              <a:cs typeface="Times New Roman" panose="02020603050405020304" pitchFamily="18" charset="0"/>
+            </a:endParaRPr>
+          </a:p>
+          <a:p>
+            <a:endParaRPr lang="en-US" altLang="zh-CN" sz="2000" dirty="0" smtClean="0">
+              <a:latin typeface="Times New Roman" panose="02020603050405020304" pitchFamily="18" charset="0"/>
+              <a:cs typeface="Times New Roman" panose="02020603050405020304" pitchFamily="18" charset="0"/>
+            </a:endParaRPr>
+          </a:p>
+          <a:p>
+            <a:r>
+              <a:rPr lang="en-US" altLang="zh-CN" sz="2000" dirty="0" smtClean="0">
+                <a:latin typeface="Times New Roman" panose="02020603050405020304" pitchFamily="18" charset="0"/>
+                <a:cs typeface="Times New Roman" panose="02020603050405020304" pitchFamily="18" charset="0"/>
+              </a:rPr>
+              <a:t>Paper 5: the alogrithm above are all execute </a:t>
+            </a:r>
+            <a:r>
+              <a:rPr lang="en-US" altLang="zh-CN" sz="2000" dirty="0">
+                <a:latin typeface="Times New Roman" panose="02020603050405020304" pitchFamily="18" charset="0"/>
+                <a:cs typeface="Times New Roman" panose="02020603050405020304" pitchFamily="18" charset="0"/>
+              </a:rPr>
+              <a:t>simulated robotic manipulation </a:t>
+            </a:r>
+            <a:r>
+              <a:rPr lang="en-US" altLang="zh-CN" sz="2000" dirty="0" smtClean="0">
+                <a:latin typeface="Times New Roman" panose="02020603050405020304" pitchFamily="18" charset="0"/>
+                <a:cs typeface="Times New Roman" panose="02020603050405020304" pitchFamily="18" charset="0"/>
+              </a:rPr>
+              <a:t>tasks. This paper introduced  </a:t>
+            </a:r>
+          </a:p>
+          <a:p>
+            <a:r>
+              <a:rPr lang="en-US" altLang="zh-CN" sz="2000" dirty="0" smtClean="0">
+                <a:latin typeface="Times New Roman" panose="02020603050405020304" pitchFamily="18" charset="0"/>
+                <a:cs typeface="Times New Roman" panose="02020603050405020304" pitchFamily="18" charset="0"/>
+              </a:rPr>
+              <a:t>              several </a:t>
+            </a:r>
+            <a:r>
+              <a:rPr lang="en-US" altLang="zh-CN" sz="2000" dirty="0">
+                <a:latin typeface="Times New Roman" panose="02020603050405020304" pitchFamily="18" charset="0"/>
+                <a:cs typeface="Times New Roman" panose="02020603050405020304" pitchFamily="18" charset="0"/>
+              </a:rPr>
+              <a:t>improvements to </a:t>
+            </a:r>
+            <a:r>
+              <a:rPr lang="en-US" altLang="zh-CN" sz="2000" dirty="0" smtClean="0">
+                <a:latin typeface="Times New Roman" panose="02020603050405020304" pitchFamily="18" charset="0"/>
+                <a:cs typeface="Times New Roman" panose="02020603050405020304" pitchFamily="18" charset="0"/>
+              </a:rPr>
+              <a:t>the guided </a:t>
+            </a:r>
+            <a:r>
+              <a:rPr lang="en-US" altLang="zh-CN" sz="2000" dirty="0">
+                <a:latin typeface="Times New Roman" panose="02020603050405020304" pitchFamily="18" charset="0"/>
+                <a:cs typeface="Times New Roman" panose="02020603050405020304" pitchFamily="18" charset="0"/>
+              </a:rPr>
+              <a:t>policy </a:t>
+            </a:r>
+            <a:r>
+              <a:rPr lang="en-US" altLang="zh-CN" sz="2000" dirty="0" smtClean="0">
+                <a:latin typeface="Times New Roman" panose="02020603050405020304" pitchFamily="18" charset="0"/>
+                <a:cs typeface="Times New Roman" panose="02020603050405020304" pitchFamily="18" charset="0"/>
+              </a:rPr>
+              <a:t>search alogrithm in paper 4 </a:t>
+            </a:r>
+            <a:r>
+              <a:rPr lang="en-US" altLang="zh-CN" sz="2000" dirty="0">
+                <a:latin typeface="Times New Roman" panose="02020603050405020304" pitchFamily="18" charset="0"/>
+                <a:cs typeface="Times New Roman" panose="02020603050405020304" pitchFamily="18" charset="0"/>
+              </a:rPr>
+              <a:t>to make it more practical </a:t>
+            </a:r>
+            <a:endParaRPr lang="en-US" altLang="zh-CN" sz="2000" dirty="0" smtClean="0">
+              <a:latin typeface="Times New Roman" panose="02020603050405020304" pitchFamily="18" charset="0"/>
+              <a:cs typeface="Times New Roman" panose="02020603050405020304" pitchFamily="18" charset="0"/>
+            </a:endParaRPr>
+          </a:p>
+          <a:p>
+            <a:r>
+              <a:rPr lang="en-US" altLang="zh-CN" sz="2000" dirty="0" smtClean="0">
+                <a:latin typeface="Times New Roman" panose="02020603050405020304" pitchFamily="18" charset="0"/>
+                <a:cs typeface="Times New Roman" panose="02020603050405020304" pitchFamily="18" charset="0"/>
+              </a:rPr>
+              <a:t>              for robotic applications, and successfully run on a </a:t>
+            </a:r>
+            <a:r>
+              <a:rPr lang="en-US" altLang="zh-CN" sz="2000" dirty="0">
+                <a:latin typeface="Times New Roman" panose="02020603050405020304" pitchFamily="18" charset="0"/>
+                <a:cs typeface="Times New Roman" panose="02020603050405020304" pitchFamily="18" charset="0"/>
+              </a:rPr>
+              <a:t>real </a:t>
+            </a:r>
+            <a:r>
+              <a:rPr lang="en-US" altLang="zh-CN" sz="2000" dirty="0" smtClean="0">
+                <a:latin typeface="Times New Roman" panose="02020603050405020304" pitchFamily="18" charset="0"/>
+                <a:cs typeface="Times New Roman" panose="02020603050405020304" pitchFamily="18" charset="0"/>
+              </a:rPr>
+              <a:t>robot.</a:t>
+            </a:r>
+          </a:p>
+        </p:txBody>
+      </p:sp>
+    </p:spTree>
+    <p:extLst>
+      <p:ext uri="{BB962C8B-B14F-4D97-AF65-F5344CB8AC3E}">
+        <p14:creationId xmlns:p14="http://schemas.microsoft.com/office/powerpoint/2010/main" val="2451207592"/>
+      </p:ext>
+    </p:extLst>
+  </p:cSld>
+  <p:clrMapOvr>
+    <a:masterClrMapping/>
+  </p:clrMapOvr>
+</p:sld>
+</file>
+
+<file path=ppt/slides/slide4.xml><?xml version="1.0" encoding="utf-8"?>
+<p:sld xmlns:a="http://schemas.openxmlformats.org/drawingml/2006/main" xmlns:r="http://schemas.openxmlformats.org/officeDocument/2006/relationships" xmlns:p="http://schemas.openxmlformats.org/presentationml/2006/main">
+  <p:cSld>
+    <p:spTree>
+      <p:nvGrpSpPr>
+        <p:cNvPr id="1" name=""/>
+        <p:cNvGrpSpPr/>
+        <p:nvPr/>
+      </p:nvGrpSpPr>
+      <p:grpSpPr>
+        <a:xfrm>
+          <a:off x="0" y="0"/>
+          <a:ext cx="0" cy="0"/>
+          <a:chOff x="0" y="0"/>
+          <a:chExt cx="0" cy="0"/>
+        </a:xfrm>
+      </p:grpSpPr>
+      <p:sp>
+        <p:nvSpPr>
           <p:cNvPr id="7" name="矩形 6"/>
           <p:cNvSpPr/>
           <p:nvPr/>
@@ -3664,7 +4952,7 @@
 </p:sld>
 </file>
 
-<file path=ppt/slides/slide3.xml><?xml version="1.0" encoding="utf-8"?>
+<file path=ppt/slides/slide5.xml><?xml version="1.0" encoding="utf-8"?>
 <p:sld xmlns:a="http://schemas.openxmlformats.org/drawingml/2006/main" xmlns:r="http://schemas.openxmlformats.org/officeDocument/2006/relationships" xmlns:p="http://schemas.openxmlformats.org/presentationml/2006/main">
   <p:cSld>
     <p:spTree>
@@ -3718,7 +5006,7 @@
 </p:sld>
 </file>
 
-<file path=ppt/slides/slide4.xml><?xml version="1.0" encoding="utf-8"?>
+<file path=ppt/slides/slide6.xml><?xml version="1.0" encoding="utf-8"?>
 <p:sld xmlns:a="http://schemas.openxmlformats.org/drawingml/2006/main" xmlns:r="http://schemas.openxmlformats.org/officeDocument/2006/relationships" xmlns:p="http://schemas.openxmlformats.org/presentationml/2006/main">
   <p:cSld>
     <p:spTree>
@@ -3957,7 +5245,7 @@
 </p:sld>
 </file>
 
-<file path=ppt/slides/slide5.xml><?xml version="1.0" encoding="utf-8"?>
+<file path=ppt/slides/slide7.xml><?xml version="1.0" encoding="utf-8"?>
 <p:sld xmlns:a="http://schemas.openxmlformats.org/drawingml/2006/main" xmlns:r="http://schemas.openxmlformats.org/officeDocument/2006/relationships" xmlns:p="http://schemas.openxmlformats.org/presentationml/2006/main">
   <p:cSld>
     <p:spTree>
@@ -4406,7 +5694,7 @@
 </p:sld>
 </file>
 
-<file path=ppt/slides/slide6.xml><?xml version="1.0" encoding="utf-8"?>
+<file path=ppt/slides/slide8.xml><?xml version="1.0" encoding="utf-8"?>
 <p:sld xmlns:a="http://schemas.openxmlformats.org/drawingml/2006/main" xmlns:r="http://schemas.openxmlformats.org/officeDocument/2006/relationships" xmlns:p="http://schemas.openxmlformats.org/presentationml/2006/main">
   <p:cSld>
     <p:spTree>
@@ -4829,7 +6117,7 @@
 </p:sld>
 </file>
 
-<file path=ppt/slides/slide7.xml><?xml version="1.0" encoding="utf-8"?>
+<file path=ppt/slides/slide9.xml><?xml version="1.0" encoding="utf-8"?>
 <p:sld xmlns:a="http://schemas.openxmlformats.org/drawingml/2006/main" xmlns:r="http://schemas.openxmlformats.org/officeDocument/2006/relationships" xmlns:p="http://schemas.openxmlformats.org/presentationml/2006/main">
   <p:cSld>
     <p:spTree>
@@ -4908,7 +6196,7 @@
         </p:blipFill>
         <p:spPr>
           <a:xfrm>
-            <a:off x="474454" y="1979527"/>
+            <a:off x="425943" y="2302451"/>
             <a:ext cx="3661552" cy="3886187"/>
           </a:xfrm>
           <a:prstGeom prst="rect">
@@ -5096,546 +6384,6 @@
   <p:clrMapOvr>
     <a:masterClrMapping/>
   </p:clrMapOvr>
-</p:sld>
-</file>
-
-<file path=ppt/slides/slide8.xml><?xml version="1.0" encoding="utf-8"?>
-<p:sld xmlns:a="http://schemas.openxmlformats.org/drawingml/2006/main" xmlns:r="http://schemas.openxmlformats.org/officeDocument/2006/relationships" xmlns:p="http://schemas.openxmlformats.org/presentationml/2006/main">
-  <p:cSld>
-    <p:spTree>
-      <p:nvGrpSpPr>
-        <p:cNvPr id="1" name=""/>
-        <p:cNvGrpSpPr/>
-        <p:nvPr/>
-      </p:nvGrpSpPr>
-      <p:grpSpPr>
-        <a:xfrm>
-          <a:off x="0" y="0"/>
-          <a:ext cx="0" cy="0"/>
-          <a:chOff x="0" y="0"/>
-          <a:chExt cx="0" cy="0"/>
-        </a:xfrm>
-      </p:grpSpPr>
-      <p:sp>
-        <p:nvSpPr>
-          <p:cNvPr id="4" name="文本框 3"/>
-          <p:cNvSpPr txBox="1"/>
-          <p:nvPr/>
-        </p:nvSpPr>
-        <p:spPr>
-          <a:xfrm>
-            <a:off x="897148" y="508959"/>
-            <a:ext cx="10705380" cy="830997"/>
-          </a:xfrm>
-          <a:prstGeom prst="rect">
-            <a:avLst/>
-          </a:prstGeom>
-          <a:noFill/>
-        </p:spPr>
-        <p:txBody>
-          <a:bodyPr wrap="square" rtlCol="0">
-            <a:spAutoFit/>
-          </a:bodyPr>
-          <a:lstStyle/>
-          <a:p>
-            <a:r>
-              <a:rPr lang="en-US" altLang="zh-CN" sz="2400" b="1" dirty="0" smtClean="0">
-                <a:latin typeface="Times New Roman" panose="02020603050405020304" pitchFamily="18" charset="0"/>
-                <a:cs typeface="Times New Roman" panose="02020603050405020304" pitchFamily="18" charset="0"/>
-              </a:rPr>
-              <a:t>Pre-training: </a:t>
-            </a:r>
-            <a:r>
-              <a:rPr lang="en-US" altLang="zh-CN" sz="2400" dirty="0">
-                <a:latin typeface="Times New Roman" panose="02020603050405020304" pitchFamily="18" charset="0"/>
-                <a:cs typeface="Times New Roman" panose="02020603050405020304" pitchFamily="18" charset="0"/>
-              </a:rPr>
-              <a:t>introduce a </a:t>
-            </a:r>
-            <a:r>
-              <a:rPr lang="en-US" altLang="zh-CN" sz="2400" dirty="0" smtClean="0">
-                <a:latin typeface="Times New Roman" panose="02020603050405020304" pitchFamily="18" charset="0"/>
-                <a:cs typeface="Times New Roman" panose="02020603050405020304" pitchFamily="18" charset="0"/>
-              </a:rPr>
-              <a:t>pretraining scheme </a:t>
-            </a:r>
-            <a:r>
-              <a:rPr lang="en-US" altLang="zh-CN" sz="2400" dirty="0">
-                <a:latin typeface="Times New Roman" panose="02020603050405020304" pitchFamily="18" charset="0"/>
-                <a:cs typeface="Times New Roman" panose="02020603050405020304" pitchFamily="18" charset="0"/>
-              </a:rPr>
-              <a:t>that allows </a:t>
-            </a:r>
-            <a:r>
-              <a:rPr lang="en-US" altLang="zh-CN" sz="2400" dirty="0" smtClean="0">
-                <a:latin typeface="Times New Roman" panose="02020603050405020304" pitchFamily="18" charset="0"/>
-                <a:cs typeface="Times New Roman" panose="02020603050405020304" pitchFamily="18" charset="0"/>
-              </a:rPr>
-              <a:t>to </a:t>
-            </a:r>
-            <a:r>
-              <a:rPr lang="en-US" altLang="zh-CN" sz="2400" dirty="0">
-                <a:latin typeface="Times New Roman" panose="02020603050405020304" pitchFamily="18" charset="0"/>
-                <a:cs typeface="Times New Roman" panose="02020603050405020304" pitchFamily="18" charset="0"/>
-              </a:rPr>
-              <a:t>train effective policies </a:t>
-            </a:r>
-            <a:r>
-              <a:rPr lang="en-US" altLang="zh-CN" sz="2400" dirty="0" smtClean="0">
-                <a:latin typeface="Times New Roman" panose="02020603050405020304" pitchFamily="18" charset="0"/>
-                <a:cs typeface="Times New Roman" panose="02020603050405020304" pitchFamily="18" charset="0"/>
-              </a:rPr>
-              <a:t>with a </a:t>
-            </a:r>
-            <a:r>
-              <a:rPr lang="en-US" altLang="zh-CN" sz="2400" dirty="0">
-                <a:latin typeface="Times New Roman" panose="02020603050405020304" pitchFamily="18" charset="0"/>
-                <a:cs typeface="Times New Roman" panose="02020603050405020304" pitchFamily="18" charset="0"/>
-              </a:rPr>
-              <a:t>relatively small number of iterations</a:t>
-            </a:r>
-            <a:r>
-              <a:rPr lang="en-US" altLang="zh-CN" sz="2400" dirty="0" smtClean="0">
-                <a:latin typeface="Times New Roman" panose="02020603050405020304" pitchFamily="18" charset="0"/>
-                <a:cs typeface="Times New Roman" panose="02020603050405020304" pitchFamily="18" charset="0"/>
-              </a:rPr>
-              <a:t> </a:t>
-            </a:r>
-            <a:endParaRPr lang="zh-CN" altLang="en-US" sz="2400" b="1" dirty="0">
-              <a:latin typeface="Times New Roman" panose="02020603050405020304" pitchFamily="18" charset="0"/>
-              <a:cs typeface="Times New Roman" panose="02020603050405020304" pitchFamily="18" charset="0"/>
-            </a:endParaRPr>
-          </a:p>
-        </p:txBody>
-      </p:sp>
-      <p:pic>
-        <p:nvPicPr>
-          <p:cNvPr id="5" name="图片 4"/>
-          <p:cNvPicPr>
-            <a:picLocks noChangeAspect="1"/>
-          </p:cNvPicPr>
-          <p:nvPr/>
-        </p:nvPicPr>
-        <p:blipFill>
-          <a:blip r:embed="rId2"/>
-          <a:stretch>
-            <a:fillRect/>
-          </a:stretch>
-        </p:blipFill>
-        <p:spPr>
-          <a:xfrm>
-            <a:off x="718729" y="1607318"/>
-            <a:ext cx="3542857" cy="4609524"/>
-          </a:xfrm>
-          <a:prstGeom prst="rect">
-            <a:avLst/>
-          </a:prstGeom>
-        </p:spPr>
-      </p:pic>
-      <p:sp>
-        <p:nvSpPr>
-          <p:cNvPr id="6" name="文本框 5"/>
-          <p:cNvSpPr txBox="1"/>
-          <p:nvPr/>
-        </p:nvSpPr>
-        <p:spPr>
-          <a:xfrm>
-            <a:off x="5080959" y="1607318"/>
-            <a:ext cx="6323162" cy="4401205"/>
-          </a:xfrm>
-          <a:prstGeom prst="rect">
-            <a:avLst/>
-          </a:prstGeom>
-          <a:noFill/>
-        </p:spPr>
-        <p:txBody>
-          <a:bodyPr wrap="square" rtlCol="0">
-            <a:spAutoFit/>
-          </a:bodyPr>
-          <a:lstStyle/>
-          <a:p>
-            <a:r>
-              <a:rPr lang="en-US" altLang="zh-CN" sz="2000" b="1" dirty="0" smtClean="0">
-                <a:latin typeface="Times New Roman" panose="02020603050405020304" pitchFamily="18" charset="0"/>
-                <a:cs typeface="Times New Roman" panose="02020603050405020304" pitchFamily="18" charset="0"/>
-              </a:rPr>
-              <a:t>1. Initial visual features:</a:t>
-            </a:r>
-          </a:p>
-          <a:p>
-            <a:r>
-              <a:rPr lang="en-US" altLang="zh-CN" sz="2000" dirty="0">
-                <a:latin typeface="Times New Roman" panose="02020603050405020304" pitchFamily="18" charset="0"/>
-                <a:cs typeface="Times New Roman" panose="02020603050405020304" pitchFamily="18" charset="0"/>
-              </a:rPr>
-              <a:t> </a:t>
-            </a:r>
-            <a:r>
-              <a:rPr lang="en-US" altLang="zh-CN" sz="2000" dirty="0" smtClean="0">
-                <a:latin typeface="Times New Roman" panose="02020603050405020304" pitchFamily="18" charset="0"/>
-                <a:cs typeface="Times New Roman" panose="02020603050405020304" pitchFamily="18" charset="0"/>
-              </a:rPr>
-              <a:t>          pretrain the convolutional layers of our network by  </a:t>
-            </a:r>
-          </a:p>
-          <a:p>
-            <a:r>
-              <a:rPr lang="en-US" altLang="zh-CN" sz="2000" dirty="0" smtClean="0">
-                <a:latin typeface="Times New Roman" panose="02020603050405020304" pitchFamily="18" charset="0"/>
-                <a:cs typeface="Times New Roman" panose="02020603050405020304" pitchFamily="18" charset="0"/>
-              </a:rPr>
-              <a:t>       predicting elements of xt that are not provided in the </a:t>
-            </a:r>
-          </a:p>
-          <a:p>
-            <a:r>
-              <a:rPr lang="en-US" altLang="zh-CN" sz="2000" dirty="0" smtClean="0">
-                <a:latin typeface="Times New Roman" panose="02020603050405020304" pitchFamily="18" charset="0"/>
-                <a:cs typeface="Times New Roman" panose="02020603050405020304" pitchFamily="18" charset="0"/>
-              </a:rPr>
-              <a:t>       observation ot, such as the positions of objects in the  </a:t>
-            </a:r>
-          </a:p>
-          <a:p>
-            <a:r>
-              <a:rPr lang="en-US" altLang="zh-CN" sz="2000" dirty="0" smtClean="0">
-                <a:latin typeface="Times New Roman" panose="02020603050405020304" pitchFamily="18" charset="0"/>
-                <a:cs typeface="Times New Roman" panose="02020603050405020304" pitchFamily="18" charset="0"/>
-              </a:rPr>
-              <a:t>       scene.</a:t>
-            </a:r>
-          </a:p>
-          <a:p>
-            <a:r>
-              <a:rPr lang="en-US" altLang="zh-CN" sz="2000" dirty="0">
-                <a:latin typeface="Times New Roman" panose="02020603050405020304" pitchFamily="18" charset="0"/>
-                <a:cs typeface="Times New Roman" panose="02020603050405020304" pitchFamily="18" charset="0"/>
-              </a:rPr>
-              <a:t> </a:t>
-            </a:r>
-            <a:r>
-              <a:rPr lang="en-US" altLang="zh-CN" sz="2000" dirty="0" smtClean="0">
-                <a:latin typeface="Times New Roman" panose="02020603050405020304" pitchFamily="18" charset="0"/>
-                <a:cs typeface="Times New Roman" panose="02020603050405020304" pitchFamily="18" charset="0"/>
-              </a:rPr>
-              <a:t>          </a:t>
-            </a:r>
-            <a:r>
-              <a:rPr lang="en-US" altLang="zh-CN" sz="2000" dirty="0">
-                <a:latin typeface="Times New Roman" panose="02020603050405020304" pitchFamily="18" charset="0"/>
-                <a:cs typeface="Times New Roman" panose="02020603050405020304" pitchFamily="18" charset="0"/>
-              </a:rPr>
-              <a:t>initialize the first layer filters from the model </a:t>
-            </a:r>
-            <a:r>
-              <a:rPr lang="en-US" altLang="zh-CN" sz="2000" dirty="0" smtClean="0">
-                <a:latin typeface="Times New Roman" panose="02020603050405020304" pitchFamily="18" charset="0"/>
-                <a:cs typeface="Times New Roman" panose="02020603050405020304" pitchFamily="18" charset="0"/>
-              </a:rPr>
-              <a:t>of </a:t>
-            </a:r>
-          </a:p>
-          <a:p>
-            <a:r>
-              <a:rPr lang="en-US" altLang="zh-CN" sz="2000" dirty="0" smtClean="0">
-                <a:latin typeface="Times New Roman" panose="02020603050405020304" pitchFamily="18" charset="0"/>
-                <a:cs typeface="Times New Roman" panose="02020603050405020304" pitchFamily="18" charset="0"/>
-              </a:rPr>
-              <a:t>       Szegedy et </a:t>
-            </a:r>
-            <a:r>
-              <a:rPr lang="en-US" altLang="zh-CN" sz="2000" dirty="0">
-                <a:latin typeface="Times New Roman" panose="02020603050405020304" pitchFamily="18" charset="0"/>
-                <a:cs typeface="Times New Roman" panose="02020603050405020304" pitchFamily="18" charset="0"/>
-              </a:rPr>
-              <a:t>al. (2014), which is trained on ImageNet </a:t>
-            </a:r>
-            <a:endParaRPr lang="en-US" altLang="zh-CN" sz="2000" dirty="0" smtClean="0">
-              <a:latin typeface="Times New Roman" panose="02020603050405020304" pitchFamily="18" charset="0"/>
-              <a:cs typeface="Times New Roman" panose="02020603050405020304" pitchFamily="18" charset="0"/>
-            </a:endParaRPr>
-          </a:p>
-          <a:p>
-            <a:r>
-              <a:rPr lang="en-US" altLang="zh-CN" sz="2000" dirty="0" smtClean="0">
-                <a:latin typeface="Times New Roman" panose="02020603050405020304" pitchFamily="18" charset="0"/>
-                <a:cs typeface="Times New Roman" panose="02020603050405020304" pitchFamily="18" charset="0"/>
-              </a:rPr>
-              <a:t>       (</a:t>
-            </a:r>
-            <a:r>
-              <a:rPr lang="en-US" altLang="zh-CN" sz="2000" dirty="0">
-                <a:latin typeface="Times New Roman" panose="02020603050405020304" pitchFamily="18" charset="0"/>
-                <a:cs typeface="Times New Roman" panose="02020603050405020304" pitchFamily="18" charset="0"/>
-              </a:rPr>
-              <a:t>Deng et </a:t>
-            </a:r>
-            <a:r>
-              <a:rPr lang="en-US" altLang="zh-CN" sz="2000" dirty="0" smtClean="0">
-                <a:latin typeface="Times New Roman" panose="02020603050405020304" pitchFamily="18" charset="0"/>
-                <a:cs typeface="Times New Roman" panose="02020603050405020304" pitchFamily="18" charset="0"/>
-              </a:rPr>
-              <a:t>al., 2009</a:t>
-            </a:r>
-            <a:r>
-              <a:rPr lang="en-US" altLang="zh-CN" sz="2000" dirty="0">
-                <a:latin typeface="Times New Roman" panose="02020603050405020304" pitchFamily="18" charset="0"/>
-                <a:cs typeface="Times New Roman" panose="02020603050405020304" pitchFamily="18" charset="0"/>
-              </a:rPr>
-              <a:t>) classification.</a:t>
-            </a:r>
-            <a:r>
-              <a:rPr lang="en-US" altLang="zh-CN" sz="2000" dirty="0" smtClean="0">
-                <a:latin typeface="Times New Roman" panose="02020603050405020304" pitchFamily="18" charset="0"/>
-                <a:cs typeface="Times New Roman" panose="02020603050405020304" pitchFamily="18" charset="0"/>
-              </a:rPr>
-              <a:t> </a:t>
-            </a:r>
-          </a:p>
-          <a:p>
-            <a:r>
-              <a:rPr lang="en-US" altLang="zh-CN" sz="2000" b="1" dirty="0" smtClean="0">
-                <a:latin typeface="Times New Roman" panose="02020603050405020304" pitchFamily="18" charset="0"/>
-                <a:cs typeface="Times New Roman" panose="02020603050405020304" pitchFamily="18" charset="0"/>
-              </a:rPr>
-              <a:t>2. Initial controllers</a:t>
-            </a:r>
-          </a:p>
-          <a:p>
-            <a:r>
-              <a:rPr lang="en-US" altLang="zh-CN" sz="2000" b="1" dirty="0">
-                <a:latin typeface="Times New Roman" panose="02020603050405020304" pitchFamily="18" charset="0"/>
-                <a:cs typeface="Times New Roman" panose="02020603050405020304" pitchFamily="18" charset="0"/>
-              </a:rPr>
-              <a:t> </a:t>
-            </a:r>
-            <a:r>
-              <a:rPr lang="en-US" altLang="zh-CN" sz="2000" b="1" dirty="0" smtClean="0">
-                <a:latin typeface="Times New Roman" panose="02020603050405020304" pitchFamily="18" charset="0"/>
-                <a:cs typeface="Times New Roman" panose="02020603050405020304" pitchFamily="18" charset="0"/>
-              </a:rPr>
-              <a:t>          </a:t>
-            </a:r>
-            <a:r>
-              <a:rPr lang="en-US" altLang="zh-CN" sz="2000" dirty="0" smtClean="0">
-                <a:latin typeface="Times New Roman" panose="02020603050405020304" pitchFamily="18" charset="0"/>
-                <a:cs typeface="Times New Roman" panose="02020603050405020304" pitchFamily="18" charset="0"/>
-              </a:rPr>
-              <a:t>initially train the guiding trajectory distributions </a:t>
-            </a:r>
-          </a:p>
-          <a:p>
-            <a:r>
-              <a:rPr lang="en-US" altLang="zh-CN" sz="2000" dirty="0" smtClean="0">
-                <a:latin typeface="Times New Roman" panose="02020603050405020304" pitchFamily="18" charset="0"/>
-                <a:cs typeface="Times New Roman" panose="02020603050405020304" pitchFamily="18" charset="0"/>
-              </a:rPr>
-              <a:t>       pi(ut|xt) independently of the convolutional network </a:t>
-            </a:r>
-          </a:p>
-          <a:p>
-            <a:r>
-              <a:rPr lang="en-US" altLang="zh-CN" sz="2000" dirty="0" smtClean="0">
-                <a:latin typeface="Times New Roman" panose="02020603050405020304" pitchFamily="18" charset="0"/>
-                <a:cs typeface="Times New Roman" panose="02020603050405020304" pitchFamily="18" charset="0"/>
-              </a:rPr>
-              <a:t>       until the trajectories achieve a basic level of    </a:t>
-            </a:r>
-          </a:p>
-          <a:p>
-            <a:r>
-              <a:rPr lang="en-US" altLang="zh-CN" sz="2000" dirty="0" smtClean="0">
-                <a:latin typeface="Times New Roman" panose="02020603050405020304" pitchFamily="18" charset="0"/>
-                <a:cs typeface="Times New Roman" panose="02020603050405020304" pitchFamily="18" charset="0"/>
-              </a:rPr>
-              <a:t>       competence at the task, and then switch to full guided </a:t>
-            </a:r>
-          </a:p>
-          <a:p>
-            <a:r>
-              <a:rPr lang="en-US" altLang="zh-CN" sz="2000" dirty="0" smtClean="0">
-                <a:latin typeface="Times New Roman" panose="02020603050405020304" pitchFamily="18" charset="0"/>
-                <a:cs typeface="Times New Roman" panose="02020603050405020304" pitchFamily="18" charset="0"/>
-              </a:rPr>
-              <a:t>       policy search with end-to-end training of πθ(ut|ot)</a:t>
-            </a:r>
-          </a:p>
-        </p:txBody>
-      </p:sp>
-    </p:spTree>
-    <p:extLst>
-      <p:ext uri="{BB962C8B-B14F-4D97-AF65-F5344CB8AC3E}">
-        <p14:creationId xmlns:p14="http://schemas.microsoft.com/office/powerpoint/2010/main" val="149065458"/>
-      </p:ext>
-    </p:extLst>
-  </p:cSld>
-  <p:clrMapOvr>
-    <a:masterClrMapping/>
-  </p:clrMapOvr>
-  <p:timing>
-    <p:tnLst>
-      <p:par>
-        <p:cTn id="1" dur="indefinite" restart="never" nodeType="tmRoot"/>
-      </p:par>
-    </p:tnLst>
-  </p:timing>
-</p:sld>
-</file>
-
-<file path=ppt/slides/slide9.xml><?xml version="1.0" encoding="utf-8"?>
-<p:sld xmlns:a="http://schemas.openxmlformats.org/drawingml/2006/main" xmlns:r="http://schemas.openxmlformats.org/officeDocument/2006/relationships" xmlns:p="http://schemas.openxmlformats.org/presentationml/2006/main">
-  <p:cSld>
-    <p:spTree>
-      <p:nvGrpSpPr>
-        <p:cNvPr id="1" name=""/>
-        <p:cNvGrpSpPr/>
-        <p:nvPr/>
-      </p:nvGrpSpPr>
-      <p:grpSpPr>
-        <a:xfrm>
-          <a:off x="0" y="0"/>
-          <a:ext cx="0" cy="0"/>
-          <a:chOff x="0" y="0"/>
-          <a:chExt cx="0" cy="0"/>
-        </a:xfrm>
-      </p:grpSpPr>
-      <p:pic>
-        <p:nvPicPr>
-          <p:cNvPr id="4" name="图片 3"/>
-          <p:cNvPicPr>
-            <a:picLocks noChangeAspect="1"/>
-          </p:cNvPicPr>
-          <p:nvPr/>
-        </p:nvPicPr>
-        <p:blipFill>
-          <a:blip r:embed="rId2"/>
-          <a:stretch>
-            <a:fillRect/>
-          </a:stretch>
-        </p:blipFill>
-        <p:spPr>
-          <a:xfrm>
-            <a:off x="4314676" y="1180301"/>
-            <a:ext cx="3388399" cy="3924693"/>
-          </a:xfrm>
-          <a:prstGeom prst="rect">
-            <a:avLst/>
-          </a:prstGeom>
-        </p:spPr>
-      </p:pic>
-      <p:sp>
-        <p:nvSpPr>
-          <p:cNvPr id="5" name="文本框 4"/>
-          <p:cNvSpPr txBox="1"/>
-          <p:nvPr/>
-        </p:nvSpPr>
-        <p:spPr>
-          <a:xfrm>
-            <a:off x="1121433" y="621102"/>
-            <a:ext cx="9946257" cy="461665"/>
-          </a:xfrm>
-          <a:prstGeom prst="rect">
-            <a:avLst/>
-          </a:prstGeom>
-          <a:noFill/>
-        </p:spPr>
-        <p:txBody>
-          <a:bodyPr wrap="square" rtlCol="0">
-            <a:spAutoFit/>
-          </a:bodyPr>
-          <a:lstStyle/>
-          <a:p>
-            <a:r>
-              <a:rPr lang="en-US" altLang="zh-CN" sz="2400" b="1" dirty="0" smtClean="0">
-                <a:latin typeface="Times New Roman" panose="02020603050405020304" pitchFamily="18" charset="0"/>
-                <a:cs typeface="Times New Roman" panose="02020603050405020304" pitchFamily="18" charset="0"/>
-              </a:rPr>
-              <a:t>The whole alogrithm:</a:t>
-            </a:r>
-            <a:endParaRPr lang="zh-CN" altLang="en-US" sz="2400" b="1" dirty="0">
-              <a:latin typeface="Times New Roman" panose="02020603050405020304" pitchFamily="18" charset="0"/>
-              <a:cs typeface="Times New Roman" panose="02020603050405020304" pitchFamily="18" charset="0"/>
-            </a:endParaRPr>
-          </a:p>
-        </p:txBody>
-      </p:sp>
-      <p:sp>
-        <p:nvSpPr>
-          <p:cNvPr id="6" name="文本框 5"/>
-          <p:cNvSpPr txBox="1"/>
-          <p:nvPr/>
-        </p:nvSpPr>
-        <p:spPr>
-          <a:xfrm>
-            <a:off x="955964" y="5685905"/>
-            <a:ext cx="9867207" cy="400110"/>
-          </a:xfrm>
-          <a:prstGeom prst="rect">
-            <a:avLst/>
-          </a:prstGeom>
-          <a:noFill/>
-        </p:spPr>
-        <p:txBody>
-          <a:bodyPr wrap="square" rtlCol="0">
-            <a:spAutoFit/>
-          </a:bodyPr>
-          <a:lstStyle/>
-          <a:p>
-            <a:r>
-              <a:rPr lang="en-US" altLang="zh-CN" sz="2000" dirty="0" smtClean="0">
-                <a:latin typeface="Times New Roman" panose="02020603050405020304" pitchFamily="18" charset="0"/>
-                <a:cs typeface="Times New Roman" panose="02020603050405020304" pitchFamily="18" charset="0"/>
-              </a:rPr>
-              <a:t>                        supplementary video: </a:t>
-            </a:r>
-            <a:r>
-              <a:rPr lang="en-US" altLang="zh-CN" sz="2000" dirty="0" smtClean="0">
-                <a:latin typeface="Times New Roman" panose="02020603050405020304" pitchFamily="18" charset="0"/>
-                <a:cs typeface="Times New Roman" panose="02020603050405020304" pitchFamily="18" charset="0"/>
-                <a:hlinkClick r:id="rId3"/>
-              </a:rPr>
-              <a:t>http</a:t>
-            </a:r>
-            <a:r>
-              <a:rPr lang="en-US" altLang="zh-CN" sz="2000" dirty="0">
-                <a:latin typeface="Times New Roman" panose="02020603050405020304" pitchFamily="18" charset="0"/>
-                <a:cs typeface="Times New Roman" panose="02020603050405020304" pitchFamily="18" charset="0"/>
-                <a:hlinkClick r:id="rId3"/>
-              </a:rPr>
-              <a:t>://sites.google.com/site/visuomotorpolicy</a:t>
-            </a:r>
-            <a:r>
-              <a:rPr lang="en-US" altLang="zh-CN" sz="2000" dirty="0" smtClean="0">
-                <a:latin typeface="Times New Roman" panose="02020603050405020304" pitchFamily="18" charset="0"/>
-                <a:cs typeface="Times New Roman" panose="02020603050405020304" pitchFamily="18" charset="0"/>
-                <a:hlinkClick r:id="rId3"/>
-              </a:rPr>
-              <a:t> </a:t>
-            </a:r>
-            <a:endParaRPr lang="zh-CN" altLang="en-US" sz="2000" dirty="0">
-              <a:latin typeface="Times New Roman" panose="02020603050405020304" pitchFamily="18" charset="0"/>
-              <a:cs typeface="Times New Roman" panose="02020603050405020304" pitchFamily="18" charset="0"/>
-            </a:endParaRPr>
-          </a:p>
-        </p:txBody>
-      </p:sp>
-    </p:spTree>
-    <p:extLst>
-      <p:ext uri="{BB962C8B-B14F-4D97-AF65-F5344CB8AC3E}">
-        <p14:creationId xmlns:p14="http://schemas.microsoft.com/office/powerpoint/2010/main" val="1757077222"/>
-      </p:ext>
-    </p:extLst>
-  </p:cSld>
-  <p:clrMapOvr>
-    <a:masterClrMapping/>
-  </p:clrMapOvr>
-  <p:timing>
-    <p:tnLst>
-      <p:par>
-        <p:cTn id="1" dur="indefinite" restart="never" nodeType="tmRoot"/>
-      </p:par>
-    </p:tnLst>
-  </p:timing>
 </p:sld>
 </file>
 

</xml_diff>

<commit_message>
add more ppt that I have made
</commit_message>
<xml_diff>
--- a/PPT/End-to-End Training of Deep Visuomotor Policies.pptx
+++ b/PPT/End-to-End Training of Deep Visuomotor Policies.pptx
@@ -256,7 +256,7 @@
           <a:p>
             <a:fld id="{6E845154-4C3F-4C04-A10B-190F5E38AD72}" type="datetimeFigureOut">
               <a:rPr lang="zh-CN" altLang="en-US" smtClean="0"/>
-              <a:t>2017/12/19 Tuesday</a:t>
+              <a:t>2017/12/21 Thursday</a:t>
             </a:fld>
             <a:endParaRPr lang="zh-CN" altLang="en-US"/>
           </a:p>
@@ -426,7 +426,7 @@
           <a:p>
             <a:fld id="{6E845154-4C3F-4C04-A10B-190F5E38AD72}" type="datetimeFigureOut">
               <a:rPr lang="zh-CN" altLang="en-US" smtClean="0"/>
-              <a:t>2017/12/19 Tuesday</a:t>
+              <a:t>2017/12/21 Thursday</a:t>
             </a:fld>
             <a:endParaRPr lang="zh-CN" altLang="en-US"/>
           </a:p>
@@ -606,7 +606,7 @@
           <a:p>
             <a:fld id="{6E845154-4C3F-4C04-A10B-190F5E38AD72}" type="datetimeFigureOut">
               <a:rPr lang="zh-CN" altLang="en-US" smtClean="0"/>
-              <a:t>2017/12/19 Tuesday</a:t>
+              <a:t>2017/12/21 Thursday</a:t>
             </a:fld>
             <a:endParaRPr lang="zh-CN" altLang="en-US"/>
           </a:p>
@@ -776,7 +776,7 @@
           <a:p>
             <a:fld id="{6E845154-4C3F-4C04-A10B-190F5E38AD72}" type="datetimeFigureOut">
               <a:rPr lang="zh-CN" altLang="en-US" smtClean="0"/>
-              <a:t>2017/12/19 Tuesday</a:t>
+              <a:t>2017/12/21 Thursday</a:t>
             </a:fld>
             <a:endParaRPr lang="zh-CN" altLang="en-US"/>
           </a:p>
@@ -1022,7 +1022,7 @@
           <a:p>
             <a:fld id="{6E845154-4C3F-4C04-A10B-190F5E38AD72}" type="datetimeFigureOut">
               <a:rPr lang="zh-CN" altLang="en-US" smtClean="0"/>
-              <a:t>2017/12/19 Tuesday</a:t>
+              <a:t>2017/12/21 Thursday</a:t>
             </a:fld>
             <a:endParaRPr lang="zh-CN" altLang="en-US"/>
           </a:p>
@@ -1254,7 +1254,7 @@
           <a:p>
             <a:fld id="{6E845154-4C3F-4C04-A10B-190F5E38AD72}" type="datetimeFigureOut">
               <a:rPr lang="zh-CN" altLang="en-US" smtClean="0"/>
-              <a:t>2017/12/19 Tuesday</a:t>
+              <a:t>2017/12/21 Thursday</a:t>
             </a:fld>
             <a:endParaRPr lang="zh-CN" altLang="en-US"/>
           </a:p>
@@ -1621,7 +1621,7 @@
           <a:p>
             <a:fld id="{6E845154-4C3F-4C04-A10B-190F5E38AD72}" type="datetimeFigureOut">
               <a:rPr lang="zh-CN" altLang="en-US" smtClean="0"/>
-              <a:t>2017/12/19 Tuesday</a:t>
+              <a:t>2017/12/21 Thursday</a:t>
             </a:fld>
             <a:endParaRPr lang="zh-CN" altLang="en-US"/>
           </a:p>
@@ -1739,7 +1739,7 @@
           <a:p>
             <a:fld id="{6E845154-4C3F-4C04-A10B-190F5E38AD72}" type="datetimeFigureOut">
               <a:rPr lang="zh-CN" altLang="en-US" smtClean="0"/>
-              <a:t>2017/12/19 Tuesday</a:t>
+              <a:t>2017/12/21 Thursday</a:t>
             </a:fld>
             <a:endParaRPr lang="zh-CN" altLang="en-US"/>
           </a:p>
@@ -1834,7 +1834,7 @@
           <a:p>
             <a:fld id="{6E845154-4C3F-4C04-A10B-190F5E38AD72}" type="datetimeFigureOut">
               <a:rPr lang="zh-CN" altLang="en-US" smtClean="0"/>
-              <a:t>2017/12/19 Tuesday</a:t>
+              <a:t>2017/12/21 Thursday</a:t>
             </a:fld>
             <a:endParaRPr lang="zh-CN" altLang="en-US"/>
           </a:p>
@@ -2111,7 +2111,7 @@
           <a:p>
             <a:fld id="{6E845154-4C3F-4C04-A10B-190F5E38AD72}" type="datetimeFigureOut">
               <a:rPr lang="zh-CN" altLang="en-US" smtClean="0"/>
-              <a:t>2017/12/19 Tuesday</a:t>
+              <a:t>2017/12/21 Thursday</a:t>
             </a:fld>
             <a:endParaRPr lang="zh-CN" altLang="en-US"/>
           </a:p>
@@ -2364,7 +2364,7 @@
           <a:p>
             <a:fld id="{6E845154-4C3F-4C04-A10B-190F5E38AD72}" type="datetimeFigureOut">
               <a:rPr lang="zh-CN" altLang="en-US" smtClean="0"/>
-              <a:t>2017/12/19 Tuesday</a:t>
+              <a:t>2017/12/21 Thursday</a:t>
             </a:fld>
             <a:endParaRPr lang="zh-CN" altLang="en-US"/>
           </a:p>
@@ -2577,7 +2577,7 @@
           <a:p>
             <a:fld id="{6E845154-4C3F-4C04-A10B-190F5E38AD72}" type="datetimeFigureOut">
               <a:rPr lang="zh-CN" altLang="en-US" smtClean="0"/>
-              <a:t>2017/12/19 Tuesday</a:t>
+              <a:t>2017/12/21 Thursday</a:t>
             </a:fld>
             <a:endParaRPr lang="zh-CN" altLang="en-US"/>
           </a:p>
@@ -3226,7 +3226,7 @@
         </p:nvSpPr>
         <p:spPr>
           <a:xfrm>
-            <a:off x="5080959" y="1607318"/>
+            <a:off x="4806639" y="1607318"/>
             <a:ext cx="6323162" cy="4401205"/>
           </a:xfrm>
           <a:prstGeom prst="rect">
@@ -3840,20 +3840,21 @@
                 <a:latin typeface="Times New Roman" panose="02020603050405020304" pitchFamily="18" charset="0"/>
                 <a:cs typeface="Times New Roman" panose="02020603050405020304" pitchFamily="18" charset="0"/>
               </a:rPr>
-              <a:t>by the policy are shown in blue, while the feature points of the pose prediction</a:t>
-            </a:r>
-            <a:br>
+              <a:t>by the policy are shown in blue, while the feature points of the pose </a:t>
+            </a:r>
+            <a:r>
+              <a:rPr lang="en-US" altLang="zh-CN" sz="2000" dirty="0" smtClean="0">
+                <a:latin typeface="Times New Roman" panose="02020603050405020304" pitchFamily="18" charset="0"/>
+                <a:cs typeface="Times New Roman" panose="02020603050405020304" pitchFamily="18" charset="0"/>
+              </a:rPr>
+              <a:t>prediction network </a:t>
+            </a:r>
+            <a:r>
               <a:rPr lang="en-US" altLang="zh-CN" sz="2000" dirty="0">
                 <a:latin typeface="Times New Roman" panose="02020603050405020304" pitchFamily="18" charset="0"/>
                 <a:cs typeface="Times New Roman" panose="02020603050405020304" pitchFamily="18" charset="0"/>
               </a:rPr>
-            </a:br>
-            <a:r>
-              <a:rPr lang="en-US" altLang="zh-CN" sz="2000" dirty="0">
-                <a:latin typeface="Times New Roman" panose="02020603050405020304" pitchFamily="18" charset="0"/>
-                <a:cs typeface="Times New Roman" panose="02020603050405020304" pitchFamily="18" charset="0"/>
-              </a:rPr>
-              <a:t>network are shown in red. The end-to-end trained policy tends to discover more </a:t>
+              <a:t>are shown in red. The end-to-end trained policy tends to discover more </a:t>
             </a:r>
             <a:r>
               <a:rPr lang="en-US" altLang="zh-CN" sz="2000" dirty="0" smtClean="0">
@@ -4121,11 +4122,7 @@
             </a:r>
             <a:r>
               <a:rPr lang="en-US" altLang="zh-CN" sz="2000" dirty="0"/>
-              <a:t>, 2013a.</a:t>
-            </a:r>
-            <a:r>
-              <a:rPr lang="en-US" altLang="zh-CN" sz="2000" dirty="0"/>
-              <a:t> </a:t>
+              <a:t>, 2013a. </a:t>
             </a:r>
             <a:r>
               <a:rPr lang="en-US" altLang="zh-CN" sz="2000" dirty="0" smtClean="0"/>
@@ -4191,11 +4188,7 @@
             </a:r>
             <a:r>
               <a:rPr lang="en-US" altLang="zh-CN" sz="2000" dirty="0"/>
-              <a:t>, 2013b.</a:t>
-            </a:r>
-            <a:r>
-              <a:rPr lang="en-US" altLang="zh-CN" sz="2000" dirty="0"/>
-              <a:t> </a:t>
+              <a:t>, 2013b. </a:t>
             </a:r>
             <a:r>
               <a:rPr lang="en-US" altLang="zh-CN" sz="2000" dirty="0" smtClean="0"/>
@@ -4255,11 +4248,7 @@
             </a:r>
             <a:r>
               <a:rPr lang="en-US" altLang="zh-CN" sz="2000" dirty="0"/>
-              <a:t>, 2014.</a:t>
-            </a:r>
-            <a:r>
-              <a:rPr lang="en-US" altLang="zh-CN" sz="2000" dirty="0"/>
-              <a:t> </a:t>
+              <a:t>, 2014. </a:t>
             </a:r>
             <a:r>
               <a:rPr lang="en-US" altLang="zh-CN" sz="2000" dirty="0" smtClean="0"/>
@@ -4315,11 +4304,7 @@
             </a:r>
             <a:r>
               <a:rPr lang="en-US" altLang="zh-CN" sz="2000" dirty="0"/>
-              <a:t>, 2014.</a:t>
-            </a:r>
-            <a:r>
-              <a:rPr lang="en-US" altLang="zh-CN" sz="2000" dirty="0"/>
-              <a:t> </a:t>
+              <a:t>, 2014. </a:t>
             </a:r>
             <a:br>
               <a:rPr lang="en-US" altLang="zh-CN" sz="2000" dirty="0"/>
@@ -4389,11 +4374,7 @@
             </a:r>
             <a:r>
               <a:rPr lang="en-US" altLang="zh-CN" sz="2000" dirty="0"/>
-              <a:t>, 2015.</a:t>
-            </a:r>
-            <a:r>
-              <a:rPr lang="en-US" altLang="zh-CN" sz="2000" dirty="0"/>
-              <a:t> </a:t>
+              <a:t>, 2015. </a:t>
             </a:r>
             <a:endParaRPr lang="en-US" altLang="zh-CN" sz="2000" dirty="0" smtClean="0"/>
           </a:p>
@@ -4438,7 +4419,7 @@
         <p:spPr>
           <a:xfrm>
             <a:off x="764770" y="473822"/>
-            <a:ext cx="10881360" cy="5755422"/>
+            <a:ext cx="10881360" cy="6063198"/>
           </a:xfrm>
           <a:prstGeom prst="rect">
             <a:avLst/>
@@ -4508,8 +4489,25 @@
                 <a:latin typeface="Times New Roman" panose="02020603050405020304" pitchFamily="18" charset="0"/>
                 <a:cs typeface="Times New Roman" panose="02020603050405020304" pitchFamily="18" charset="0"/>
               </a:rPr>
-              <a:t>             model-free, it is guided by a model-based DDP alogrithm, which generate the guided samples.</a:t>
-            </a:r>
+              <a:t>             model-free, it is guided by a model-based DDP alogrithm, which generate the guided </a:t>
+            </a:r>
+            <a:endParaRPr lang="en-US" altLang="zh-CN" sz="2000" dirty="0" smtClean="0">
+              <a:latin typeface="Times New Roman" panose="02020603050405020304" pitchFamily="18" charset="0"/>
+              <a:cs typeface="Times New Roman" panose="02020603050405020304" pitchFamily="18" charset="0"/>
+            </a:endParaRPr>
+          </a:p>
+          <a:p>
+            <a:r>
+              <a:rPr lang="en-US" altLang="zh-CN" sz="2000" dirty="0" smtClean="0">
+                <a:latin typeface="Times New Roman" panose="02020603050405020304" pitchFamily="18" charset="0"/>
+                <a:cs typeface="Times New Roman" panose="02020603050405020304" pitchFamily="18" charset="0"/>
+              </a:rPr>
+              <a:t>              samples, and use importance sampling to incorporate the guiding samples.</a:t>
+            </a:r>
+            <a:endParaRPr lang="en-US" altLang="zh-CN" sz="2000" dirty="0" smtClean="0">
+              <a:latin typeface="Times New Roman" panose="02020603050405020304" pitchFamily="18" charset="0"/>
+              <a:cs typeface="Times New Roman" panose="02020603050405020304" pitchFamily="18" charset="0"/>
+            </a:endParaRPr>
           </a:p>
           <a:p>
             <a:r>
@@ -5806,7 +5804,7 @@
         </p:blipFill>
         <p:spPr>
           <a:xfrm>
-            <a:off x="776378" y="2410502"/>
+            <a:off x="776378" y="2767950"/>
             <a:ext cx="3400000" cy="2209524"/>
           </a:xfrm>
           <a:prstGeom prst="rect">
@@ -5822,7 +5820,7 @@
         </p:nvSpPr>
         <p:spPr>
           <a:xfrm>
-            <a:off x="5046452" y="1868076"/>
+            <a:off x="5071390" y="2682723"/>
             <a:ext cx="5865962" cy="3785652"/>
           </a:xfrm>
           <a:prstGeom prst="rect">
@@ -6120,6 +6118,30 @@
           </a:p>
         </p:txBody>
       </p:sp>
+      <p:pic>
+        <p:nvPicPr>
+          <p:cNvPr id="3" name="图片 2"/>
+          <p:cNvPicPr>
+            <a:picLocks noChangeAspect="1"/>
+          </p:cNvPicPr>
+          <p:nvPr/>
+        </p:nvPicPr>
+        <p:blipFill>
+          <a:blip r:embed="rId3"/>
+          <a:stretch>
+            <a:fillRect/>
+          </a:stretch>
+        </p:blipFill>
+        <p:spPr>
+          <a:xfrm>
+            <a:off x="5071390" y="2118013"/>
+            <a:ext cx="3447619" cy="400000"/>
+          </a:xfrm>
+          <a:prstGeom prst="rect">
+            <a:avLst/>
+          </a:prstGeom>
+        </p:spPr>
+      </p:pic>
     </p:spTree>
     <p:extLst>
       <p:ext uri="{BB962C8B-B14F-4D97-AF65-F5344CB8AC3E}">
@@ -6368,7 +6390,7 @@
       </p:pic>
       <p:pic>
         <p:nvPicPr>
-          <p:cNvPr id="11" name="图片 10"/>
+          <p:cNvPr id="2" name="图片 1"/>
           <p:cNvPicPr>
             <a:picLocks noChangeAspect="1"/>
           </p:cNvPicPr>
@@ -6382,8 +6404,8 @@
         </p:blipFill>
         <p:spPr>
           <a:xfrm>
-            <a:off x="1860945" y="1468281"/>
-            <a:ext cx="8228571" cy="466667"/>
+            <a:off x="770087" y="1498658"/>
+            <a:ext cx="5123809" cy="400000"/>
           </a:xfrm>
           <a:prstGeom prst="rect">
             <a:avLst/>

</xml_diff>

<commit_message>
add the deep visual Foresight
</commit_message>
<xml_diff>
--- a/PPT/End-to-End Training of Deep Visuomotor Policies.pptx
+++ b/PPT/End-to-End Training of Deep Visuomotor Policies.pptx
@@ -19,6 +19,13 @@
     <p:sldId id="265" r:id="rId13"/>
     <p:sldId id="266" r:id="rId14"/>
     <p:sldId id="267" r:id="rId15"/>
+    <p:sldId id="270" r:id="rId16"/>
+    <p:sldId id="271" r:id="rId17"/>
+    <p:sldId id="272" r:id="rId18"/>
+    <p:sldId id="273" r:id="rId19"/>
+    <p:sldId id="274" r:id="rId20"/>
+    <p:sldId id="275" r:id="rId21"/>
+    <p:sldId id="276" r:id="rId22"/>
   </p:sldIdLst>
   <p:sldSz cx="12192000" cy="6858000"/>
   <p:notesSz cx="6858000" cy="9144000"/>
@@ -256,7 +263,7 @@
           <a:p>
             <a:fld id="{6E845154-4C3F-4C04-A10B-190F5E38AD72}" type="datetimeFigureOut">
               <a:rPr lang="zh-CN" altLang="en-US" smtClean="0"/>
-              <a:t>2017/12/21 Thursday</a:t>
+              <a:t>2017/12/22 Friday</a:t>
             </a:fld>
             <a:endParaRPr lang="zh-CN" altLang="en-US"/>
           </a:p>
@@ -426,7 +433,7 @@
           <a:p>
             <a:fld id="{6E845154-4C3F-4C04-A10B-190F5E38AD72}" type="datetimeFigureOut">
               <a:rPr lang="zh-CN" altLang="en-US" smtClean="0"/>
-              <a:t>2017/12/21 Thursday</a:t>
+              <a:t>2017/12/22 Friday</a:t>
             </a:fld>
             <a:endParaRPr lang="zh-CN" altLang="en-US"/>
           </a:p>
@@ -606,7 +613,7 @@
           <a:p>
             <a:fld id="{6E845154-4C3F-4C04-A10B-190F5E38AD72}" type="datetimeFigureOut">
               <a:rPr lang="zh-CN" altLang="en-US" smtClean="0"/>
-              <a:t>2017/12/21 Thursday</a:t>
+              <a:t>2017/12/22 Friday</a:t>
             </a:fld>
             <a:endParaRPr lang="zh-CN" altLang="en-US"/>
           </a:p>
@@ -776,7 +783,7 @@
           <a:p>
             <a:fld id="{6E845154-4C3F-4C04-A10B-190F5E38AD72}" type="datetimeFigureOut">
               <a:rPr lang="zh-CN" altLang="en-US" smtClean="0"/>
-              <a:t>2017/12/21 Thursday</a:t>
+              <a:t>2017/12/22 Friday</a:t>
             </a:fld>
             <a:endParaRPr lang="zh-CN" altLang="en-US"/>
           </a:p>
@@ -1022,7 +1029,7 @@
           <a:p>
             <a:fld id="{6E845154-4C3F-4C04-A10B-190F5E38AD72}" type="datetimeFigureOut">
               <a:rPr lang="zh-CN" altLang="en-US" smtClean="0"/>
-              <a:t>2017/12/21 Thursday</a:t>
+              <a:t>2017/12/22 Friday</a:t>
             </a:fld>
             <a:endParaRPr lang="zh-CN" altLang="en-US"/>
           </a:p>
@@ -1254,7 +1261,7 @@
           <a:p>
             <a:fld id="{6E845154-4C3F-4C04-A10B-190F5E38AD72}" type="datetimeFigureOut">
               <a:rPr lang="zh-CN" altLang="en-US" smtClean="0"/>
-              <a:t>2017/12/21 Thursday</a:t>
+              <a:t>2017/12/22 Friday</a:t>
             </a:fld>
             <a:endParaRPr lang="zh-CN" altLang="en-US"/>
           </a:p>
@@ -1621,7 +1628,7 @@
           <a:p>
             <a:fld id="{6E845154-4C3F-4C04-A10B-190F5E38AD72}" type="datetimeFigureOut">
               <a:rPr lang="zh-CN" altLang="en-US" smtClean="0"/>
-              <a:t>2017/12/21 Thursday</a:t>
+              <a:t>2017/12/22 Friday</a:t>
             </a:fld>
             <a:endParaRPr lang="zh-CN" altLang="en-US"/>
           </a:p>
@@ -1739,7 +1746,7 @@
           <a:p>
             <a:fld id="{6E845154-4C3F-4C04-A10B-190F5E38AD72}" type="datetimeFigureOut">
               <a:rPr lang="zh-CN" altLang="en-US" smtClean="0"/>
-              <a:t>2017/12/21 Thursday</a:t>
+              <a:t>2017/12/22 Friday</a:t>
             </a:fld>
             <a:endParaRPr lang="zh-CN" altLang="en-US"/>
           </a:p>
@@ -1834,7 +1841,7 @@
           <a:p>
             <a:fld id="{6E845154-4C3F-4C04-A10B-190F5E38AD72}" type="datetimeFigureOut">
               <a:rPr lang="zh-CN" altLang="en-US" smtClean="0"/>
-              <a:t>2017/12/21 Thursday</a:t>
+              <a:t>2017/12/22 Friday</a:t>
             </a:fld>
             <a:endParaRPr lang="zh-CN" altLang="en-US"/>
           </a:p>
@@ -2111,7 +2118,7 @@
           <a:p>
             <a:fld id="{6E845154-4C3F-4C04-A10B-190F5E38AD72}" type="datetimeFigureOut">
               <a:rPr lang="zh-CN" altLang="en-US" smtClean="0"/>
-              <a:t>2017/12/21 Thursday</a:t>
+              <a:t>2017/12/22 Friday</a:t>
             </a:fld>
             <a:endParaRPr lang="zh-CN" altLang="en-US"/>
           </a:p>
@@ -2364,7 +2371,7 @@
           <a:p>
             <a:fld id="{6E845154-4C3F-4C04-A10B-190F5E38AD72}" type="datetimeFigureOut">
               <a:rPr lang="zh-CN" altLang="en-US" smtClean="0"/>
-              <a:t>2017/12/21 Thursday</a:t>
+              <a:t>2017/12/22 Friday</a:t>
             </a:fld>
             <a:endParaRPr lang="zh-CN" altLang="en-US"/>
           </a:p>
@@ -2577,7 +2584,7 @@
           <a:p>
             <a:fld id="{6E845154-4C3F-4C04-A10B-190F5E38AD72}" type="datetimeFigureOut">
               <a:rPr lang="zh-CN" altLang="en-US" smtClean="0"/>
-              <a:t>2017/12/21 Thursday</a:t>
+              <a:t>2017/12/22 Friday</a:t>
             </a:fld>
             <a:endParaRPr lang="zh-CN" altLang="en-US"/>
           </a:p>
@@ -4002,6 +4009,2363 @@
 </p:sld>
 </file>
 
+<file path=ppt/slides/slide15.xml><?xml version="1.0" encoding="utf-8"?>
+<p:sld xmlns:a="http://schemas.openxmlformats.org/drawingml/2006/main" xmlns:r="http://schemas.openxmlformats.org/officeDocument/2006/relationships" xmlns:p="http://schemas.openxmlformats.org/presentationml/2006/main">
+  <p:cSld>
+    <p:spTree>
+      <p:nvGrpSpPr>
+        <p:cNvPr id="1" name=""/>
+        <p:cNvGrpSpPr/>
+        <p:nvPr/>
+      </p:nvGrpSpPr>
+      <p:grpSpPr>
+        <a:xfrm>
+          <a:off x="0" y="0"/>
+          <a:ext cx="0" cy="0"/>
+          <a:chOff x="0" y="0"/>
+          <a:chExt cx="0" cy="0"/>
+        </a:xfrm>
+      </p:grpSpPr>
+      <p:sp>
+        <p:nvSpPr>
+          <p:cNvPr id="4" name="文本框 3"/>
+          <p:cNvSpPr txBox="1"/>
+          <p:nvPr/>
+        </p:nvSpPr>
+        <p:spPr>
+          <a:xfrm>
+            <a:off x="1662545" y="2427316"/>
+            <a:ext cx="8844742" cy="1323439"/>
+          </a:xfrm>
+          <a:prstGeom prst="rect">
+            <a:avLst/>
+          </a:prstGeom>
+          <a:noFill/>
+        </p:spPr>
+        <p:txBody>
+          <a:bodyPr wrap="square" rtlCol="0">
+            <a:spAutoFit/>
+          </a:bodyPr>
+          <a:lstStyle/>
+          <a:p>
+            <a:r>
+              <a:rPr lang="en-US" altLang="zh-CN" sz="2800" b="1" smtClean="0">
+                <a:latin typeface="Times New Roman" panose="02020603050405020304" pitchFamily="18" charset="0"/>
+                <a:cs typeface="Times New Roman" panose="02020603050405020304" pitchFamily="18" charset="0"/>
+              </a:rPr>
+              <a:t>      Deep </a:t>
+            </a:r>
+            <a:r>
+              <a:rPr lang="en-US" altLang="zh-CN" sz="2800" b="1">
+                <a:latin typeface="Times New Roman" panose="02020603050405020304" pitchFamily="18" charset="0"/>
+                <a:cs typeface="Times New Roman" panose="02020603050405020304" pitchFamily="18" charset="0"/>
+              </a:rPr>
+              <a:t>Visual Foresight for Planning </a:t>
+            </a:r>
+            <a:r>
+              <a:rPr lang="en-US" altLang="zh-CN" sz="2800" b="1">
+                <a:latin typeface="Times New Roman" panose="02020603050405020304" pitchFamily="18" charset="0"/>
+                <a:cs typeface="Times New Roman" panose="02020603050405020304" pitchFamily="18" charset="0"/>
+              </a:rPr>
+              <a:t>Robot </a:t>
+            </a:r>
+            <a:r>
+              <a:rPr lang="en-US" altLang="zh-CN" sz="2800" b="1" smtClean="0">
+                <a:latin typeface="Times New Roman" panose="02020603050405020304" pitchFamily="18" charset="0"/>
+                <a:cs typeface="Times New Roman" panose="02020603050405020304" pitchFamily="18" charset="0"/>
+              </a:rPr>
+              <a:t>Motion</a:t>
+            </a:r>
+          </a:p>
+          <a:p>
+            <a:endParaRPr lang="en-US" altLang="zh-CN" sz="2800" b="1">
+              <a:latin typeface="Times New Roman" panose="02020603050405020304" pitchFamily="18" charset="0"/>
+              <a:cs typeface="Times New Roman" panose="02020603050405020304" pitchFamily="18" charset="0"/>
+            </a:endParaRPr>
+          </a:p>
+          <a:p>
+            <a:pPr algn="ctr"/>
+            <a:r>
+              <a:rPr lang="en-US" altLang="zh-CN" sz="2400">
+                <a:latin typeface="Times New Roman" panose="02020603050405020304" pitchFamily="18" charset="0"/>
+                <a:cs typeface="Times New Roman" panose="02020603050405020304" pitchFamily="18" charset="0"/>
+              </a:rPr>
+              <a:t>Chelsea </a:t>
+            </a:r>
+            <a:r>
+              <a:rPr lang="en-US" altLang="zh-CN" sz="2400" smtClean="0">
+                <a:latin typeface="Times New Roman" panose="02020603050405020304" pitchFamily="18" charset="0"/>
+                <a:cs typeface="Times New Roman" panose="02020603050405020304" pitchFamily="18" charset="0"/>
+              </a:rPr>
+              <a:t>Finn  </a:t>
+            </a:r>
+            <a:r>
+              <a:rPr lang="en-US" altLang="zh-CN" sz="2400">
+                <a:latin typeface="Times New Roman" panose="02020603050405020304" pitchFamily="18" charset="0"/>
+                <a:cs typeface="Times New Roman" panose="02020603050405020304" pitchFamily="18" charset="0"/>
+              </a:rPr>
+              <a:t>and </a:t>
+            </a:r>
+            <a:r>
+              <a:rPr lang="en-US" altLang="zh-CN" sz="2400">
+                <a:latin typeface="Times New Roman" panose="02020603050405020304" pitchFamily="18" charset="0"/>
+                <a:cs typeface="Times New Roman" panose="02020603050405020304" pitchFamily="18" charset="0"/>
+              </a:rPr>
+              <a:t>Sergey </a:t>
+            </a:r>
+            <a:r>
+              <a:rPr lang="en-US" altLang="zh-CN" sz="2400" smtClean="0">
+                <a:latin typeface="Times New Roman" panose="02020603050405020304" pitchFamily="18" charset="0"/>
+                <a:cs typeface="Times New Roman" panose="02020603050405020304" pitchFamily="18" charset="0"/>
+              </a:rPr>
+              <a:t>Levine</a:t>
+            </a:r>
+            <a:endParaRPr lang="zh-CN" altLang="en-US" sz="2400">
+              <a:latin typeface="Times New Roman" panose="02020603050405020304" pitchFamily="18" charset="0"/>
+              <a:cs typeface="Times New Roman" panose="02020603050405020304" pitchFamily="18" charset="0"/>
+            </a:endParaRPr>
+          </a:p>
+        </p:txBody>
+      </p:sp>
+    </p:spTree>
+    <p:extLst>
+      <p:ext uri="{BB962C8B-B14F-4D97-AF65-F5344CB8AC3E}">
+        <p14:creationId xmlns:p14="http://schemas.microsoft.com/office/powerpoint/2010/main" val="265786947"/>
+      </p:ext>
+    </p:extLst>
+  </p:cSld>
+  <p:clrMapOvr>
+    <a:masterClrMapping/>
+  </p:clrMapOvr>
+</p:sld>
+</file>
+
+<file path=ppt/slides/slide16.xml><?xml version="1.0" encoding="utf-8"?>
+<p:sld xmlns:a="http://schemas.openxmlformats.org/drawingml/2006/main" xmlns:r="http://schemas.openxmlformats.org/officeDocument/2006/relationships" xmlns:p="http://schemas.openxmlformats.org/presentationml/2006/main">
+  <p:cSld>
+    <p:spTree>
+      <p:nvGrpSpPr>
+        <p:cNvPr id="1" name=""/>
+        <p:cNvGrpSpPr/>
+        <p:nvPr/>
+      </p:nvGrpSpPr>
+      <p:grpSpPr>
+        <a:xfrm>
+          <a:off x="0" y="0"/>
+          <a:ext cx="0" cy="0"/>
+          <a:chOff x="0" y="0"/>
+          <a:chExt cx="0" cy="0"/>
+        </a:xfrm>
+      </p:grpSpPr>
+      <p:sp>
+        <p:nvSpPr>
+          <p:cNvPr id="4" name="文本框 3"/>
+          <p:cNvSpPr txBox="1"/>
+          <p:nvPr/>
+        </p:nvSpPr>
+        <p:spPr>
+          <a:xfrm>
+            <a:off x="955964" y="4421413"/>
+            <a:ext cx="10099963" cy="2369880"/>
+          </a:xfrm>
+          <a:prstGeom prst="rect">
+            <a:avLst/>
+          </a:prstGeom>
+          <a:noFill/>
+        </p:spPr>
+        <p:txBody>
+          <a:bodyPr wrap="square" rtlCol="0">
+            <a:spAutoFit/>
+          </a:bodyPr>
+          <a:lstStyle/>
+          <a:p>
+            <a:r>
+              <a:rPr lang="en-US" altLang="zh-CN" sz="2400" b="1" smtClean="0">
+                <a:latin typeface="Times New Roman" panose="02020603050405020304" pitchFamily="18" charset="0"/>
+                <a:cs typeface="Times New Roman" panose="02020603050405020304" pitchFamily="18" charset="0"/>
+              </a:rPr>
+              <a:t>The paper’s work: </a:t>
+            </a:r>
+            <a:r>
+              <a:rPr lang="en-US" altLang="zh-CN" sz="2000" smtClean="0">
+                <a:latin typeface="Times New Roman" panose="02020603050405020304" pitchFamily="18" charset="0"/>
+                <a:cs typeface="Times New Roman" panose="02020603050405020304" pitchFamily="18" charset="0"/>
+              </a:rPr>
+              <a:t>present </a:t>
+            </a:r>
+            <a:r>
+              <a:rPr lang="en-US" altLang="zh-CN" sz="2000">
+                <a:latin typeface="Times New Roman" panose="02020603050405020304" pitchFamily="18" charset="0"/>
+                <a:cs typeface="Times New Roman" panose="02020603050405020304" pitchFamily="18" charset="0"/>
+              </a:rPr>
+              <a:t>an MPC algorithm </a:t>
+            </a:r>
+            <a:r>
+              <a:rPr lang="en-US" altLang="zh-CN" sz="2000">
+                <a:latin typeface="Times New Roman" panose="02020603050405020304" pitchFamily="18" charset="0"/>
+                <a:cs typeface="Times New Roman" panose="02020603050405020304" pitchFamily="18" charset="0"/>
+              </a:rPr>
+              <a:t>based </a:t>
+            </a:r>
+            <a:r>
+              <a:rPr lang="en-US" altLang="zh-CN" sz="2000" smtClean="0">
+                <a:latin typeface="Times New Roman" panose="02020603050405020304" pitchFamily="18" charset="0"/>
+                <a:cs typeface="Times New Roman" panose="02020603050405020304" pitchFamily="18" charset="0"/>
+              </a:rPr>
+              <a:t>on probabilistic </a:t>
+            </a:r>
+            <a:r>
+              <a:rPr lang="en-US" altLang="zh-CN" sz="2000">
+                <a:latin typeface="Times New Roman" panose="02020603050405020304" pitchFamily="18" charset="0"/>
+                <a:cs typeface="Times New Roman" panose="02020603050405020304" pitchFamily="18" charset="0"/>
+              </a:rPr>
+              <a:t>inference through a learned </a:t>
+            </a:r>
+            <a:r>
+              <a:rPr lang="en-US" altLang="zh-CN" sz="2000">
+                <a:latin typeface="Times New Roman" panose="02020603050405020304" pitchFamily="18" charset="0"/>
+                <a:cs typeface="Times New Roman" panose="02020603050405020304" pitchFamily="18" charset="0"/>
+              </a:rPr>
+              <a:t>predictive </a:t>
+            </a:r>
+            <a:r>
+              <a:rPr lang="en-US" altLang="zh-CN" sz="2000" smtClean="0">
+                <a:latin typeface="Times New Roman" panose="02020603050405020304" pitchFamily="18" charset="0"/>
+                <a:cs typeface="Times New Roman" panose="02020603050405020304" pitchFamily="18" charset="0"/>
+              </a:rPr>
+              <a:t>image model that allows </a:t>
+            </a:r>
+            <a:r>
+              <a:rPr lang="en-US" altLang="zh-CN" sz="2000">
+                <a:latin typeface="Times New Roman" panose="02020603050405020304" pitchFamily="18" charset="0"/>
+                <a:cs typeface="Times New Roman" panose="02020603050405020304" pitchFamily="18" charset="0"/>
+              </a:rPr>
+              <a:t>a robot to plan for actions </a:t>
+            </a:r>
+            <a:r>
+              <a:rPr lang="en-US" altLang="zh-CN" sz="2000">
+                <a:latin typeface="Times New Roman" panose="02020603050405020304" pitchFamily="18" charset="0"/>
+                <a:cs typeface="Times New Roman" panose="02020603050405020304" pitchFamily="18" charset="0"/>
+              </a:rPr>
+              <a:t>that </a:t>
+            </a:r>
+            <a:r>
+              <a:rPr lang="en-US" altLang="zh-CN" sz="2000" smtClean="0">
+                <a:latin typeface="Times New Roman" panose="02020603050405020304" pitchFamily="18" charset="0"/>
+                <a:cs typeface="Times New Roman" panose="02020603050405020304" pitchFamily="18" charset="0"/>
+              </a:rPr>
+              <a:t>move user-specified </a:t>
+            </a:r>
+            <a:r>
+              <a:rPr lang="en-US" altLang="zh-CN" sz="2000">
+                <a:latin typeface="Times New Roman" panose="02020603050405020304" pitchFamily="18" charset="0"/>
+                <a:cs typeface="Times New Roman" panose="02020603050405020304" pitchFamily="18" charset="0"/>
+              </a:rPr>
+              <a:t>objects in the environment </a:t>
+            </a:r>
+            <a:r>
+              <a:rPr lang="en-US" altLang="zh-CN" sz="2000">
+                <a:latin typeface="Times New Roman" panose="02020603050405020304" pitchFamily="18" charset="0"/>
+                <a:cs typeface="Times New Roman" panose="02020603050405020304" pitchFamily="18" charset="0"/>
+              </a:rPr>
+              <a:t>to </a:t>
+            </a:r>
+            <a:r>
+              <a:rPr lang="en-US" altLang="zh-CN" sz="2000" smtClean="0">
+                <a:latin typeface="Times New Roman" panose="02020603050405020304" pitchFamily="18" charset="0"/>
+                <a:cs typeface="Times New Roman" panose="02020603050405020304" pitchFamily="18" charset="0"/>
+              </a:rPr>
+              <a:t>user-defined locations</a:t>
+            </a:r>
+            <a:r>
+              <a:rPr lang="en-US" altLang="zh-CN" sz="2000">
+                <a:latin typeface="Times New Roman" panose="02020603050405020304" pitchFamily="18" charset="0"/>
+                <a:cs typeface="Times New Roman" panose="02020603050405020304" pitchFamily="18" charset="0"/>
+              </a:rPr>
+              <a:t>. </a:t>
+            </a:r>
+            <a:endParaRPr lang="en-US" altLang="zh-CN" sz="2000" smtClean="0">
+              <a:latin typeface="Times New Roman" panose="02020603050405020304" pitchFamily="18" charset="0"/>
+              <a:cs typeface="Times New Roman" panose="02020603050405020304" pitchFamily="18" charset="0"/>
+            </a:endParaRPr>
+          </a:p>
+          <a:p>
+            <a:endParaRPr lang="en-US" altLang="zh-CN" sz="2000">
+              <a:latin typeface="Times New Roman" panose="02020603050405020304" pitchFamily="18" charset="0"/>
+              <a:cs typeface="Times New Roman" panose="02020603050405020304" pitchFamily="18" charset="0"/>
+            </a:endParaRPr>
+          </a:p>
+          <a:p>
+            <a:r>
+              <a:rPr lang="en-US" altLang="zh-CN" sz="2000" smtClean="0">
+                <a:latin typeface="Times New Roman" panose="02020603050405020304" pitchFamily="18" charset="0"/>
+                <a:cs typeface="Times New Roman" panose="02020603050405020304" pitchFamily="18" charset="0"/>
+              </a:rPr>
+              <a:t>It </a:t>
+            </a:r>
+            <a:r>
+              <a:rPr lang="en-US" altLang="zh-CN" sz="2000">
+                <a:latin typeface="Times New Roman" panose="02020603050405020304" pitchFamily="18" charset="0"/>
+                <a:cs typeface="Times New Roman" panose="02020603050405020304" pitchFamily="18" charset="0"/>
+              </a:rPr>
+              <a:t>is the first instance of robotic </a:t>
+            </a:r>
+            <a:r>
+              <a:rPr lang="en-US" altLang="zh-CN" sz="2000">
+                <a:latin typeface="Times New Roman" panose="02020603050405020304" pitchFamily="18" charset="0"/>
+                <a:cs typeface="Times New Roman" panose="02020603050405020304" pitchFamily="18" charset="0"/>
+              </a:rPr>
+              <a:t>manipulation </a:t>
+            </a:r>
+            <a:r>
+              <a:rPr lang="en-US" altLang="zh-CN" sz="2000" smtClean="0">
+                <a:latin typeface="Times New Roman" panose="02020603050405020304" pitchFamily="18" charset="0"/>
+                <a:cs typeface="Times New Roman" panose="02020603050405020304" pitchFamily="18" charset="0"/>
+              </a:rPr>
+              <a:t>using learned </a:t>
+            </a:r>
+            <a:r>
+              <a:rPr lang="en-US" altLang="zh-CN" sz="2000">
+                <a:latin typeface="Times New Roman" panose="02020603050405020304" pitchFamily="18" charset="0"/>
+                <a:cs typeface="Times New Roman" panose="02020603050405020304" pitchFamily="18" charset="0"/>
+              </a:rPr>
+              <a:t>predictive video models with generalization </a:t>
+            </a:r>
+            <a:r>
+              <a:rPr lang="en-US" altLang="zh-CN" sz="2000">
+                <a:latin typeface="Times New Roman" panose="02020603050405020304" pitchFamily="18" charset="0"/>
+                <a:cs typeface="Times New Roman" panose="02020603050405020304" pitchFamily="18" charset="0"/>
+              </a:rPr>
+              <a:t>to </a:t>
+            </a:r>
+            <a:r>
+              <a:rPr lang="en-US" altLang="zh-CN" sz="2000" smtClean="0">
+                <a:latin typeface="Times New Roman" panose="02020603050405020304" pitchFamily="18" charset="0"/>
+                <a:cs typeface="Times New Roman" panose="02020603050405020304" pitchFamily="18" charset="0"/>
+              </a:rPr>
+              <a:t>new, previously </a:t>
+            </a:r>
+            <a:r>
+              <a:rPr lang="en-US" altLang="zh-CN" sz="2000">
+                <a:latin typeface="Times New Roman" panose="02020603050405020304" pitchFamily="18" charset="0"/>
+                <a:cs typeface="Times New Roman" panose="02020603050405020304" pitchFamily="18" charset="0"/>
+              </a:rPr>
+              <a:t>unseen objects</a:t>
+            </a:r>
+            <a:r>
+              <a:rPr lang="en-US" altLang="zh-CN" sz="2000">
+                <a:latin typeface="Times New Roman" panose="02020603050405020304" pitchFamily="18" charset="0"/>
+                <a:cs typeface="Times New Roman" panose="02020603050405020304" pitchFamily="18" charset="0"/>
+              </a:rPr>
+              <a:t> </a:t>
+            </a:r>
+            <a:r>
+              <a:rPr lang="en-US" altLang="zh-CN" sz="2400"/>
+              <a:t/>
+            </a:r>
+            <a:br>
+              <a:rPr lang="en-US" altLang="zh-CN" sz="2400"/>
+            </a:br>
+            <a:endParaRPr lang="zh-CN" altLang="en-US" sz="2400">
+              <a:latin typeface="Times New Roman" panose="02020603050405020304" pitchFamily="18" charset="0"/>
+              <a:cs typeface="Times New Roman" panose="02020603050405020304" pitchFamily="18" charset="0"/>
+            </a:endParaRPr>
+          </a:p>
+        </p:txBody>
+      </p:sp>
+      <p:pic>
+        <p:nvPicPr>
+          <p:cNvPr id="5" name="图片 4"/>
+          <p:cNvPicPr>
+            <a:picLocks noChangeAspect="1"/>
+          </p:cNvPicPr>
+          <p:nvPr/>
+        </p:nvPicPr>
+        <p:blipFill>
+          <a:blip r:embed="rId2"/>
+          <a:stretch>
+            <a:fillRect/>
+          </a:stretch>
+        </p:blipFill>
+        <p:spPr>
+          <a:xfrm>
+            <a:off x="3336352" y="346170"/>
+            <a:ext cx="5619048" cy="3838095"/>
+          </a:xfrm>
+          <a:prstGeom prst="rect">
+            <a:avLst/>
+          </a:prstGeom>
+        </p:spPr>
+      </p:pic>
+    </p:spTree>
+    <p:extLst>
+      <p:ext uri="{BB962C8B-B14F-4D97-AF65-F5344CB8AC3E}">
+        <p14:creationId xmlns:p14="http://schemas.microsoft.com/office/powerpoint/2010/main" val="479478811"/>
+      </p:ext>
+    </p:extLst>
+  </p:cSld>
+  <p:clrMapOvr>
+    <a:masterClrMapping/>
+  </p:clrMapOvr>
+</p:sld>
+</file>
+
+<file path=ppt/slides/slide17.xml><?xml version="1.0" encoding="utf-8"?>
+<p:sld xmlns:a="http://schemas.openxmlformats.org/drawingml/2006/main" xmlns:r="http://schemas.openxmlformats.org/officeDocument/2006/relationships" xmlns:p="http://schemas.openxmlformats.org/presentationml/2006/main">
+  <p:cSld>
+    <p:spTree>
+      <p:nvGrpSpPr>
+        <p:cNvPr id="1" name=""/>
+        <p:cNvGrpSpPr/>
+        <p:nvPr/>
+      </p:nvGrpSpPr>
+      <p:grpSpPr>
+        <a:xfrm>
+          <a:off x="0" y="0"/>
+          <a:ext cx="0" cy="0"/>
+          <a:chOff x="0" y="0"/>
+          <a:chExt cx="0" cy="0"/>
+        </a:xfrm>
+      </p:grpSpPr>
+      <p:pic>
+        <p:nvPicPr>
+          <p:cNvPr id="4" name="图片 3"/>
+          <p:cNvPicPr>
+            <a:picLocks noChangeAspect="1"/>
+          </p:cNvPicPr>
+          <p:nvPr/>
+        </p:nvPicPr>
+        <p:blipFill>
+          <a:blip r:embed="rId2"/>
+          <a:stretch>
+            <a:fillRect/>
+          </a:stretch>
+        </p:blipFill>
+        <p:spPr>
+          <a:xfrm>
+            <a:off x="713753" y="363982"/>
+            <a:ext cx="10847619" cy="4800000"/>
+          </a:xfrm>
+          <a:prstGeom prst="rect">
+            <a:avLst/>
+          </a:prstGeom>
+        </p:spPr>
+      </p:pic>
+      <p:sp>
+        <p:nvSpPr>
+          <p:cNvPr id="5" name="文本框 4"/>
+          <p:cNvSpPr txBox="1"/>
+          <p:nvPr/>
+        </p:nvSpPr>
+        <p:spPr>
+          <a:xfrm>
+            <a:off x="817416" y="5536277"/>
+            <a:ext cx="10640291" cy="646331"/>
+          </a:xfrm>
+          <a:prstGeom prst="rect">
+            <a:avLst/>
+          </a:prstGeom>
+          <a:noFill/>
+        </p:spPr>
+        <p:txBody>
+          <a:bodyPr wrap="square" rtlCol="0">
+            <a:spAutoFit/>
+          </a:bodyPr>
+          <a:lstStyle/>
+          <a:p>
+            <a:r>
+              <a:rPr lang="en-US" altLang="zh-CN" smtClean="0">
+                <a:latin typeface="Times New Roman" panose="02020603050405020304" pitchFamily="18" charset="0"/>
+                <a:cs typeface="Times New Roman" panose="02020603050405020304" pitchFamily="18" charset="0"/>
+              </a:rPr>
+              <a:t>Inputs: I</a:t>
+            </a:r>
+            <a:r>
+              <a:rPr lang="en-US" altLang="zh-CN" sz="1400" smtClean="0">
+                <a:latin typeface="Times New Roman" panose="02020603050405020304" pitchFamily="18" charset="0"/>
+                <a:cs typeface="Times New Roman" panose="02020603050405020304" pitchFamily="18" charset="0"/>
+              </a:rPr>
+              <a:t>0:1(</a:t>
+            </a:r>
+            <a:r>
+              <a:rPr lang="en-US" altLang="zh-CN" sz="1400">
+                <a:latin typeface="Times New Roman" panose="02020603050405020304" pitchFamily="18" charset="0"/>
+                <a:cs typeface="Times New Roman" panose="02020603050405020304" pitchFamily="18" charset="0"/>
+              </a:rPr>
+              <a:t>the current and previous </a:t>
+            </a:r>
+            <a:r>
+              <a:rPr lang="en-US" altLang="zh-CN" sz="1400">
+                <a:latin typeface="Times New Roman" panose="02020603050405020304" pitchFamily="18" charset="0"/>
+                <a:cs typeface="Times New Roman" panose="02020603050405020304" pitchFamily="18" charset="0"/>
+              </a:rPr>
+              <a:t>images</a:t>
+            </a:r>
+            <a:r>
+              <a:rPr lang="en-US" altLang="zh-CN" sz="1400" smtClean="0">
+                <a:latin typeface="Times New Roman" panose="02020603050405020304" pitchFamily="18" charset="0"/>
+                <a:cs typeface="Times New Roman" panose="02020603050405020304" pitchFamily="18" charset="0"/>
+              </a:rPr>
+              <a:t>) + </a:t>
+            </a:r>
+            <a:r>
+              <a:rPr lang="en-US" altLang="zh-CN" b="1" smtClean="0">
+                <a:latin typeface="Times New Roman" panose="02020603050405020304" pitchFamily="18" charset="0"/>
+                <a:cs typeface="Times New Roman" panose="02020603050405020304" pitchFamily="18" charset="0"/>
+              </a:rPr>
+              <a:t>x</a:t>
+            </a:r>
+            <a:r>
+              <a:rPr lang="en-US" altLang="zh-CN" sz="1400" smtClean="0">
+                <a:latin typeface="Times New Roman" panose="02020603050405020304" pitchFamily="18" charset="0"/>
+                <a:cs typeface="Times New Roman" panose="02020603050405020304" pitchFamily="18" charset="0"/>
+              </a:rPr>
+              <a:t>0:1(</a:t>
+            </a:r>
+            <a:r>
+              <a:rPr lang="en-US" altLang="zh-CN" sz="1400"/>
+              <a:t>current and previous end-effector </a:t>
+            </a:r>
+            <a:r>
+              <a:rPr lang="en-US" altLang="zh-CN" sz="1400"/>
+              <a:t>poses </a:t>
+            </a:r>
+            <a:r>
+              <a:rPr lang="en-US" altLang="zh-CN" sz="1400" smtClean="0">
+                <a:latin typeface="Times New Roman" panose="02020603050405020304" pitchFamily="18" charset="0"/>
+                <a:cs typeface="Times New Roman" panose="02020603050405020304" pitchFamily="18" charset="0"/>
+              </a:rPr>
+              <a:t>) + </a:t>
+            </a:r>
+            <a:r>
+              <a:rPr lang="en-US" altLang="zh-CN" b="1" smtClean="0"/>
+              <a:t>a</a:t>
+            </a:r>
+            <a:r>
+              <a:rPr lang="en-US" altLang="zh-CN" sz="1400" smtClean="0"/>
+              <a:t>1:</a:t>
+            </a:r>
+            <a:r>
+              <a:rPr lang="en-US" altLang="zh-CN" sz="1400" i="1" smtClean="0"/>
+              <a:t>Hp(</a:t>
+            </a:r>
+            <a:r>
+              <a:rPr lang="en-US" altLang="zh-CN" sz="1400"/>
+              <a:t>a sequence of </a:t>
+            </a:r>
+            <a:r>
+              <a:rPr lang="en-US" altLang="zh-CN" sz="1400"/>
+              <a:t>future </a:t>
+            </a:r>
+            <a:r>
+              <a:rPr lang="en-US" altLang="zh-CN" sz="1400" smtClean="0"/>
+              <a:t>commands</a:t>
+            </a:r>
+            <a:r>
+              <a:rPr lang="en-US" altLang="zh-CN" sz="1400" i="1" smtClean="0"/>
+              <a:t>)</a:t>
+            </a:r>
+          </a:p>
+          <a:p>
+            <a:r>
+              <a:rPr lang="en-US" altLang="zh-CN" smtClean="0">
+                <a:latin typeface="Times New Roman" panose="02020603050405020304" pitchFamily="18" charset="0"/>
+                <a:cs typeface="Times New Roman" panose="02020603050405020304" pitchFamily="18" charset="0"/>
+              </a:rPr>
+              <a:t>Outputs: a </a:t>
+            </a:r>
+            <a:r>
+              <a:rPr lang="en-US" altLang="zh-CN">
+                <a:latin typeface="Times New Roman" panose="02020603050405020304" pitchFamily="18" charset="0"/>
+                <a:cs typeface="Times New Roman" panose="02020603050405020304" pitchFamily="18" charset="0"/>
+              </a:rPr>
+              <a:t>distribution over the </a:t>
+            </a:r>
+            <a:r>
+              <a:rPr lang="en-US" altLang="zh-CN">
+                <a:latin typeface="Times New Roman" panose="02020603050405020304" pitchFamily="18" charset="0"/>
+                <a:cs typeface="Times New Roman" panose="02020603050405020304" pitchFamily="18" charset="0"/>
+              </a:rPr>
+              <a:t>sequence </a:t>
+            </a:r>
+            <a:r>
+              <a:rPr lang="en-US" altLang="zh-CN" smtClean="0">
+                <a:latin typeface="Times New Roman" panose="02020603050405020304" pitchFamily="18" charset="0"/>
+                <a:cs typeface="Times New Roman" panose="02020603050405020304" pitchFamily="18" charset="0"/>
+              </a:rPr>
+              <a:t>of future </a:t>
+            </a:r>
+            <a:r>
+              <a:rPr lang="en-US" altLang="zh-CN">
+                <a:latin typeface="Times New Roman" panose="02020603050405020304" pitchFamily="18" charset="0"/>
+                <a:cs typeface="Times New Roman" panose="02020603050405020304" pitchFamily="18" charset="0"/>
+              </a:rPr>
+              <a:t>image </a:t>
+            </a:r>
+            <a:r>
+              <a:rPr lang="en-US" altLang="zh-CN">
+                <a:latin typeface="Times New Roman" panose="02020603050405020304" pitchFamily="18" charset="0"/>
+                <a:cs typeface="Times New Roman" panose="02020603050405020304" pitchFamily="18" charset="0"/>
+              </a:rPr>
+              <a:t>frames </a:t>
+            </a:r>
+            <a:r>
+              <a:rPr lang="en-US" altLang="zh-CN" smtClean="0">
+                <a:latin typeface="Times New Roman" panose="02020603050405020304" pitchFamily="18" charset="0"/>
+                <a:cs typeface="Times New Roman" panose="02020603050405020304" pitchFamily="18" charset="0"/>
+              </a:rPr>
+              <a:t>I</a:t>
+            </a:r>
+            <a:r>
+              <a:rPr lang="en-US" altLang="zh-CN" sz="1400" smtClean="0">
+                <a:latin typeface="Times New Roman" panose="02020603050405020304" pitchFamily="18" charset="0"/>
+                <a:cs typeface="Times New Roman" panose="02020603050405020304" pitchFamily="18" charset="0"/>
+              </a:rPr>
+              <a:t>2:Hp+1</a:t>
+            </a:r>
+            <a:endParaRPr lang="en-US" altLang="zh-CN" sz="1400">
+              <a:latin typeface="Times New Roman" panose="02020603050405020304" pitchFamily="18" charset="0"/>
+              <a:cs typeface="Times New Roman" panose="02020603050405020304" pitchFamily="18" charset="0"/>
+            </a:endParaRPr>
+          </a:p>
+        </p:txBody>
+      </p:sp>
+    </p:spTree>
+    <p:extLst>
+      <p:ext uri="{BB962C8B-B14F-4D97-AF65-F5344CB8AC3E}">
+        <p14:creationId xmlns:p14="http://schemas.microsoft.com/office/powerpoint/2010/main" val="3625846538"/>
+      </p:ext>
+    </p:extLst>
+  </p:cSld>
+  <p:clrMapOvr>
+    <a:masterClrMapping/>
+  </p:clrMapOvr>
+</p:sld>
+</file>
+
+<file path=ppt/slides/slide18.xml><?xml version="1.0" encoding="utf-8"?>
+<p:sld xmlns:a="http://schemas.openxmlformats.org/drawingml/2006/main" xmlns:r="http://schemas.openxmlformats.org/officeDocument/2006/relationships" xmlns:p="http://schemas.openxmlformats.org/presentationml/2006/main">
+  <p:cSld>
+    <p:spTree>
+      <p:nvGrpSpPr>
+        <p:cNvPr id="1" name=""/>
+        <p:cNvGrpSpPr/>
+        <p:nvPr/>
+      </p:nvGrpSpPr>
+      <p:grpSpPr>
+        <a:xfrm>
+          <a:off x="0" y="0"/>
+          <a:ext cx="0" cy="0"/>
+          <a:chOff x="0" y="0"/>
+          <a:chExt cx="0" cy="0"/>
+        </a:xfrm>
+      </p:grpSpPr>
+      <p:sp>
+        <p:nvSpPr>
+          <p:cNvPr id="4" name="文本框 3"/>
+          <p:cNvSpPr txBox="1"/>
+          <p:nvPr/>
+        </p:nvSpPr>
+        <p:spPr>
+          <a:xfrm>
+            <a:off x="764771" y="839586"/>
+            <a:ext cx="10731731" cy="5355312"/>
+          </a:xfrm>
+          <a:prstGeom prst="rect">
+            <a:avLst/>
+          </a:prstGeom>
+          <a:noFill/>
+        </p:spPr>
+        <p:txBody>
+          <a:bodyPr wrap="square" rtlCol="0">
+            <a:spAutoFit/>
+          </a:bodyPr>
+          <a:lstStyle/>
+          <a:p>
+            <a:r>
+              <a:rPr lang="en-US" altLang="zh-CN" smtClean="0">
+                <a:latin typeface="Times New Roman" panose="02020603050405020304" pitchFamily="18" charset="0"/>
+                <a:cs typeface="Times New Roman" panose="02020603050405020304" pitchFamily="18" charset="0"/>
+              </a:rPr>
+              <a:t>The </a:t>
+            </a:r>
+            <a:r>
+              <a:rPr lang="en-US" altLang="zh-CN">
+                <a:latin typeface="Times New Roman" panose="02020603050405020304" pitchFamily="18" charset="0"/>
+                <a:cs typeface="Times New Roman" panose="02020603050405020304" pitchFamily="18" charset="0"/>
+              </a:rPr>
+              <a:t>model is trained </a:t>
+            </a:r>
+            <a:r>
+              <a:rPr lang="en-US" altLang="zh-CN">
+                <a:latin typeface="Times New Roman" panose="02020603050405020304" pitchFamily="18" charset="0"/>
+                <a:cs typeface="Times New Roman" panose="02020603050405020304" pitchFamily="18" charset="0"/>
+              </a:rPr>
+              <a:t>with </a:t>
+            </a:r>
+            <a:r>
+              <a:rPr lang="en-US" altLang="zh-CN" smtClean="0">
+                <a:latin typeface="Times New Roman" panose="02020603050405020304" pitchFamily="18" charset="0"/>
+                <a:cs typeface="Times New Roman" panose="02020603050405020304" pitchFamily="18" charset="0"/>
+              </a:rPr>
+              <a:t>maximum likelihood</a:t>
+            </a:r>
+            <a:r>
+              <a:rPr lang="en-US" altLang="zh-CN">
+                <a:latin typeface="Times New Roman" panose="02020603050405020304" pitchFamily="18" charset="0"/>
+                <a:cs typeface="Times New Roman" panose="02020603050405020304" pitchFamily="18" charset="0"/>
+              </a:rPr>
+              <a:t>, which results in a mean squared </a:t>
+            </a:r>
+            <a:r>
+              <a:rPr lang="en-US" altLang="zh-CN">
+                <a:latin typeface="Times New Roman" panose="02020603050405020304" pitchFamily="18" charset="0"/>
+                <a:cs typeface="Times New Roman" panose="02020603050405020304" pitchFamily="18" charset="0"/>
+              </a:rPr>
+              <a:t>error </a:t>
+            </a:r>
+            <a:r>
+              <a:rPr lang="en-US" altLang="zh-CN" smtClean="0">
+                <a:latin typeface="Times New Roman" panose="02020603050405020304" pitchFamily="18" charset="0"/>
+                <a:cs typeface="Times New Roman" panose="02020603050405020304" pitchFamily="18" charset="0"/>
+              </a:rPr>
+              <a:t>objective. We </a:t>
+            </a:r>
+            <a:r>
+              <a:rPr lang="en-US" altLang="zh-CN">
+                <a:latin typeface="Times New Roman" panose="02020603050405020304" pitchFamily="18" charset="0"/>
+                <a:cs typeface="Times New Roman" panose="02020603050405020304" pitchFamily="18" charset="0"/>
+              </a:rPr>
+              <a:t>can therefore express the model </a:t>
+            </a:r>
+            <a:r>
+              <a:rPr lang="en-US" altLang="zh-CN">
+                <a:latin typeface="Times New Roman" panose="02020603050405020304" pitchFamily="18" charset="0"/>
+                <a:cs typeface="Times New Roman" panose="02020603050405020304" pitchFamily="18" charset="0"/>
+              </a:rPr>
+              <a:t>probabilistically </a:t>
+            </a:r>
+            <a:r>
+              <a:rPr lang="en-US" altLang="zh-CN" smtClean="0">
+                <a:latin typeface="Times New Roman" panose="02020603050405020304" pitchFamily="18" charset="0"/>
+                <a:cs typeface="Times New Roman" panose="02020603050405020304" pitchFamily="18" charset="0"/>
+              </a:rPr>
+              <a:t>as : </a:t>
+            </a:r>
+            <a:r>
+              <a:rPr lang="en-US" altLang="zh-CN"/>
+              <a:t/>
+            </a:r>
+            <a:br>
+              <a:rPr lang="en-US" altLang="zh-CN"/>
+            </a:br>
+            <a:endParaRPr lang="en-US" altLang="zh-CN" smtClean="0"/>
+          </a:p>
+          <a:p>
+            <a:endParaRPr lang="en-US" altLang="zh-CN"/>
+          </a:p>
+          <a:p>
+            <a:r>
+              <a:rPr lang="en-US" altLang="zh-CN">
+                <a:latin typeface="Times New Roman" panose="02020603050405020304" pitchFamily="18" charset="0"/>
+                <a:cs typeface="Times New Roman" panose="02020603050405020304" pitchFamily="18" charset="0"/>
+              </a:rPr>
+              <a:t>The flow map </a:t>
+            </a:r>
+            <a:r>
+              <a:rPr lang="en-US" altLang="zh-CN" i="1">
+                <a:latin typeface="Times New Roman" panose="02020603050405020304" pitchFamily="18" charset="0"/>
+                <a:cs typeface="Times New Roman" panose="02020603050405020304" pitchFamily="18" charset="0"/>
+              </a:rPr>
+              <a:t>F</a:t>
+            </a:r>
+            <a:r>
+              <a:rPr lang="en-US" altLang="zh-CN">
+                <a:latin typeface="Times New Roman" panose="02020603050405020304" pitchFamily="18" charset="0"/>
+                <a:cs typeface="Times New Roman" panose="02020603050405020304" pitchFamily="18" charset="0"/>
+              </a:rPr>
+              <a:t>ˆ</a:t>
+            </a:r>
+            <a:r>
+              <a:rPr lang="en-US" altLang="zh-CN" i="1">
+                <a:latin typeface="Times New Roman" panose="02020603050405020304" pitchFamily="18" charset="0"/>
+                <a:cs typeface="Times New Roman" panose="02020603050405020304" pitchFamily="18" charset="0"/>
+              </a:rPr>
+              <a:t>t</a:t>
+            </a:r>
+            <a:r>
+              <a:rPr lang="en-US" altLang="zh-CN">
+                <a:latin typeface="Times New Roman" panose="02020603050405020304" pitchFamily="18" charset="0"/>
+                <a:cs typeface="Times New Roman" panose="02020603050405020304" pitchFamily="18" charset="0"/>
+              </a:rPr>
+              <a:t>(</a:t>
+            </a:r>
+            <a:r>
+              <a:rPr lang="en-US" altLang="zh-CN" i="1">
+                <a:latin typeface="Times New Roman" panose="02020603050405020304" pitchFamily="18" charset="0"/>
+                <a:cs typeface="Times New Roman" panose="02020603050405020304" pitchFamily="18" charset="0"/>
+              </a:rPr>
+              <a:t>x;y;k;l</a:t>
+            </a:r>
+            <a:r>
+              <a:rPr lang="en-US" altLang="zh-CN">
+                <a:latin typeface="Times New Roman" panose="02020603050405020304" pitchFamily="18" charset="0"/>
+                <a:cs typeface="Times New Roman" panose="02020603050405020304" pitchFamily="18" charset="0"/>
+              </a:rPr>
+              <a:t>) </a:t>
+            </a:r>
+            <a:r>
+              <a:rPr lang="en-US" altLang="zh-CN" smtClean="0">
+                <a:latin typeface="Times New Roman" panose="02020603050405020304" pitchFamily="18" charset="0"/>
+                <a:cs typeface="Times New Roman" panose="02020603050405020304" pitchFamily="18" charset="0"/>
+              </a:rPr>
+              <a:t>denotes the </a:t>
+            </a:r>
+            <a:r>
+              <a:rPr lang="en-US" altLang="zh-CN">
+                <a:latin typeface="Times New Roman" panose="02020603050405020304" pitchFamily="18" charset="0"/>
+                <a:cs typeface="Times New Roman" panose="02020603050405020304" pitchFamily="18" charset="0"/>
+              </a:rPr>
+              <a:t>probability of pixel (</a:t>
+            </a:r>
+            <a:r>
+              <a:rPr lang="en-US" altLang="zh-CN" i="1">
+                <a:latin typeface="Times New Roman" panose="02020603050405020304" pitchFamily="18" charset="0"/>
+                <a:cs typeface="Times New Roman" panose="02020603050405020304" pitchFamily="18" charset="0"/>
+              </a:rPr>
+              <a:t>k;l</a:t>
+            </a:r>
+            <a:r>
+              <a:rPr lang="en-US" altLang="zh-CN">
+                <a:latin typeface="Times New Roman" panose="02020603050405020304" pitchFamily="18" charset="0"/>
+                <a:cs typeface="Times New Roman" panose="02020603050405020304" pitchFamily="18" charset="0"/>
+              </a:rPr>
+              <a:t>) at time </a:t>
+            </a:r>
+            <a:r>
+              <a:rPr lang="en-US" altLang="zh-CN" i="1">
+                <a:latin typeface="Times New Roman" panose="02020603050405020304" pitchFamily="18" charset="0"/>
+                <a:cs typeface="Times New Roman" panose="02020603050405020304" pitchFamily="18" charset="0"/>
+              </a:rPr>
+              <a:t>t </a:t>
+            </a:r>
+            <a:r>
+              <a:rPr lang="en-US" altLang="zh-CN">
+                <a:latin typeface="Times New Roman" panose="02020603050405020304" pitchFamily="18" charset="0"/>
+                <a:cs typeface="Times New Roman" panose="02020603050405020304" pitchFamily="18" charset="0"/>
+              </a:rPr>
+              <a:t>+ 1 </a:t>
+            </a:r>
+            <a:r>
+              <a:rPr lang="en-US" altLang="zh-CN">
+                <a:latin typeface="Times New Roman" panose="02020603050405020304" pitchFamily="18" charset="0"/>
+                <a:cs typeface="Times New Roman" panose="02020603050405020304" pitchFamily="18" charset="0"/>
+              </a:rPr>
+              <a:t>originating </a:t>
+            </a:r>
+            <a:r>
+              <a:rPr lang="en-US" altLang="zh-CN" smtClean="0">
+                <a:latin typeface="Times New Roman" panose="02020603050405020304" pitchFamily="18" charset="0"/>
+                <a:cs typeface="Times New Roman" panose="02020603050405020304" pitchFamily="18" charset="0"/>
+              </a:rPr>
+              <a:t>from location </a:t>
+            </a:r>
+            <a:r>
+              <a:rPr lang="en-US" altLang="zh-CN">
+                <a:latin typeface="Times New Roman" panose="02020603050405020304" pitchFamily="18" charset="0"/>
+                <a:cs typeface="Times New Roman" panose="02020603050405020304" pitchFamily="18" charset="0"/>
+              </a:rPr>
+              <a:t>(</a:t>
+            </a:r>
+            <a:r>
+              <a:rPr lang="en-US" altLang="zh-CN" i="1">
+                <a:latin typeface="Times New Roman" panose="02020603050405020304" pitchFamily="18" charset="0"/>
+                <a:cs typeface="Times New Roman" panose="02020603050405020304" pitchFamily="18" charset="0"/>
+              </a:rPr>
+              <a:t>x;y</a:t>
+            </a:r>
+            <a:r>
+              <a:rPr lang="en-US" altLang="zh-CN">
+                <a:latin typeface="Times New Roman" panose="02020603050405020304" pitchFamily="18" charset="0"/>
+                <a:cs typeface="Times New Roman" panose="02020603050405020304" pitchFamily="18" charset="0"/>
+              </a:rPr>
+              <a:t>) at time </a:t>
+            </a:r>
+            <a:r>
+              <a:rPr lang="en-US" altLang="zh-CN" i="1">
+                <a:latin typeface="Times New Roman" panose="02020603050405020304" pitchFamily="18" charset="0"/>
+                <a:cs typeface="Times New Roman" panose="02020603050405020304" pitchFamily="18" charset="0"/>
+              </a:rPr>
+              <a:t>t</a:t>
+            </a:r>
+            <a:r>
+              <a:rPr lang="en-US" altLang="zh-CN">
+                <a:latin typeface="Times New Roman" panose="02020603050405020304" pitchFamily="18" charset="0"/>
+                <a:cs typeface="Times New Roman" panose="02020603050405020304" pitchFamily="18" charset="0"/>
+              </a:rPr>
+              <a:t>, and is given by the </a:t>
+            </a:r>
+            <a:r>
+              <a:rPr lang="en-US" altLang="zh-CN">
+                <a:latin typeface="Times New Roman" panose="02020603050405020304" pitchFamily="18" charset="0"/>
+                <a:cs typeface="Times New Roman" panose="02020603050405020304" pitchFamily="18" charset="0"/>
+              </a:rPr>
+              <a:t>following</a:t>
+            </a:r>
+            <a:r>
+              <a:rPr lang="en-US" altLang="zh-CN">
+                <a:latin typeface="Times New Roman" panose="02020603050405020304" pitchFamily="18" charset="0"/>
+                <a:cs typeface="Times New Roman" panose="02020603050405020304" pitchFamily="18" charset="0"/>
+              </a:rPr>
+              <a:t> </a:t>
+            </a:r>
+            <a:r>
+              <a:rPr lang="en-US" altLang="zh-CN" smtClean="0">
+                <a:latin typeface="Times New Roman" panose="02020603050405020304" pitchFamily="18" charset="0"/>
+                <a:cs typeface="Times New Roman" panose="02020603050405020304" pitchFamily="18" charset="0"/>
+              </a:rPr>
+              <a:t>:</a:t>
+            </a:r>
+          </a:p>
+          <a:p>
+            <a:r>
+              <a:rPr lang="en-US" altLang="zh-CN"/>
+              <a:t> </a:t>
+            </a:r>
+            <a:r>
+              <a:rPr lang="en-US" altLang="zh-CN" smtClean="0"/>
+              <a:t>                                                       </a:t>
+            </a:r>
+            <a:r>
+              <a:rPr lang="en-US" altLang="zh-CN"/>
+              <a:t/>
+            </a:r>
+            <a:br>
+              <a:rPr lang="en-US" altLang="zh-CN"/>
+            </a:br>
+            <a:endParaRPr lang="en-US" altLang="zh-CN" smtClean="0"/>
+          </a:p>
+          <a:p>
+            <a:r>
+              <a:rPr lang="en-US" altLang="zh-CN">
+                <a:latin typeface="Times New Roman" panose="02020603050405020304" pitchFamily="18" charset="0"/>
+                <a:cs typeface="Times New Roman" panose="02020603050405020304" pitchFamily="18" charset="0"/>
+              </a:rPr>
+              <a:t>The model can then output a prediction for the </a:t>
+            </a:r>
+            <a:r>
+              <a:rPr lang="en-US" altLang="zh-CN">
+                <a:latin typeface="Times New Roman" panose="02020603050405020304" pitchFamily="18" charset="0"/>
+                <a:cs typeface="Times New Roman" panose="02020603050405020304" pitchFamily="18" charset="0"/>
+              </a:rPr>
+              <a:t>mean </a:t>
+            </a:r>
+            <a:r>
+              <a:rPr lang="en-US" altLang="zh-CN" smtClean="0">
+                <a:latin typeface="Times New Roman" panose="02020603050405020304" pitchFamily="18" charset="0"/>
+                <a:cs typeface="Times New Roman" panose="02020603050405020304" pitchFamily="18" charset="0"/>
+              </a:rPr>
+              <a:t>of the </a:t>
+            </a:r>
+            <a:r>
+              <a:rPr lang="en-US" altLang="zh-CN">
+                <a:latin typeface="Times New Roman" panose="02020603050405020304" pitchFamily="18" charset="0"/>
+                <a:cs typeface="Times New Roman" panose="02020603050405020304" pitchFamily="18" charset="0"/>
+              </a:rPr>
+              <a:t>distribution over the next image, which we denote Iˆ</a:t>
+            </a:r>
+            <a:r>
+              <a:rPr lang="en-US" altLang="zh-CN">
+                <a:latin typeface="Times New Roman" panose="02020603050405020304" pitchFamily="18" charset="0"/>
+                <a:cs typeface="Times New Roman" panose="02020603050405020304" pitchFamily="18" charset="0"/>
+              </a:rPr>
+              <a:t>t+1</a:t>
+            </a:r>
+            <a:r>
+              <a:rPr lang="en-US" altLang="zh-CN" smtClean="0">
+                <a:latin typeface="Times New Roman" panose="02020603050405020304" pitchFamily="18" charset="0"/>
+                <a:cs typeface="Times New Roman" panose="02020603050405020304" pitchFamily="18" charset="0"/>
+              </a:rPr>
+              <a:t>, </a:t>
+            </a:r>
+            <a:r>
+              <a:rPr lang="en-US" altLang="zh-CN">
+                <a:latin typeface="Times New Roman" panose="02020603050405020304" pitchFamily="18" charset="0"/>
+                <a:cs typeface="Times New Roman" panose="02020603050405020304" pitchFamily="18" charset="0"/>
+              </a:rPr>
+              <a:t>according to the following equation:</a:t>
+            </a:r>
+            <a:r>
+              <a:rPr lang="en-US" altLang="zh-CN">
+                <a:latin typeface="Times New Roman" panose="02020603050405020304" pitchFamily="18" charset="0"/>
+                <a:cs typeface="Times New Roman" panose="02020603050405020304" pitchFamily="18" charset="0"/>
+              </a:rPr>
+              <a:t> </a:t>
+            </a:r>
+            <a:r>
+              <a:rPr lang="en-US" altLang="zh-CN"/>
+              <a:t/>
+            </a:r>
+            <a:br>
+              <a:rPr lang="en-US" altLang="zh-CN"/>
+            </a:br>
+            <a:r>
+              <a:rPr lang="en-US" altLang="zh-CN" smtClean="0"/>
+              <a:t>                       </a:t>
+            </a:r>
+          </a:p>
+          <a:p>
+            <a:endParaRPr lang="en-US" altLang="zh-CN"/>
+          </a:p>
+          <a:p>
+            <a:endParaRPr lang="en-US" altLang="zh-CN"/>
+          </a:p>
+          <a:p>
+            <a:r>
+              <a:rPr lang="en-US" altLang="zh-CN">
+                <a:latin typeface="Times New Roman" panose="02020603050405020304" pitchFamily="18" charset="0"/>
+                <a:cs typeface="Times New Roman" panose="02020603050405020304" pitchFamily="18" charset="0"/>
+              </a:rPr>
+              <a:t>For convenience, we will use </a:t>
+            </a:r>
+            <a:r>
+              <a:rPr lang="en-US" altLang="zh-CN" i="1">
+                <a:latin typeface="Times New Roman" panose="02020603050405020304" pitchFamily="18" charset="0"/>
+                <a:cs typeface="Times New Roman" panose="02020603050405020304" pitchFamily="18" charset="0"/>
+              </a:rPr>
+              <a:t>M</a:t>
+            </a:r>
+            <a:r>
+              <a:rPr lang="en-US" altLang="zh-CN">
+                <a:latin typeface="Times New Roman" panose="02020603050405020304" pitchFamily="18" charset="0"/>
+                <a:cs typeface="Times New Roman" panose="02020603050405020304" pitchFamily="18" charset="0"/>
+              </a:rPr>
+              <a:t>(</a:t>
+            </a:r>
+            <a:r>
+              <a:rPr lang="en-US" altLang="zh-CN" i="1">
+                <a:latin typeface="Times New Roman" panose="02020603050405020304" pitchFamily="18" charset="0"/>
+                <a:cs typeface="Times New Roman" panose="02020603050405020304" pitchFamily="18" charset="0"/>
+              </a:rPr>
+              <a:t>It-</a:t>
+            </a:r>
+            <a:r>
+              <a:rPr lang="en-US" altLang="zh-CN">
+                <a:latin typeface="Times New Roman" panose="02020603050405020304" pitchFamily="18" charset="0"/>
+                <a:cs typeface="Times New Roman" panose="02020603050405020304" pitchFamily="18" charset="0"/>
+              </a:rPr>
+              <a:t>1:</a:t>
+            </a:r>
+            <a:r>
+              <a:rPr lang="en-US" altLang="zh-CN" i="1">
+                <a:latin typeface="Times New Roman" panose="02020603050405020304" pitchFamily="18" charset="0"/>
+                <a:cs typeface="Times New Roman" panose="02020603050405020304" pitchFamily="18" charset="0"/>
+              </a:rPr>
+              <a:t>t;</a:t>
+            </a:r>
+            <a:r>
+              <a:rPr lang="en-US" altLang="zh-CN" b="1">
+                <a:latin typeface="Times New Roman" panose="02020603050405020304" pitchFamily="18" charset="0"/>
+                <a:cs typeface="Times New Roman" panose="02020603050405020304" pitchFamily="18" charset="0"/>
+              </a:rPr>
+              <a:t>x</a:t>
+            </a:r>
+            <a:r>
+              <a:rPr lang="en-US" altLang="zh-CN" i="1">
+                <a:latin typeface="Times New Roman" panose="02020603050405020304" pitchFamily="18" charset="0"/>
+                <a:cs typeface="Times New Roman" panose="02020603050405020304" pitchFamily="18" charset="0"/>
+              </a:rPr>
+              <a:t>t-</a:t>
+            </a:r>
+            <a:r>
+              <a:rPr lang="en-US" altLang="zh-CN">
+                <a:latin typeface="Times New Roman" panose="02020603050405020304" pitchFamily="18" charset="0"/>
+                <a:cs typeface="Times New Roman" panose="02020603050405020304" pitchFamily="18" charset="0"/>
+              </a:rPr>
+              <a:t>1:</a:t>
+            </a:r>
+            <a:r>
+              <a:rPr lang="en-US" altLang="zh-CN" i="1">
+                <a:latin typeface="Times New Roman" panose="02020603050405020304" pitchFamily="18" charset="0"/>
+                <a:cs typeface="Times New Roman" panose="02020603050405020304" pitchFamily="18" charset="0"/>
+              </a:rPr>
+              <a:t>t;</a:t>
+            </a:r>
+            <a:r>
+              <a:rPr lang="en-US" altLang="zh-CN" b="1">
+                <a:latin typeface="Times New Roman" panose="02020603050405020304" pitchFamily="18" charset="0"/>
+                <a:cs typeface="Times New Roman" panose="02020603050405020304" pitchFamily="18" charset="0"/>
+              </a:rPr>
+              <a:t>a</a:t>
+            </a:r>
+            <a:r>
+              <a:rPr lang="en-US" altLang="zh-CN" i="1">
+                <a:latin typeface="Times New Roman" panose="02020603050405020304" pitchFamily="18" charset="0"/>
+                <a:cs typeface="Times New Roman" panose="02020603050405020304" pitchFamily="18" charset="0"/>
+              </a:rPr>
+              <a:t>t</a:t>
+            </a:r>
+            <a:r>
+              <a:rPr lang="en-US" altLang="zh-CN">
+                <a:latin typeface="Times New Roman" panose="02020603050405020304" pitchFamily="18" charset="0"/>
+                <a:cs typeface="Times New Roman" panose="02020603050405020304" pitchFamily="18" charset="0"/>
+              </a:rPr>
+              <a:t>:</a:t>
+            </a:r>
+            <a:r>
+              <a:rPr lang="en-US" altLang="zh-CN" i="1">
+                <a:latin typeface="Times New Roman" panose="02020603050405020304" pitchFamily="18" charset="0"/>
+                <a:cs typeface="Times New Roman" panose="02020603050405020304" pitchFamily="18" charset="0"/>
+              </a:rPr>
+              <a:t>H</a:t>
+            </a:r>
+            <a:r>
+              <a:rPr lang="en-US" altLang="zh-CN">
+                <a:latin typeface="Times New Roman" panose="02020603050405020304" pitchFamily="18" charset="0"/>
+                <a:cs typeface="Times New Roman" panose="02020603050405020304" pitchFamily="18" charset="0"/>
+              </a:rPr>
+              <a:t>) </a:t>
+            </a:r>
+            <a:r>
+              <a:rPr lang="en-US" altLang="zh-CN" smtClean="0">
+                <a:latin typeface="Times New Roman" panose="02020603050405020304" pitchFamily="18" charset="0"/>
+                <a:cs typeface="Times New Roman" panose="02020603050405020304" pitchFamily="18" charset="0"/>
+              </a:rPr>
+              <a:t>= </a:t>
+            </a:r>
+            <a:r>
+              <a:rPr lang="en-US" altLang="zh-CN" i="1" smtClean="0">
+                <a:latin typeface="Times New Roman" panose="02020603050405020304" pitchFamily="18" charset="0"/>
+                <a:cs typeface="Times New Roman" panose="02020603050405020304" pitchFamily="18" charset="0"/>
+              </a:rPr>
+              <a:t>F</a:t>
+            </a:r>
+            <a:r>
+              <a:rPr lang="en-US" altLang="zh-CN">
+                <a:latin typeface="Times New Roman" panose="02020603050405020304" pitchFamily="18" charset="0"/>
+                <a:cs typeface="Times New Roman" panose="02020603050405020304" pitchFamily="18" charset="0"/>
+              </a:rPr>
+              <a:t>ˆ</a:t>
+            </a:r>
+            <a:r>
+              <a:rPr lang="en-US" altLang="zh-CN" i="1">
+                <a:latin typeface="Times New Roman" panose="02020603050405020304" pitchFamily="18" charset="0"/>
+                <a:cs typeface="Times New Roman" panose="02020603050405020304" pitchFamily="18" charset="0"/>
+              </a:rPr>
+              <a:t>t</a:t>
+            </a:r>
+            <a:r>
+              <a:rPr lang="en-US" altLang="zh-CN">
+                <a:latin typeface="Times New Roman" panose="02020603050405020304" pitchFamily="18" charset="0"/>
+                <a:cs typeface="Times New Roman" panose="02020603050405020304" pitchFamily="18" charset="0"/>
+              </a:rPr>
+              <a:t>:</a:t>
+            </a:r>
+            <a:r>
+              <a:rPr lang="en-US" altLang="zh-CN" i="1">
+                <a:latin typeface="Times New Roman" panose="02020603050405020304" pitchFamily="18" charset="0"/>
+                <a:cs typeface="Times New Roman" panose="02020603050405020304" pitchFamily="18" charset="0"/>
+              </a:rPr>
+              <a:t>H </a:t>
+            </a:r>
+            <a:r>
+              <a:rPr lang="en-US" altLang="zh-CN">
+                <a:latin typeface="Times New Roman" panose="02020603050405020304" pitchFamily="18" charset="0"/>
+                <a:cs typeface="Times New Roman" panose="02020603050405020304" pitchFamily="18" charset="0"/>
+              </a:rPr>
+              <a:t>to denote the function that uses the learned model to</a:t>
+            </a:r>
+            <a:br>
+              <a:rPr lang="en-US" altLang="zh-CN">
+                <a:latin typeface="Times New Roman" panose="02020603050405020304" pitchFamily="18" charset="0"/>
+                <a:cs typeface="Times New Roman" panose="02020603050405020304" pitchFamily="18" charset="0"/>
+              </a:rPr>
+            </a:br>
+            <a:r>
+              <a:rPr lang="en-US" altLang="zh-CN">
+                <a:latin typeface="Times New Roman" panose="02020603050405020304" pitchFamily="18" charset="0"/>
+                <a:cs typeface="Times New Roman" panose="02020603050405020304" pitchFamily="18" charset="0"/>
+              </a:rPr>
+              <a:t>output a sequence of flows conditioned on pairs </a:t>
+            </a:r>
+            <a:r>
+              <a:rPr lang="en-US" altLang="zh-CN">
+                <a:latin typeface="Times New Roman" panose="02020603050405020304" pitchFamily="18" charset="0"/>
+                <a:cs typeface="Times New Roman" panose="02020603050405020304" pitchFamily="18" charset="0"/>
+              </a:rPr>
+              <a:t>of </a:t>
+            </a:r>
+            <a:r>
+              <a:rPr lang="en-US" altLang="zh-CN" smtClean="0">
+                <a:latin typeface="Times New Roman" panose="02020603050405020304" pitchFamily="18" charset="0"/>
+                <a:cs typeface="Times New Roman" panose="02020603050405020304" pitchFamily="18" charset="0"/>
+              </a:rPr>
+              <a:t>images and </a:t>
+            </a:r>
+            <a:r>
+              <a:rPr lang="en-US" altLang="zh-CN">
+                <a:latin typeface="Times New Roman" panose="02020603050405020304" pitchFamily="18" charset="0"/>
+                <a:cs typeface="Times New Roman" panose="02020603050405020304" pitchFamily="18" charset="0"/>
+              </a:rPr>
+              <a:t>states, as well as a sequence of future actions, </a:t>
+            </a:r>
+            <a:r>
+              <a:rPr lang="en-US" altLang="zh-CN">
+                <a:latin typeface="Times New Roman" panose="02020603050405020304" pitchFamily="18" charset="0"/>
+                <a:cs typeface="Times New Roman" panose="02020603050405020304" pitchFamily="18" charset="0"/>
+              </a:rPr>
+              <a:t>for </a:t>
+            </a:r>
+            <a:r>
+              <a:rPr lang="en-US" altLang="zh-CN" smtClean="0">
+                <a:latin typeface="Times New Roman" panose="02020603050405020304" pitchFamily="18" charset="0"/>
+                <a:cs typeface="Times New Roman" panose="02020603050405020304" pitchFamily="18" charset="0"/>
+              </a:rPr>
+              <a:t>some horizon </a:t>
+            </a:r>
+            <a:r>
+              <a:rPr lang="en-US" altLang="zh-CN" i="1">
+                <a:latin typeface="Times New Roman" panose="02020603050405020304" pitchFamily="18" charset="0"/>
+                <a:cs typeface="Times New Roman" panose="02020603050405020304" pitchFamily="18" charset="0"/>
+              </a:rPr>
+              <a:t>H</a:t>
+            </a:r>
+            <a:r>
+              <a:rPr lang="en-US" altLang="zh-CN">
+                <a:latin typeface="Times New Roman" panose="02020603050405020304" pitchFamily="18" charset="0"/>
+                <a:cs typeface="Times New Roman" panose="02020603050405020304" pitchFamily="18" charset="0"/>
+              </a:rPr>
+              <a:t>.</a:t>
+            </a:r>
+            <a:r>
+              <a:rPr lang="en-US" altLang="zh-CN">
+                <a:latin typeface="Times New Roman" panose="02020603050405020304" pitchFamily="18" charset="0"/>
+                <a:cs typeface="Times New Roman" panose="02020603050405020304" pitchFamily="18" charset="0"/>
+              </a:rPr>
+              <a:t> </a:t>
+            </a:r>
+            <a:r>
+              <a:rPr lang="en-US" altLang="zh-CN">
+                <a:latin typeface="Times New Roman" panose="02020603050405020304" pitchFamily="18" charset="0"/>
+                <a:cs typeface="Times New Roman" panose="02020603050405020304" pitchFamily="18" charset="0"/>
+              </a:rPr>
+              <a:t>We can therefore define the </a:t>
+            </a:r>
+            <a:r>
+              <a:rPr lang="en-US" altLang="zh-CN">
+                <a:latin typeface="Times New Roman" panose="02020603050405020304" pitchFamily="18" charset="0"/>
+                <a:cs typeface="Times New Roman" panose="02020603050405020304" pitchFamily="18" charset="0"/>
+              </a:rPr>
+              <a:t>predicted </a:t>
+            </a:r>
+            <a:r>
+              <a:rPr lang="en-US" altLang="zh-CN" smtClean="0">
+                <a:latin typeface="Times New Roman" panose="02020603050405020304" pitchFamily="18" charset="0"/>
+                <a:cs typeface="Times New Roman" panose="02020603050405020304" pitchFamily="18" charset="0"/>
+              </a:rPr>
+              <a:t>image distribution </a:t>
+            </a:r>
+            <a:r>
+              <a:rPr lang="en-US" altLang="zh-CN">
+                <a:latin typeface="Times New Roman" panose="02020603050405020304" pitchFamily="18" charset="0"/>
+                <a:cs typeface="Times New Roman" panose="02020603050405020304" pitchFamily="18" charset="0"/>
+              </a:rPr>
+              <a:t>as</a:t>
+            </a:r>
+            <a:r>
+              <a:rPr lang="en-US" altLang="zh-CN">
+                <a:latin typeface="Times New Roman" panose="02020603050405020304" pitchFamily="18" charset="0"/>
+                <a:cs typeface="Times New Roman" panose="02020603050405020304" pitchFamily="18" charset="0"/>
+              </a:rPr>
+              <a:t> </a:t>
+            </a:r>
+            <a:r>
+              <a:rPr lang="en-US" altLang="zh-CN" smtClean="0">
+                <a:latin typeface="Times New Roman" panose="02020603050405020304" pitchFamily="18" charset="0"/>
+                <a:cs typeface="Times New Roman" panose="02020603050405020304" pitchFamily="18" charset="0"/>
+              </a:rPr>
+              <a:t>:</a:t>
+            </a:r>
+            <a:r>
+              <a:rPr lang="en-US" altLang="zh-CN"/>
+              <a:t/>
+            </a:r>
+            <a:br>
+              <a:rPr lang="en-US" altLang="zh-CN"/>
+            </a:br>
+            <a:r>
+              <a:rPr lang="en-US" altLang="zh-CN"/>
+              <a:t/>
+            </a:r>
+            <a:br>
+              <a:rPr lang="en-US" altLang="zh-CN"/>
+            </a:br>
+            <a:r>
+              <a:rPr lang="en-US" altLang="zh-CN"/>
+              <a:t>                                </a:t>
+            </a:r>
+            <a:endParaRPr lang="en-US" altLang="zh-CN" smtClean="0"/>
+          </a:p>
+          <a:p>
+            <a:endParaRPr lang="zh-CN" altLang="en-US">
+              <a:latin typeface="Times New Roman" panose="02020603050405020304" pitchFamily="18" charset="0"/>
+              <a:cs typeface="Times New Roman" panose="02020603050405020304" pitchFamily="18" charset="0"/>
+            </a:endParaRPr>
+          </a:p>
+        </p:txBody>
+      </p:sp>
+      <p:pic>
+        <p:nvPicPr>
+          <p:cNvPr id="5" name="图片 4"/>
+          <p:cNvPicPr>
+            <a:picLocks noChangeAspect="1"/>
+          </p:cNvPicPr>
+          <p:nvPr/>
+        </p:nvPicPr>
+        <p:blipFill>
+          <a:blip r:embed="rId2"/>
+          <a:stretch>
+            <a:fillRect/>
+          </a:stretch>
+        </p:blipFill>
+        <p:spPr>
+          <a:xfrm>
+            <a:off x="4081600" y="1643868"/>
+            <a:ext cx="2200000" cy="238095"/>
+          </a:xfrm>
+          <a:prstGeom prst="rect">
+            <a:avLst/>
+          </a:prstGeom>
+        </p:spPr>
+      </p:pic>
+      <p:pic>
+        <p:nvPicPr>
+          <p:cNvPr id="6" name="图片 5"/>
+          <p:cNvPicPr>
+            <a:picLocks noChangeAspect="1"/>
+          </p:cNvPicPr>
+          <p:nvPr/>
+        </p:nvPicPr>
+        <p:blipFill>
+          <a:blip r:embed="rId3"/>
+          <a:stretch>
+            <a:fillRect/>
+          </a:stretch>
+        </p:blipFill>
+        <p:spPr>
+          <a:xfrm>
+            <a:off x="3719695" y="2686245"/>
+            <a:ext cx="2923809" cy="314286"/>
+          </a:xfrm>
+          <a:prstGeom prst="rect">
+            <a:avLst/>
+          </a:prstGeom>
+        </p:spPr>
+      </p:pic>
+      <p:pic>
+        <p:nvPicPr>
+          <p:cNvPr id="7" name="图片 6"/>
+          <p:cNvPicPr>
+            <a:picLocks noChangeAspect="1"/>
+          </p:cNvPicPr>
+          <p:nvPr/>
+        </p:nvPicPr>
+        <p:blipFill>
+          <a:blip r:embed="rId4"/>
+          <a:stretch>
+            <a:fillRect/>
+          </a:stretch>
+        </p:blipFill>
+        <p:spPr>
+          <a:xfrm>
+            <a:off x="3005161" y="3819142"/>
+            <a:ext cx="4552381" cy="561905"/>
+          </a:xfrm>
+          <a:prstGeom prst="rect">
+            <a:avLst/>
+          </a:prstGeom>
+        </p:spPr>
+      </p:pic>
+      <p:pic>
+        <p:nvPicPr>
+          <p:cNvPr id="8" name="图片 7"/>
+          <p:cNvPicPr>
+            <a:picLocks noChangeAspect="1"/>
+          </p:cNvPicPr>
+          <p:nvPr/>
+        </p:nvPicPr>
+        <p:blipFill>
+          <a:blip r:embed="rId5"/>
+          <a:stretch>
+            <a:fillRect/>
+          </a:stretch>
+        </p:blipFill>
+        <p:spPr>
+          <a:xfrm>
+            <a:off x="2681351" y="5384348"/>
+            <a:ext cx="5200000" cy="628571"/>
+          </a:xfrm>
+          <a:prstGeom prst="rect">
+            <a:avLst/>
+          </a:prstGeom>
+        </p:spPr>
+      </p:pic>
+    </p:spTree>
+    <p:extLst>
+      <p:ext uri="{BB962C8B-B14F-4D97-AF65-F5344CB8AC3E}">
+        <p14:creationId xmlns:p14="http://schemas.microsoft.com/office/powerpoint/2010/main" val="1163373805"/>
+      </p:ext>
+    </p:extLst>
+  </p:cSld>
+  <p:clrMapOvr>
+    <a:masterClrMapping/>
+  </p:clrMapOvr>
+</p:sld>
+</file>
+
+<file path=ppt/slides/slide19.xml><?xml version="1.0" encoding="utf-8"?>
+<p:sld xmlns:a="http://schemas.openxmlformats.org/drawingml/2006/main" xmlns:r="http://schemas.openxmlformats.org/officeDocument/2006/relationships" xmlns:p="http://schemas.openxmlformats.org/presentationml/2006/main">
+  <p:cSld>
+    <p:spTree>
+      <p:nvGrpSpPr>
+        <p:cNvPr id="1" name=""/>
+        <p:cNvGrpSpPr/>
+        <p:nvPr/>
+      </p:nvGrpSpPr>
+      <p:grpSpPr>
+        <a:xfrm>
+          <a:off x="0" y="0"/>
+          <a:ext cx="0" cy="0"/>
+          <a:chOff x="0" y="0"/>
+          <a:chExt cx="0" cy="0"/>
+        </a:xfrm>
+      </p:grpSpPr>
+      <p:sp>
+        <p:nvSpPr>
+          <p:cNvPr id="4" name="文本框 3"/>
+          <p:cNvSpPr txBox="1"/>
+          <p:nvPr/>
+        </p:nvSpPr>
+        <p:spPr>
+          <a:xfrm>
+            <a:off x="756460" y="581891"/>
+            <a:ext cx="10631977" cy="5262979"/>
+          </a:xfrm>
+          <a:prstGeom prst="rect">
+            <a:avLst/>
+          </a:prstGeom>
+          <a:noFill/>
+        </p:spPr>
+        <p:txBody>
+          <a:bodyPr wrap="square" rtlCol="0">
+            <a:spAutoFit/>
+          </a:bodyPr>
+          <a:lstStyle/>
+          <a:p>
+            <a:r>
+              <a:rPr lang="en-US" altLang="zh-CN" sz="2800" b="1">
+                <a:latin typeface="Times New Roman" panose="02020603050405020304" pitchFamily="18" charset="0"/>
+                <a:cs typeface="Times New Roman" panose="02020603050405020304" pitchFamily="18" charset="0"/>
+              </a:rPr>
+              <a:t>Specifying Goals with </a:t>
+            </a:r>
+            <a:r>
+              <a:rPr lang="en-US" altLang="zh-CN" sz="2800" b="1">
+                <a:latin typeface="Times New Roman" panose="02020603050405020304" pitchFamily="18" charset="0"/>
+                <a:cs typeface="Times New Roman" panose="02020603050405020304" pitchFamily="18" charset="0"/>
+              </a:rPr>
+              <a:t>Pixel </a:t>
+            </a:r>
+            <a:r>
+              <a:rPr lang="en-US" altLang="zh-CN" sz="2800" b="1" smtClean="0">
+                <a:latin typeface="Times New Roman" panose="02020603050405020304" pitchFamily="18" charset="0"/>
+                <a:cs typeface="Times New Roman" panose="02020603050405020304" pitchFamily="18" charset="0"/>
+              </a:rPr>
+              <a:t>Motion:</a:t>
+            </a:r>
+          </a:p>
+          <a:p>
+            <a:r>
+              <a:rPr lang="en-US" altLang="zh-CN" sz="2000" smtClean="0">
+                <a:latin typeface="Times New Roman" panose="02020603050405020304" pitchFamily="18" charset="0"/>
+                <a:cs typeface="Times New Roman" panose="02020603050405020304" pitchFamily="18" charset="0"/>
+              </a:rPr>
+              <a:t>       The </a:t>
+            </a:r>
+            <a:r>
+              <a:rPr lang="en-US" altLang="zh-CN" sz="2000">
+                <a:latin typeface="Times New Roman" panose="02020603050405020304" pitchFamily="18" charset="0"/>
+                <a:cs typeface="Times New Roman" panose="02020603050405020304" pitchFamily="18" charset="0"/>
+              </a:rPr>
+              <a:t>user selects one or more desired source </a:t>
+            </a:r>
+            <a:r>
+              <a:rPr lang="en-US" altLang="zh-CN" sz="2000">
+                <a:latin typeface="Times New Roman" panose="02020603050405020304" pitchFamily="18" charset="0"/>
+                <a:cs typeface="Times New Roman" panose="02020603050405020304" pitchFamily="18" charset="0"/>
+              </a:rPr>
+              <a:t>pixels </a:t>
+            </a:r>
+            <a:r>
+              <a:rPr lang="en-US" altLang="zh-CN" sz="2000" smtClean="0">
+                <a:latin typeface="Times New Roman" panose="02020603050405020304" pitchFamily="18" charset="0"/>
+                <a:cs typeface="Times New Roman" panose="02020603050405020304" pitchFamily="18" charset="0"/>
+              </a:rPr>
+              <a:t>in the </a:t>
+            </a:r>
+            <a:r>
+              <a:rPr lang="en-US" altLang="zh-CN" sz="2000">
+                <a:latin typeface="Times New Roman" panose="02020603050405020304" pitchFamily="18" charset="0"/>
+                <a:cs typeface="Times New Roman" panose="02020603050405020304" pitchFamily="18" charset="0"/>
+              </a:rPr>
+              <a:t>initial image, which we </a:t>
+            </a:r>
+            <a:r>
+              <a:rPr lang="en-US" altLang="zh-CN" sz="2000">
+                <a:latin typeface="Times New Roman" panose="02020603050405020304" pitchFamily="18" charset="0"/>
+                <a:cs typeface="Times New Roman" panose="02020603050405020304" pitchFamily="18" charset="0"/>
+              </a:rPr>
+              <a:t>will </a:t>
+            </a:r>
+            <a:r>
+              <a:rPr lang="en-US" altLang="zh-CN" sz="2000" smtClean="0">
+                <a:latin typeface="Times New Roman" panose="02020603050405020304" pitchFamily="18" charset="0"/>
+                <a:cs typeface="Times New Roman" panose="02020603050405020304" pitchFamily="18" charset="0"/>
+              </a:rPr>
+              <a:t>denote d0(1</a:t>
+            </a:r>
+            <a:r>
+              <a:rPr lang="en-US" altLang="zh-CN" sz="2000">
+                <a:latin typeface="Times New Roman" panose="02020603050405020304" pitchFamily="18" charset="0"/>
+                <a:cs typeface="Times New Roman" panose="02020603050405020304" pitchFamily="18" charset="0"/>
+              </a:rPr>
+              <a:t>);:::;d0(P</a:t>
+            </a:r>
+            <a:r>
+              <a:rPr lang="en-US" altLang="zh-CN" sz="2000">
+                <a:latin typeface="Times New Roman" panose="02020603050405020304" pitchFamily="18" charset="0"/>
+                <a:cs typeface="Times New Roman" panose="02020603050405020304" pitchFamily="18" charset="0"/>
+              </a:rPr>
+              <a:t>), </a:t>
+            </a:r>
+            <a:r>
+              <a:rPr lang="en-US" altLang="zh-CN" sz="2000" smtClean="0">
+                <a:latin typeface="Times New Roman" panose="02020603050405020304" pitchFamily="18" charset="0"/>
+                <a:cs typeface="Times New Roman" panose="02020603050405020304" pitchFamily="18" charset="0"/>
+              </a:rPr>
+              <a:t>with each </a:t>
+            </a:r>
+            <a:r>
+              <a:rPr lang="en-US" altLang="zh-CN" sz="2000">
+                <a:latin typeface="Times New Roman" panose="02020603050405020304" pitchFamily="18" charset="0"/>
+                <a:cs typeface="Times New Roman" panose="02020603050405020304" pitchFamily="18" charset="0"/>
+              </a:rPr>
+              <a:t>pixel’s position given by </a:t>
+            </a:r>
+            <a:r>
+              <a:rPr lang="en-US" altLang="zh-CN" sz="2000">
+                <a:latin typeface="Times New Roman" panose="02020603050405020304" pitchFamily="18" charset="0"/>
+                <a:cs typeface="Times New Roman" panose="02020603050405020304" pitchFamily="18" charset="0"/>
+              </a:rPr>
+              <a:t>(</a:t>
+            </a:r>
+            <a:r>
+              <a:rPr lang="en-US" altLang="zh-CN" sz="2000" smtClean="0">
+                <a:latin typeface="Times New Roman" panose="02020603050405020304" pitchFamily="18" charset="0"/>
+                <a:cs typeface="Times New Roman" panose="02020603050405020304" pitchFamily="18" charset="0"/>
+              </a:rPr>
+              <a:t>x</a:t>
+            </a:r>
+            <a:r>
+              <a:rPr lang="en-US" altLang="zh-CN" sz="1400" smtClean="0">
+                <a:latin typeface="Times New Roman" panose="02020603050405020304" pitchFamily="18" charset="0"/>
+                <a:cs typeface="Times New Roman" panose="02020603050405020304" pitchFamily="18" charset="0"/>
+              </a:rPr>
+              <a:t>d(i)</a:t>
+            </a:r>
+            <a:r>
+              <a:rPr lang="en-US" altLang="zh-CN" sz="2000" smtClean="0">
+                <a:latin typeface="Times New Roman" panose="02020603050405020304" pitchFamily="18" charset="0"/>
+                <a:cs typeface="Times New Roman" panose="02020603050405020304" pitchFamily="18" charset="0"/>
+              </a:rPr>
+              <a:t>, y</a:t>
+            </a:r>
+            <a:r>
+              <a:rPr lang="en-US" altLang="zh-CN" sz="1400" smtClean="0">
+                <a:latin typeface="Times New Roman" panose="02020603050405020304" pitchFamily="18" charset="0"/>
+                <a:cs typeface="Times New Roman" panose="02020603050405020304" pitchFamily="18" charset="0"/>
+              </a:rPr>
+              <a:t>d(i</a:t>
+            </a:r>
+            <a:r>
+              <a:rPr lang="en-US" altLang="zh-CN" sz="1400">
+                <a:latin typeface="Times New Roman" panose="02020603050405020304" pitchFamily="18" charset="0"/>
+                <a:cs typeface="Times New Roman" panose="02020603050405020304" pitchFamily="18" charset="0"/>
+              </a:rPr>
+              <a:t>)</a:t>
+            </a:r>
+            <a:r>
+              <a:rPr lang="en-US" altLang="zh-CN" sz="2000">
+                <a:latin typeface="Times New Roman" panose="02020603050405020304" pitchFamily="18" charset="0"/>
+                <a:cs typeface="Times New Roman" panose="02020603050405020304" pitchFamily="18" charset="0"/>
+              </a:rPr>
+              <a:t>), and then </a:t>
+            </a:r>
+            <a:r>
+              <a:rPr lang="en-US" altLang="zh-CN" sz="2000">
+                <a:latin typeface="Times New Roman" panose="02020603050405020304" pitchFamily="18" charset="0"/>
+                <a:cs typeface="Times New Roman" panose="02020603050405020304" pitchFamily="18" charset="0"/>
+              </a:rPr>
+              <a:t>specifies </a:t>
+            </a:r>
+            <a:r>
+              <a:rPr lang="en-US" altLang="zh-CN" sz="2000" smtClean="0">
+                <a:latin typeface="Times New Roman" panose="02020603050405020304" pitchFamily="18" charset="0"/>
+                <a:cs typeface="Times New Roman" panose="02020603050405020304" pitchFamily="18" charset="0"/>
+              </a:rPr>
+              <a:t>a corresponding goal </a:t>
+            </a:r>
+            <a:r>
+              <a:rPr lang="en-US" altLang="zh-CN" sz="2000">
+                <a:latin typeface="Times New Roman" panose="02020603050405020304" pitchFamily="18" charset="0"/>
+                <a:cs typeface="Times New Roman" panose="02020603050405020304" pitchFamily="18" charset="0"/>
+              </a:rPr>
+              <a:t>position for each of those pixels</a:t>
+            </a:r>
+            <a:r>
+              <a:rPr lang="en-US" altLang="zh-CN" sz="2000">
+                <a:latin typeface="Times New Roman" panose="02020603050405020304" pitchFamily="18" charset="0"/>
+                <a:cs typeface="Times New Roman" panose="02020603050405020304" pitchFamily="18" charset="0"/>
+              </a:rPr>
+              <a:t>, </a:t>
+            </a:r>
+            <a:r>
+              <a:rPr lang="en-US" altLang="zh-CN" sz="2000" smtClean="0">
+                <a:latin typeface="Times New Roman" panose="02020603050405020304" pitchFamily="18" charset="0"/>
+                <a:cs typeface="Times New Roman" panose="02020603050405020304" pitchFamily="18" charset="0"/>
+              </a:rPr>
+              <a:t>which we </a:t>
+            </a:r>
+            <a:r>
+              <a:rPr lang="en-US" altLang="zh-CN" sz="2000">
+                <a:latin typeface="Times New Roman" panose="02020603050405020304" pitchFamily="18" charset="0"/>
+                <a:cs typeface="Times New Roman" panose="02020603050405020304" pitchFamily="18" charset="0"/>
+              </a:rPr>
+              <a:t>will denote g(1);:::;g(P), with each goal </a:t>
+            </a:r>
+            <a:r>
+              <a:rPr lang="en-US" altLang="zh-CN" sz="2000">
+                <a:latin typeface="Times New Roman" panose="02020603050405020304" pitchFamily="18" charset="0"/>
+                <a:cs typeface="Times New Roman" panose="02020603050405020304" pitchFamily="18" charset="0"/>
+              </a:rPr>
+              <a:t>position </a:t>
+            </a:r>
+            <a:r>
+              <a:rPr lang="en-US" altLang="zh-CN" sz="2000" smtClean="0">
+                <a:latin typeface="Times New Roman" panose="02020603050405020304" pitchFamily="18" charset="0"/>
+                <a:cs typeface="Times New Roman" panose="02020603050405020304" pitchFamily="18" charset="0"/>
+              </a:rPr>
+              <a:t>given by </a:t>
+            </a:r>
+            <a:r>
+              <a:rPr lang="en-US" altLang="zh-CN" sz="2000">
+                <a:latin typeface="Times New Roman" panose="02020603050405020304" pitchFamily="18" charset="0"/>
+                <a:cs typeface="Times New Roman" panose="02020603050405020304" pitchFamily="18" charset="0"/>
+              </a:rPr>
+              <a:t>(</a:t>
+            </a:r>
+            <a:r>
+              <a:rPr lang="en-US" altLang="zh-CN" sz="2000" smtClean="0">
+                <a:latin typeface="Times New Roman" panose="02020603050405020304" pitchFamily="18" charset="0"/>
+                <a:cs typeface="Times New Roman" panose="02020603050405020304" pitchFamily="18" charset="0"/>
+              </a:rPr>
+              <a:t>x</a:t>
+            </a:r>
+            <a:r>
+              <a:rPr lang="en-US" altLang="zh-CN" sz="1400" smtClean="0">
+                <a:latin typeface="Times New Roman" panose="02020603050405020304" pitchFamily="18" charset="0"/>
+                <a:cs typeface="Times New Roman" panose="02020603050405020304" pitchFamily="18" charset="0"/>
+              </a:rPr>
+              <a:t>g(i)</a:t>
+            </a:r>
+            <a:r>
+              <a:rPr lang="en-US" altLang="zh-CN" sz="2000" smtClean="0">
+                <a:latin typeface="Times New Roman" panose="02020603050405020304" pitchFamily="18" charset="0"/>
+                <a:cs typeface="Times New Roman" panose="02020603050405020304" pitchFamily="18" charset="0"/>
+              </a:rPr>
+              <a:t>, y</a:t>
+            </a:r>
+            <a:r>
+              <a:rPr lang="en-US" altLang="zh-CN" sz="1400" smtClean="0">
+                <a:latin typeface="Times New Roman" panose="02020603050405020304" pitchFamily="18" charset="0"/>
+                <a:cs typeface="Times New Roman" panose="02020603050405020304" pitchFamily="18" charset="0"/>
+              </a:rPr>
+              <a:t>g(i</a:t>
+            </a:r>
+            <a:r>
+              <a:rPr lang="en-US" altLang="zh-CN" sz="1400">
+                <a:latin typeface="Times New Roman" panose="02020603050405020304" pitchFamily="18" charset="0"/>
+                <a:cs typeface="Times New Roman" panose="02020603050405020304" pitchFamily="18" charset="0"/>
+              </a:rPr>
+              <a:t>)</a:t>
+            </a:r>
+            <a:r>
+              <a:rPr lang="en-US" altLang="zh-CN" sz="2000">
+                <a:latin typeface="Times New Roman" panose="02020603050405020304" pitchFamily="18" charset="0"/>
+                <a:cs typeface="Times New Roman" panose="02020603050405020304" pitchFamily="18" charset="0"/>
+              </a:rPr>
+              <a:t>). With this goal specification, the robot </a:t>
+            </a:r>
+            <a:r>
+              <a:rPr lang="en-US" altLang="zh-CN" sz="2000">
+                <a:latin typeface="Times New Roman" panose="02020603050405020304" pitchFamily="18" charset="0"/>
+                <a:cs typeface="Times New Roman" panose="02020603050405020304" pitchFamily="18" charset="0"/>
+              </a:rPr>
+              <a:t>can </a:t>
+            </a:r>
+            <a:r>
+              <a:rPr lang="en-US" altLang="zh-CN" sz="2000" smtClean="0">
+                <a:latin typeface="Times New Roman" panose="02020603050405020304" pitchFamily="18" charset="0"/>
+                <a:cs typeface="Times New Roman" panose="02020603050405020304" pitchFamily="18" charset="0"/>
+              </a:rPr>
+              <a:t>plan to </a:t>
+            </a:r>
+            <a:r>
+              <a:rPr lang="en-US" altLang="zh-CN" sz="2000">
+                <a:latin typeface="Times New Roman" panose="02020603050405020304" pitchFamily="18" charset="0"/>
+                <a:cs typeface="Times New Roman" panose="02020603050405020304" pitchFamily="18" charset="0"/>
+              </a:rPr>
+              <a:t>move the objects for </a:t>
+            </a:r>
+            <a:r>
+              <a:rPr lang="en-US" altLang="zh-CN" sz="2000">
+                <a:latin typeface="Times New Roman" panose="02020603050405020304" pitchFamily="18" charset="0"/>
+                <a:cs typeface="Times New Roman" panose="02020603050405020304" pitchFamily="18" charset="0"/>
+              </a:rPr>
+              <a:t>which </a:t>
+            </a:r>
+            <a:r>
+              <a:rPr lang="en-US" altLang="zh-CN" sz="2000" smtClean="0">
+                <a:latin typeface="Times New Roman" panose="02020603050405020304" pitchFamily="18" charset="0"/>
+                <a:cs typeface="Times New Roman" panose="02020603050405020304" pitchFamily="18" charset="0"/>
+              </a:rPr>
+              <a:t>the selected </a:t>
+            </a:r>
+            <a:r>
+              <a:rPr lang="en-US" altLang="zh-CN" sz="2000">
+                <a:latin typeface="Times New Roman" panose="02020603050405020304" pitchFamily="18" charset="0"/>
+                <a:cs typeface="Times New Roman" panose="02020603050405020304" pitchFamily="18" charset="0"/>
+              </a:rPr>
+              <a:t>pixels </a:t>
+            </a:r>
+            <a:r>
+              <a:rPr lang="en-US" altLang="zh-CN" sz="2000" smtClean="0">
+                <a:latin typeface="Times New Roman" panose="02020603050405020304" pitchFamily="18" charset="0"/>
+                <a:cs typeface="Times New Roman" panose="02020603050405020304" pitchFamily="18" charset="0"/>
+              </a:rPr>
+              <a:t>belong.</a:t>
+            </a:r>
+          </a:p>
+          <a:p>
+            <a:endParaRPr lang="en-US" altLang="zh-CN" sz="2000">
+              <a:latin typeface="Times New Roman" panose="02020603050405020304" pitchFamily="18" charset="0"/>
+              <a:cs typeface="Times New Roman" panose="02020603050405020304" pitchFamily="18" charset="0"/>
+            </a:endParaRPr>
+          </a:p>
+          <a:p>
+            <a:r>
+              <a:rPr lang="en-US" altLang="zh-CN" sz="2800" b="1" i="1">
+                <a:latin typeface="Times New Roman" panose="02020603050405020304" pitchFamily="18" charset="0"/>
+                <a:cs typeface="Times New Roman" panose="02020603050405020304" pitchFamily="18" charset="0"/>
+              </a:rPr>
+              <a:t>Evaluating Actions with Implicit </a:t>
+            </a:r>
+            <a:r>
+              <a:rPr lang="en-US" altLang="zh-CN" sz="2800" b="1" i="1">
+                <a:latin typeface="Times New Roman" panose="02020603050405020304" pitchFamily="18" charset="0"/>
+                <a:cs typeface="Times New Roman" panose="02020603050405020304" pitchFamily="18" charset="0"/>
+              </a:rPr>
+              <a:t>Pixel </a:t>
+            </a:r>
+            <a:r>
+              <a:rPr lang="en-US" altLang="zh-CN" sz="2800" b="1" i="1" smtClean="0">
+                <a:latin typeface="Times New Roman" panose="02020603050405020304" pitchFamily="18" charset="0"/>
+                <a:cs typeface="Times New Roman" panose="02020603050405020304" pitchFamily="18" charset="0"/>
+              </a:rPr>
+              <a:t>Advection</a:t>
+            </a:r>
+            <a:r>
+              <a:rPr lang="en-US" altLang="zh-CN" sz="2800" b="1" smtClean="0">
+                <a:latin typeface="Times New Roman" panose="02020603050405020304" pitchFamily="18" charset="0"/>
+                <a:cs typeface="Times New Roman" panose="02020603050405020304" pitchFamily="18" charset="0"/>
+              </a:rPr>
+              <a:t>:</a:t>
+            </a:r>
+          </a:p>
+          <a:p>
+            <a:r>
+              <a:rPr lang="en-US" altLang="zh-CN" sz="2000">
+                <a:latin typeface="Times New Roman" panose="02020603050405020304" pitchFamily="18" charset="0"/>
+                <a:cs typeface="Times New Roman" panose="02020603050405020304" pitchFamily="18" charset="0"/>
+              </a:rPr>
+              <a:t>Formally, we construct an initial </a:t>
+            </a:r>
+            <a:r>
+              <a:rPr lang="en-US" altLang="zh-CN" sz="2000">
+                <a:latin typeface="Times New Roman" panose="02020603050405020304" pitchFamily="18" charset="0"/>
+                <a:cs typeface="Times New Roman" panose="02020603050405020304" pitchFamily="18" charset="0"/>
+              </a:rPr>
+              <a:t>probability </a:t>
+            </a:r>
+            <a:r>
+              <a:rPr lang="en-US" altLang="zh-CN" sz="2000" smtClean="0">
+                <a:latin typeface="Times New Roman" panose="02020603050405020304" pitchFamily="18" charset="0"/>
+                <a:cs typeface="Times New Roman" panose="02020603050405020304" pitchFamily="18" charset="0"/>
+              </a:rPr>
+              <a:t>distribution over </a:t>
+            </a:r>
+            <a:r>
+              <a:rPr lang="en-US" altLang="zh-CN" sz="2000">
+                <a:latin typeface="Times New Roman" panose="02020603050405020304" pitchFamily="18" charset="0"/>
+                <a:cs typeface="Times New Roman" panose="02020603050405020304" pitchFamily="18" charset="0"/>
+              </a:rPr>
+              <a:t>the designated pixel’s position at the current </a:t>
+            </a:r>
+            <a:r>
+              <a:rPr lang="en-US" altLang="zh-CN" sz="2000">
+                <a:latin typeface="Times New Roman" panose="02020603050405020304" pitchFamily="18" charset="0"/>
+                <a:cs typeface="Times New Roman" panose="02020603050405020304" pitchFamily="18" charset="0"/>
+              </a:rPr>
+              <a:t>time </a:t>
+            </a:r>
+            <a:r>
+              <a:rPr lang="en-US" altLang="zh-CN" sz="2000" smtClean="0">
+                <a:latin typeface="Times New Roman" panose="02020603050405020304" pitchFamily="18" charset="0"/>
+                <a:cs typeface="Times New Roman" panose="02020603050405020304" pitchFamily="18" charset="0"/>
+              </a:rPr>
+              <a:t>step </a:t>
+            </a:r>
+            <a:r>
+              <a:rPr lang="en-US" altLang="zh-CN" sz="2000" i="1" smtClean="0">
+                <a:latin typeface="Times New Roman" panose="02020603050405020304" pitchFamily="18" charset="0"/>
+                <a:cs typeface="Times New Roman" panose="02020603050405020304" pitchFamily="18" charset="0"/>
+              </a:rPr>
+              <a:t>t</a:t>
+            </a:r>
+            <a:r>
+              <a:rPr lang="en-US" altLang="zh-CN" sz="2000">
+                <a:latin typeface="Times New Roman" panose="02020603050405020304" pitchFamily="18" charset="0"/>
+                <a:cs typeface="Times New Roman" panose="02020603050405020304" pitchFamily="18" charset="0"/>
+              </a:rPr>
+              <a:t>, which we denote </a:t>
+            </a:r>
+            <a:r>
+              <a:rPr lang="en-US" altLang="zh-CN" sz="2000" i="1">
+                <a:latin typeface="Times New Roman" panose="02020603050405020304" pitchFamily="18" charset="0"/>
+                <a:cs typeface="Times New Roman" panose="02020603050405020304" pitchFamily="18" charset="0"/>
+              </a:rPr>
+              <a:t>P</a:t>
+            </a:r>
+            <a:r>
+              <a:rPr lang="en-US" altLang="zh-CN" sz="2000">
+                <a:latin typeface="Times New Roman" panose="02020603050405020304" pitchFamily="18" charset="0"/>
+                <a:cs typeface="Times New Roman" panose="02020603050405020304" pitchFamily="18" charset="0"/>
+              </a:rPr>
+              <a:t>(</a:t>
+            </a:r>
+            <a:r>
+              <a:rPr lang="en-US" altLang="zh-CN" sz="2000" i="1">
+                <a:latin typeface="Times New Roman" panose="02020603050405020304" pitchFamily="18" charset="0"/>
+                <a:cs typeface="Times New Roman" panose="02020603050405020304" pitchFamily="18" charset="0"/>
+              </a:rPr>
+              <a:t>st</a:t>
+            </a:r>
+            <a:r>
+              <a:rPr lang="en-US" altLang="zh-CN" sz="2000">
+                <a:latin typeface="Times New Roman" panose="02020603050405020304" pitchFamily="18" charset="0"/>
+                <a:cs typeface="Times New Roman" panose="02020603050405020304" pitchFamily="18" charset="0"/>
+              </a:rPr>
+              <a:t>). We assume that the </a:t>
+            </a:r>
+            <a:r>
+              <a:rPr lang="en-US" altLang="zh-CN" sz="2000">
+                <a:latin typeface="Times New Roman" panose="02020603050405020304" pitchFamily="18" charset="0"/>
+                <a:cs typeface="Times New Roman" panose="02020603050405020304" pitchFamily="18" charset="0"/>
+              </a:rPr>
+              <a:t>current </a:t>
+            </a:r>
+            <a:r>
+              <a:rPr lang="en-US" altLang="zh-CN" sz="2000" smtClean="0">
+                <a:latin typeface="Times New Roman" panose="02020603050405020304" pitchFamily="18" charset="0"/>
+                <a:cs typeface="Times New Roman" panose="02020603050405020304" pitchFamily="18" charset="0"/>
+              </a:rPr>
+              <a:t>position of </a:t>
+            </a:r>
+            <a:r>
+              <a:rPr lang="en-US" altLang="zh-CN" sz="2000">
+                <a:latin typeface="Times New Roman" panose="02020603050405020304" pitchFamily="18" charset="0"/>
+                <a:cs typeface="Times New Roman" panose="02020603050405020304" pitchFamily="18" charset="0"/>
+              </a:rPr>
+              <a:t>the designated pixel </a:t>
+            </a:r>
+            <a:r>
+              <a:rPr lang="en-US" altLang="zh-CN" sz="2000" i="1">
+                <a:latin typeface="Times New Roman" panose="02020603050405020304" pitchFamily="18" charset="0"/>
+                <a:cs typeface="Times New Roman" panose="02020603050405020304" pitchFamily="18" charset="0"/>
+              </a:rPr>
+              <a:t>dt </a:t>
+            </a:r>
+            <a:r>
+              <a:rPr lang="en-US" altLang="zh-CN" sz="2000">
+                <a:latin typeface="Times New Roman" panose="02020603050405020304" pitchFamily="18" charset="0"/>
+                <a:cs typeface="Times New Roman" panose="02020603050405020304" pitchFamily="18" charset="0"/>
+              </a:rPr>
+              <a:t>= (</a:t>
+            </a:r>
+            <a:r>
+              <a:rPr lang="en-US" altLang="zh-CN" sz="2000" i="1">
+                <a:latin typeface="Times New Roman" panose="02020603050405020304" pitchFamily="18" charset="0"/>
+                <a:cs typeface="Times New Roman" panose="02020603050405020304" pitchFamily="18" charset="0"/>
+              </a:rPr>
+              <a:t>xd;yd</a:t>
+            </a:r>
+            <a:r>
+              <a:rPr lang="en-US" altLang="zh-CN" sz="2000">
+                <a:latin typeface="Times New Roman" panose="02020603050405020304" pitchFamily="18" charset="0"/>
+                <a:cs typeface="Times New Roman" panose="02020603050405020304" pitchFamily="18" charset="0"/>
+              </a:rPr>
+              <a:t>) is known at time </a:t>
+            </a:r>
+            <a:r>
+              <a:rPr lang="en-US" altLang="zh-CN" sz="2000" i="1">
+                <a:latin typeface="Times New Roman" panose="02020603050405020304" pitchFamily="18" charset="0"/>
+                <a:cs typeface="Times New Roman" panose="02020603050405020304" pitchFamily="18" charset="0"/>
+              </a:rPr>
+              <a:t>t</a:t>
+            </a:r>
+            <a:r>
+              <a:rPr lang="en-US" altLang="zh-CN" sz="2000">
+                <a:latin typeface="Times New Roman" panose="02020603050405020304" pitchFamily="18" charset="0"/>
+                <a:cs typeface="Times New Roman" panose="02020603050405020304" pitchFamily="18" charset="0"/>
+              </a:rPr>
+              <a:t>, </a:t>
+            </a:r>
+            <a:r>
+              <a:rPr lang="en-US" altLang="zh-CN" sz="2000">
+                <a:latin typeface="Times New Roman" panose="02020603050405020304" pitchFamily="18" charset="0"/>
+                <a:cs typeface="Times New Roman" panose="02020603050405020304" pitchFamily="18" charset="0"/>
+              </a:rPr>
+              <a:t>as </a:t>
+            </a:r>
+            <a:r>
+              <a:rPr lang="en-US" altLang="zh-CN" sz="2000" smtClean="0">
+                <a:latin typeface="Times New Roman" panose="02020603050405020304" pitchFamily="18" charset="0"/>
+                <a:cs typeface="Times New Roman" panose="02020603050405020304" pitchFamily="18" charset="0"/>
+              </a:rPr>
+              <a:t>it is </a:t>
+            </a:r>
+            <a:r>
+              <a:rPr lang="en-US" altLang="zh-CN" sz="2000">
+                <a:latin typeface="Times New Roman" panose="02020603050405020304" pitchFamily="18" charset="0"/>
+                <a:cs typeface="Times New Roman" panose="02020603050405020304" pitchFamily="18" charset="0"/>
+              </a:rPr>
+              <a:t>provided by a user at time </a:t>
+            </a:r>
+            <a:r>
+              <a:rPr lang="en-US" altLang="zh-CN" sz="2000" i="1">
+                <a:latin typeface="Times New Roman" panose="02020603050405020304" pitchFamily="18" charset="0"/>
+                <a:cs typeface="Times New Roman" panose="02020603050405020304" pitchFamily="18" charset="0"/>
+              </a:rPr>
+              <a:t>t </a:t>
+            </a:r>
+            <a:r>
+              <a:rPr lang="en-US" altLang="zh-CN" sz="2000">
+                <a:latin typeface="Times New Roman" panose="02020603050405020304" pitchFamily="18" charset="0"/>
+                <a:cs typeface="Times New Roman" panose="02020603050405020304" pitchFamily="18" charset="0"/>
+              </a:rPr>
+              <a:t>= 0 can be </a:t>
+            </a:r>
+            <a:r>
+              <a:rPr lang="en-US" altLang="zh-CN" sz="2000">
+                <a:latin typeface="Times New Roman" panose="02020603050405020304" pitchFamily="18" charset="0"/>
+                <a:cs typeface="Times New Roman" panose="02020603050405020304" pitchFamily="18" charset="0"/>
+              </a:rPr>
+              <a:t>tracked </a:t>
+            </a:r>
+            <a:r>
+              <a:rPr lang="en-US" altLang="zh-CN" sz="2000" smtClean="0">
+                <a:latin typeface="Times New Roman" panose="02020603050405020304" pitchFamily="18" charset="0"/>
+                <a:cs typeface="Times New Roman" panose="02020603050405020304" pitchFamily="18" charset="0"/>
+              </a:rPr>
+              <a:t>thereafter. Thus</a:t>
+            </a:r>
+            <a:r>
+              <a:rPr lang="en-US" altLang="zh-CN" sz="2000">
+                <a:latin typeface="Times New Roman" panose="02020603050405020304" pitchFamily="18" charset="0"/>
+                <a:cs typeface="Times New Roman" panose="02020603050405020304" pitchFamily="18" charset="0"/>
+              </a:rPr>
+              <a:t>, we define the distribution at the current time step </a:t>
+            </a:r>
+            <a:r>
+              <a:rPr lang="en-US" altLang="zh-CN" sz="2000" i="1">
+                <a:latin typeface="Times New Roman" panose="02020603050405020304" pitchFamily="18" charset="0"/>
+                <a:cs typeface="Times New Roman" panose="02020603050405020304" pitchFamily="18" charset="0"/>
+              </a:rPr>
+              <a:t>t </a:t>
+            </a:r>
+            <a:r>
+              <a:rPr lang="en-US" altLang="zh-CN" sz="2000" smtClean="0">
+                <a:latin typeface="Times New Roman" panose="02020603050405020304" pitchFamily="18" charset="0"/>
+                <a:cs typeface="Times New Roman" panose="02020603050405020304" pitchFamily="18" charset="0"/>
+              </a:rPr>
+              <a:t>as:</a:t>
+            </a:r>
+          </a:p>
+          <a:p>
+            <a:r>
+              <a:rPr lang="en-US" altLang="zh-CN" sz="2000">
+                <a:latin typeface="Times New Roman" panose="02020603050405020304" pitchFamily="18" charset="0"/>
+                <a:cs typeface="Times New Roman" panose="02020603050405020304" pitchFamily="18" charset="0"/>
+              </a:rPr>
+              <a:t> </a:t>
+            </a:r>
+            <a:r>
+              <a:rPr lang="en-US" altLang="zh-CN" sz="2000" smtClean="0">
+                <a:latin typeface="Times New Roman" panose="02020603050405020304" pitchFamily="18" charset="0"/>
+                <a:cs typeface="Times New Roman" panose="02020603050405020304" pitchFamily="18" charset="0"/>
+              </a:rPr>
+              <a:t>                   </a:t>
+            </a:r>
+            <a:r>
+              <a:rPr lang="en-US" altLang="zh-CN" sz="2000"/>
+              <a:t/>
+            </a:r>
+            <a:br>
+              <a:rPr lang="en-US" altLang="zh-CN" sz="2000"/>
+            </a:br>
+            <a:endParaRPr lang="en-US" altLang="zh-CN" sz="2000" smtClean="0"/>
+          </a:p>
+          <a:p>
+            <a:r>
+              <a:rPr lang="en-US" altLang="zh-CN" sz="2000">
+                <a:latin typeface="Times New Roman" panose="02020603050405020304" pitchFamily="18" charset="0"/>
+                <a:cs typeface="Times New Roman" panose="02020603050405020304" pitchFamily="18" charset="0"/>
+              </a:rPr>
+              <a:t>Let </a:t>
+            </a:r>
+            <a:r>
+              <a:rPr lang="en-US" altLang="zh-CN" sz="2000" b="1">
+                <a:latin typeface="Times New Roman" panose="02020603050405020304" pitchFamily="18" charset="0"/>
+                <a:cs typeface="Times New Roman" panose="02020603050405020304" pitchFamily="18" charset="0"/>
+              </a:rPr>
+              <a:t>P</a:t>
+            </a:r>
+            <a:r>
+              <a:rPr lang="en-US" altLang="zh-CN" sz="1400" i="1">
+                <a:latin typeface="Times New Roman" panose="02020603050405020304" pitchFamily="18" charset="0"/>
+                <a:cs typeface="Times New Roman" panose="02020603050405020304" pitchFamily="18" charset="0"/>
+              </a:rPr>
+              <a:t>t</a:t>
+            </a:r>
+            <a:r>
+              <a:rPr lang="en-US" altLang="zh-CN" sz="1400">
+                <a:latin typeface="Times New Roman" panose="02020603050405020304" pitchFamily="18" charset="0"/>
+                <a:cs typeface="Times New Roman" panose="02020603050405020304" pitchFamily="18" charset="0"/>
+              </a:rPr>
+              <a:t>+</a:t>
+            </a:r>
+            <a:r>
+              <a:rPr lang="en-US" altLang="zh-CN" sz="1400" i="1">
+                <a:latin typeface="Times New Roman" panose="02020603050405020304" pitchFamily="18" charset="0"/>
+                <a:cs typeface="Times New Roman" panose="02020603050405020304" pitchFamily="18" charset="0"/>
+              </a:rPr>
+              <a:t>k</a:t>
+            </a:r>
+            <a:r>
+              <a:rPr lang="en-US" altLang="zh-CN" sz="2000" i="1">
+                <a:latin typeface="Times New Roman" panose="02020603050405020304" pitchFamily="18" charset="0"/>
+                <a:cs typeface="Times New Roman" panose="02020603050405020304" pitchFamily="18" charset="0"/>
+              </a:rPr>
+              <a:t> </a:t>
+            </a:r>
+            <a:r>
+              <a:rPr lang="en-US" altLang="zh-CN" sz="2000">
+                <a:latin typeface="Times New Roman" panose="02020603050405020304" pitchFamily="18" charset="0"/>
+                <a:cs typeface="Times New Roman" panose="02020603050405020304" pitchFamily="18" charset="0"/>
+              </a:rPr>
+              <a:t>denote the 2D </a:t>
+            </a:r>
+            <a:r>
+              <a:rPr lang="en-US" altLang="zh-CN" sz="2000">
+                <a:latin typeface="Times New Roman" panose="02020603050405020304" pitchFamily="18" charset="0"/>
+                <a:cs typeface="Times New Roman" panose="02020603050405020304" pitchFamily="18" charset="0"/>
+              </a:rPr>
+              <a:t>conditional </a:t>
+            </a:r>
+            <a:r>
+              <a:rPr lang="en-US" altLang="zh-CN" sz="2000" smtClean="0">
+                <a:latin typeface="Times New Roman" panose="02020603050405020304" pitchFamily="18" charset="0"/>
+                <a:cs typeface="Times New Roman" panose="02020603050405020304" pitchFamily="18" charset="0"/>
+              </a:rPr>
+              <a:t>distribution </a:t>
+            </a:r>
+            <a:r>
+              <a:rPr lang="en-US" altLang="zh-CN" sz="2000" i="1" smtClean="0">
+                <a:latin typeface="Times New Roman" panose="02020603050405020304" pitchFamily="18" charset="0"/>
+                <a:cs typeface="Times New Roman" panose="02020603050405020304" pitchFamily="18" charset="0"/>
+              </a:rPr>
+              <a:t>P</a:t>
+            </a:r>
+            <a:r>
+              <a:rPr lang="en-US" altLang="zh-CN" sz="2000" smtClean="0">
+                <a:latin typeface="Times New Roman" panose="02020603050405020304" pitchFamily="18" charset="0"/>
+                <a:cs typeface="Times New Roman" panose="02020603050405020304" pitchFamily="18" charset="0"/>
+              </a:rPr>
+              <a:t>(</a:t>
+            </a:r>
+            <a:r>
+              <a:rPr lang="en-US" altLang="zh-CN" sz="2000" i="1" smtClean="0">
+                <a:latin typeface="Times New Roman" panose="02020603050405020304" pitchFamily="18" charset="0"/>
+                <a:cs typeface="Times New Roman" panose="02020603050405020304" pitchFamily="18" charset="0"/>
+              </a:rPr>
+              <a:t>s</a:t>
+            </a:r>
+            <a:r>
+              <a:rPr lang="en-US" altLang="zh-CN" sz="1400" i="1" smtClean="0">
+                <a:latin typeface="Times New Roman" panose="02020603050405020304" pitchFamily="18" charset="0"/>
+                <a:cs typeface="Times New Roman" panose="02020603050405020304" pitchFamily="18" charset="0"/>
+              </a:rPr>
+              <a:t>t</a:t>
+            </a:r>
+            <a:r>
+              <a:rPr lang="en-US" altLang="zh-CN" sz="1400" smtClean="0">
+                <a:latin typeface="Times New Roman" panose="02020603050405020304" pitchFamily="18" charset="0"/>
+                <a:cs typeface="Times New Roman" panose="02020603050405020304" pitchFamily="18" charset="0"/>
+              </a:rPr>
+              <a:t>+</a:t>
+            </a:r>
+            <a:r>
+              <a:rPr lang="en-US" altLang="zh-CN" sz="1400" i="1" smtClean="0">
+                <a:latin typeface="Times New Roman" panose="02020603050405020304" pitchFamily="18" charset="0"/>
+                <a:cs typeface="Times New Roman" panose="02020603050405020304" pitchFamily="18" charset="0"/>
+              </a:rPr>
+              <a:t>k</a:t>
+            </a:r>
+            <a:r>
+              <a:rPr lang="en-US" altLang="zh-CN" sz="2000" i="1" smtClean="0">
+                <a:latin typeface="Times New Roman" panose="02020603050405020304" pitchFamily="18" charset="0"/>
+                <a:cs typeface="Times New Roman" panose="02020603050405020304" pitchFamily="18" charset="0"/>
+              </a:rPr>
+              <a:t>|I</a:t>
+            </a:r>
+            <a:r>
+              <a:rPr lang="en-US" altLang="zh-CN" sz="1400" i="1" smtClean="0">
+                <a:latin typeface="Times New Roman" panose="02020603050405020304" pitchFamily="18" charset="0"/>
+                <a:cs typeface="Times New Roman" panose="02020603050405020304" pitchFamily="18" charset="0"/>
+              </a:rPr>
+              <a:t>t-</a:t>
+            </a:r>
+            <a:r>
+              <a:rPr lang="en-US" altLang="zh-CN" sz="1400" smtClean="0">
+                <a:latin typeface="Times New Roman" panose="02020603050405020304" pitchFamily="18" charset="0"/>
+                <a:cs typeface="Times New Roman" panose="02020603050405020304" pitchFamily="18" charset="0"/>
+              </a:rPr>
+              <a:t>1:</a:t>
+            </a:r>
+            <a:r>
+              <a:rPr lang="en-US" altLang="zh-CN" sz="1400" i="1" smtClean="0">
+                <a:latin typeface="Times New Roman" panose="02020603050405020304" pitchFamily="18" charset="0"/>
+                <a:cs typeface="Times New Roman" panose="02020603050405020304" pitchFamily="18" charset="0"/>
+              </a:rPr>
+              <a:t>t</a:t>
+            </a:r>
+            <a:r>
+              <a:rPr lang="en-US" altLang="zh-CN" sz="2000" i="1" smtClean="0">
+                <a:latin typeface="Times New Roman" panose="02020603050405020304" pitchFamily="18" charset="0"/>
+                <a:cs typeface="Times New Roman" panose="02020603050405020304" pitchFamily="18" charset="0"/>
+              </a:rPr>
+              <a:t>;</a:t>
+            </a:r>
+            <a:r>
+              <a:rPr lang="en-US" altLang="zh-CN" sz="2000" b="1" smtClean="0">
+                <a:latin typeface="Times New Roman" panose="02020603050405020304" pitchFamily="18" charset="0"/>
+                <a:cs typeface="Times New Roman" panose="02020603050405020304" pitchFamily="18" charset="0"/>
+              </a:rPr>
+              <a:t>x</a:t>
+            </a:r>
+            <a:r>
+              <a:rPr lang="en-US" altLang="zh-CN" sz="1400" i="1" smtClean="0">
+                <a:latin typeface="Times New Roman" panose="02020603050405020304" pitchFamily="18" charset="0"/>
+                <a:cs typeface="Times New Roman" panose="02020603050405020304" pitchFamily="18" charset="0"/>
+              </a:rPr>
+              <a:t>t-</a:t>
+            </a:r>
+            <a:r>
+              <a:rPr lang="en-US" altLang="zh-CN" sz="1400" smtClean="0">
+                <a:latin typeface="Times New Roman" panose="02020603050405020304" pitchFamily="18" charset="0"/>
+                <a:cs typeface="Times New Roman" panose="02020603050405020304" pitchFamily="18" charset="0"/>
+              </a:rPr>
+              <a:t>1</a:t>
+            </a:r>
+            <a:r>
+              <a:rPr lang="en-US" altLang="zh-CN" sz="1600" smtClean="0">
+                <a:latin typeface="Times New Roman" panose="02020603050405020304" pitchFamily="18" charset="0"/>
+                <a:cs typeface="Times New Roman" panose="02020603050405020304" pitchFamily="18" charset="0"/>
+              </a:rPr>
+              <a:t>:</a:t>
+            </a:r>
+            <a:r>
+              <a:rPr lang="en-US" altLang="zh-CN" sz="1600" i="1" smtClean="0">
+                <a:latin typeface="Times New Roman" panose="02020603050405020304" pitchFamily="18" charset="0"/>
+                <a:cs typeface="Times New Roman" panose="02020603050405020304" pitchFamily="18" charset="0"/>
+              </a:rPr>
+              <a:t>t</a:t>
+            </a:r>
+            <a:r>
+              <a:rPr lang="en-US" altLang="zh-CN" sz="2000" i="1" smtClean="0">
+                <a:latin typeface="Times New Roman" panose="02020603050405020304" pitchFamily="18" charset="0"/>
+                <a:cs typeface="Times New Roman" panose="02020603050405020304" pitchFamily="18" charset="0"/>
+              </a:rPr>
+              <a:t>;</a:t>
+            </a:r>
+            <a:r>
+              <a:rPr lang="en-US" altLang="zh-CN" sz="2000" b="1" smtClean="0">
+                <a:latin typeface="Times New Roman" panose="02020603050405020304" pitchFamily="18" charset="0"/>
+                <a:cs typeface="Times New Roman" panose="02020603050405020304" pitchFamily="18" charset="0"/>
+              </a:rPr>
+              <a:t>a</a:t>
+            </a:r>
+            <a:r>
+              <a:rPr lang="en-US" altLang="zh-CN" sz="1400" i="1" smtClean="0">
+                <a:latin typeface="Times New Roman" panose="02020603050405020304" pitchFamily="18" charset="0"/>
+                <a:cs typeface="Times New Roman" panose="02020603050405020304" pitchFamily="18" charset="0"/>
+              </a:rPr>
+              <a:t>t</a:t>
+            </a:r>
+            <a:r>
+              <a:rPr lang="en-US" altLang="zh-CN" sz="1400" smtClean="0">
+                <a:latin typeface="Times New Roman" panose="02020603050405020304" pitchFamily="18" charset="0"/>
+                <a:cs typeface="Times New Roman" panose="02020603050405020304" pitchFamily="18" charset="0"/>
+              </a:rPr>
+              <a:t>:</a:t>
+            </a:r>
+            <a:r>
+              <a:rPr lang="en-US" altLang="zh-CN" sz="1400" i="1" smtClean="0">
+                <a:latin typeface="Times New Roman" panose="02020603050405020304" pitchFamily="18" charset="0"/>
+                <a:cs typeface="Times New Roman" panose="02020603050405020304" pitchFamily="18" charset="0"/>
+              </a:rPr>
+              <a:t>t</a:t>
+            </a:r>
+            <a:r>
+              <a:rPr lang="en-US" altLang="zh-CN" sz="1400" smtClean="0">
+                <a:latin typeface="Times New Roman" panose="02020603050405020304" pitchFamily="18" charset="0"/>
+                <a:cs typeface="Times New Roman" panose="02020603050405020304" pitchFamily="18" charset="0"/>
+              </a:rPr>
+              <a:t>+</a:t>
+            </a:r>
+            <a:r>
+              <a:rPr lang="en-US" altLang="zh-CN" sz="1400" i="1" smtClean="0">
+                <a:latin typeface="Times New Roman" panose="02020603050405020304" pitchFamily="18" charset="0"/>
+                <a:cs typeface="Times New Roman" panose="02020603050405020304" pitchFamily="18" charset="0"/>
+              </a:rPr>
+              <a:t>k</a:t>
+            </a:r>
+            <a:r>
+              <a:rPr lang="en-US" altLang="zh-CN" sz="2000" i="1" smtClean="0">
+                <a:latin typeface="Times New Roman" panose="02020603050405020304" pitchFamily="18" charset="0"/>
+                <a:cs typeface="Times New Roman" panose="02020603050405020304" pitchFamily="18" charset="0"/>
+              </a:rPr>
+              <a:t>;dt</a:t>
+            </a:r>
+            <a:r>
+              <a:rPr lang="en-US" altLang="zh-CN" sz="2000">
+                <a:latin typeface="Times New Roman" panose="02020603050405020304" pitchFamily="18" charset="0"/>
+                <a:cs typeface="Times New Roman" panose="02020603050405020304" pitchFamily="18" charset="0"/>
+              </a:rPr>
+              <a:t>), we then have:</a:t>
+            </a:r>
+            <a:r>
+              <a:rPr lang="en-US" altLang="zh-CN" sz="2000">
+                <a:latin typeface="Times New Roman" panose="02020603050405020304" pitchFamily="18" charset="0"/>
+                <a:cs typeface="Times New Roman" panose="02020603050405020304" pitchFamily="18" charset="0"/>
+              </a:rPr>
+              <a:t> </a:t>
+            </a:r>
+            <a:r>
+              <a:rPr lang="en-US" altLang="zh-CN" sz="2000"/>
+              <a:t/>
+            </a:r>
+            <a:br>
+              <a:rPr lang="en-US" altLang="zh-CN" sz="2000"/>
+            </a:br>
+            <a:endParaRPr lang="zh-CN" altLang="en-US" sz="2000">
+              <a:latin typeface="Times New Roman" panose="02020603050405020304" pitchFamily="18" charset="0"/>
+              <a:cs typeface="Times New Roman" panose="02020603050405020304" pitchFamily="18" charset="0"/>
+            </a:endParaRPr>
+          </a:p>
+        </p:txBody>
+      </p:sp>
+      <p:pic>
+        <p:nvPicPr>
+          <p:cNvPr id="5" name="图片 4"/>
+          <p:cNvPicPr>
+            <a:picLocks noChangeAspect="1"/>
+          </p:cNvPicPr>
+          <p:nvPr/>
+        </p:nvPicPr>
+        <p:blipFill>
+          <a:blip r:embed="rId2"/>
+          <a:stretch>
+            <a:fillRect/>
+          </a:stretch>
+        </p:blipFill>
+        <p:spPr>
+          <a:xfrm>
+            <a:off x="4554297" y="4598488"/>
+            <a:ext cx="2152381" cy="580952"/>
+          </a:xfrm>
+          <a:prstGeom prst="rect">
+            <a:avLst/>
+          </a:prstGeom>
+        </p:spPr>
+      </p:pic>
+      <p:pic>
+        <p:nvPicPr>
+          <p:cNvPr id="6" name="图片 5"/>
+          <p:cNvPicPr>
+            <a:picLocks noChangeAspect="1"/>
+          </p:cNvPicPr>
+          <p:nvPr/>
+        </p:nvPicPr>
+        <p:blipFill>
+          <a:blip r:embed="rId3"/>
+          <a:stretch>
+            <a:fillRect/>
+          </a:stretch>
+        </p:blipFill>
+        <p:spPr>
+          <a:xfrm>
+            <a:off x="3657269" y="5576209"/>
+            <a:ext cx="4428571" cy="676190"/>
+          </a:xfrm>
+          <a:prstGeom prst="rect">
+            <a:avLst/>
+          </a:prstGeom>
+        </p:spPr>
+      </p:pic>
+    </p:spTree>
+    <p:extLst>
+      <p:ext uri="{BB962C8B-B14F-4D97-AF65-F5344CB8AC3E}">
+        <p14:creationId xmlns:p14="http://schemas.microsoft.com/office/powerpoint/2010/main" val="624166705"/>
+      </p:ext>
+    </p:extLst>
+  </p:cSld>
+  <p:clrMapOvr>
+    <a:masterClrMapping/>
+  </p:clrMapOvr>
+</p:sld>
+</file>
+
 <file path=ppt/slides/slide2.xml><?xml version="1.0" encoding="utf-8"?>
 <p:sld xmlns:a="http://schemas.openxmlformats.org/drawingml/2006/main" xmlns:r="http://schemas.openxmlformats.org/officeDocument/2006/relationships" xmlns:p="http://schemas.openxmlformats.org/presentationml/2006/main">
   <p:cSld>
@@ -4390,6 +6754,1064 @@
   <p:clrMapOvr>
     <a:masterClrMapping/>
   </p:clrMapOvr>
+</p:sld>
+</file>
+
+<file path=ppt/slides/slide20.xml><?xml version="1.0" encoding="utf-8"?>
+<p:sld xmlns:a="http://schemas.openxmlformats.org/drawingml/2006/main" xmlns:r="http://schemas.openxmlformats.org/officeDocument/2006/relationships" xmlns:p="http://schemas.openxmlformats.org/presentationml/2006/main">
+  <p:cSld>
+    <p:spTree>
+      <p:nvGrpSpPr>
+        <p:cNvPr id="1" name=""/>
+        <p:cNvGrpSpPr/>
+        <p:nvPr/>
+      </p:nvGrpSpPr>
+      <p:grpSpPr>
+        <a:xfrm>
+          <a:off x="0" y="0"/>
+          <a:ext cx="0" cy="0"/>
+          <a:chOff x="0" y="0"/>
+          <a:chExt cx="0" cy="0"/>
+        </a:xfrm>
+      </p:grpSpPr>
+      <p:sp>
+        <p:nvSpPr>
+          <p:cNvPr id="5" name="矩形 4"/>
+          <p:cNvSpPr/>
+          <p:nvPr/>
+        </p:nvSpPr>
+        <p:spPr>
+          <a:xfrm>
+            <a:off x="1163782" y="72815"/>
+            <a:ext cx="10665229" cy="6863417"/>
+          </a:xfrm>
+          <a:prstGeom prst="rect">
+            <a:avLst/>
+          </a:prstGeom>
+        </p:spPr>
+        <p:txBody>
+          <a:bodyPr wrap="square">
+            <a:spAutoFit/>
+          </a:bodyPr>
+          <a:lstStyle/>
+          <a:p>
+            <a:r>
+              <a:rPr lang="en-US" altLang="zh-CN" sz="2000">
+                <a:latin typeface="Times New Roman" panose="02020603050405020304" pitchFamily="18" charset="0"/>
+                <a:cs typeface="Times New Roman" panose="02020603050405020304" pitchFamily="18" charset="0"/>
+              </a:rPr>
+              <a:t>At each time step t, we sample M action sequences of length </a:t>
+            </a:r>
+            <a:r>
+              <a:rPr lang="en-US" altLang="zh-CN" sz="2000">
+                <a:latin typeface="Times New Roman" panose="02020603050405020304" pitchFamily="18" charset="0"/>
+                <a:cs typeface="Times New Roman" panose="02020603050405020304" pitchFamily="18" charset="0"/>
+              </a:rPr>
+              <a:t>H</a:t>
+            </a:r>
+            <a:r>
+              <a:rPr lang="en-US" altLang="zh-CN" sz="2000" smtClean="0">
+                <a:latin typeface="Times New Roman" panose="02020603050405020304" pitchFamily="18" charset="0"/>
+                <a:cs typeface="Times New Roman" panose="02020603050405020304" pitchFamily="18" charset="0"/>
+              </a:rPr>
+              <a:t>,                         , </a:t>
+            </a:r>
+            <a:r>
+              <a:rPr lang="en-US" altLang="zh-CN" sz="2000">
+                <a:latin typeface="Times New Roman" panose="02020603050405020304" pitchFamily="18" charset="0"/>
+                <a:cs typeface="Times New Roman" panose="02020603050405020304" pitchFamily="18" charset="0"/>
+              </a:rPr>
+              <a:t>and </a:t>
+            </a:r>
+            <a:r>
+              <a:rPr lang="en-US" altLang="zh-CN" sz="2000" smtClean="0">
+                <a:latin typeface="Times New Roman" panose="02020603050405020304" pitchFamily="18" charset="0"/>
+                <a:cs typeface="Times New Roman" panose="02020603050405020304" pitchFamily="18" charset="0"/>
+              </a:rPr>
+              <a:t>compute the </a:t>
+            </a:r>
+            <a:r>
+              <a:rPr lang="en-US" altLang="zh-CN" sz="2000">
+                <a:latin typeface="Times New Roman" panose="02020603050405020304" pitchFamily="18" charset="0"/>
+                <a:cs typeface="Times New Roman" panose="02020603050405020304" pitchFamily="18" charset="0"/>
+              </a:rPr>
+              <a:t>probabilities of success for each one</a:t>
+            </a:r>
+            <a:r>
+              <a:rPr lang="en-US" altLang="zh-CN" sz="2000">
+                <a:latin typeface="Times New Roman" panose="02020603050405020304" pitchFamily="18" charset="0"/>
+                <a:cs typeface="Times New Roman" panose="02020603050405020304" pitchFamily="18" charset="0"/>
+              </a:rPr>
+              <a:t>, </a:t>
+            </a:r>
+            <a:r>
+              <a:rPr lang="en-US" altLang="zh-CN" sz="2000" smtClean="0">
+                <a:latin typeface="Times New Roman" panose="02020603050405020304" pitchFamily="18" charset="0"/>
+                <a:cs typeface="Times New Roman" panose="02020603050405020304" pitchFamily="18" charset="0"/>
+              </a:rPr>
+              <a:t>denoted by                                                                            .       We then </a:t>
+            </a:r>
+            <a:r>
+              <a:rPr lang="en-US" altLang="zh-CN" sz="2000">
+                <a:latin typeface="Times New Roman" panose="02020603050405020304" pitchFamily="18" charset="0"/>
+                <a:cs typeface="Times New Roman" panose="02020603050405020304" pitchFamily="18" charset="0"/>
+              </a:rPr>
+              <a:t>select the K action sequences with the highest </a:t>
+            </a:r>
+            <a:r>
+              <a:rPr lang="en-US" altLang="zh-CN" sz="2000">
+                <a:latin typeface="Times New Roman" panose="02020603050405020304" pitchFamily="18" charset="0"/>
+                <a:cs typeface="Times New Roman" panose="02020603050405020304" pitchFamily="18" charset="0"/>
+              </a:rPr>
+              <a:t>values </a:t>
+            </a:r>
+            <a:r>
+              <a:rPr lang="en-US" altLang="zh-CN" sz="2000" smtClean="0">
+                <a:latin typeface="Times New Roman" panose="02020603050405020304" pitchFamily="18" charset="0"/>
+                <a:cs typeface="Times New Roman" panose="02020603050405020304" pitchFamily="18" charset="0"/>
+              </a:rPr>
+              <a:t>of                   ,                                           fit </a:t>
+            </a:r>
+            <a:r>
+              <a:rPr lang="en-US" altLang="zh-CN" sz="2000">
+                <a:latin typeface="Times New Roman" panose="02020603050405020304" pitchFamily="18" charset="0"/>
+                <a:cs typeface="Times New Roman" panose="02020603050405020304" pitchFamily="18" charset="0"/>
+              </a:rPr>
+              <a:t>a multivariate Gaussian distribution </a:t>
+            </a:r>
+            <a:r>
+              <a:rPr lang="en-US" altLang="zh-CN" sz="2000">
+                <a:latin typeface="Times New Roman" panose="02020603050405020304" pitchFamily="18" charset="0"/>
+                <a:cs typeface="Times New Roman" panose="02020603050405020304" pitchFamily="18" charset="0"/>
+              </a:rPr>
+              <a:t>to </a:t>
+            </a:r>
+            <a:r>
+              <a:rPr lang="en-US" altLang="zh-CN" sz="2000" smtClean="0">
+                <a:latin typeface="Times New Roman" panose="02020603050405020304" pitchFamily="18" charset="0"/>
+                <a:cs typeface="Times New Roman" panose="02020603050405020304" pitchFamily="18" charset="0"/>
+              </a:rPr>
+              <a:t>these K </a:t>
+            </a:r>
+            <a:r>
+              <a:rPr lang="en-US" altLang="zh-CN" sz="2000">
+                <a:latin typeface="Times New Roman" panose="02020603050405020304" pitchFamily="18" charset="0"/>
+                <a:cs typeface="Times New Roman" panose="02020603050405020304" pitchFamily="18" charset="0"/>
+              </a:rPr>
+              <a:t>selected </a:t>
+            </a:r>
+            <a:r>
+              <a:rPr lang="en-US" altLang="zh-CN" sz="2000" smtClean="0">
+                <a:latin typeface="Times New Roman" panose="02020603050405020304" pitchFamily="18" charset="0"/>
+                <a:cs typeface="Times New Roman" panose="02020603050405020304" pitchFamily="18" charset="0"/>
+              </a:rPr>
+              <a:t>action sequence</a:t>
+            </a:r>
+            <a:r>
+              <a:rPr lang="en-US" altLang="zh-CN" sz="2000">
+                <a:latin typeface="Times New Roman" panose="02020603050405020304" pitchFamily="18" charset="0"/>
+                <a:cs typeface="Times New Roman" panose="02020603050405020304" pitchFamily="18" charset="0"/>
+              </a:rPr>
+              <a:t>, and resample a new set </a:t>
+            </a:r>
+            <a:r>
+              <a:rPr lang="en-US" altLang="zh-CN" sz="2000">
+                <a:latin typeface="Times New Roman" panose="02020603050405020304" pitchFamily="18" charset="0"/>
+                <a:cs typeface="Times New Roman" panose="02020603050405020304" pitchFamily="18" charset="0"/>
+              </a:rPr>
+              <a:t>of </a:t>
+            </a:r>
+            <a:r>
+              <a:rPr lang="en-US" altLang="zh-CN" sz="2000" smtClean="0">
+                <a:latin typeface="Times New Roman" panose="02020603050405020304" pitchFamily="18" charset="0"/>
+                <a:cs typeface="Times New Roman" panose="02020603050405020304" pitchFamily="18" charset="0"/>
+              </a:rPr>
+              <a:t>M action </a:t>
+            </a:r>
+            <a:r>
+              <a:rPr lang="en-US" altLang="zh-CN" sz="2000">
+                <a:latin typeface="Times New Roman" panose="02020603050405020304" pitchFamily="18" charset="0"/>
+                <a:cs typeface="Times New Roman" panose="02020603050405020304" pitchFamily="18" charset="0"/>
+              </a:rPr>
+              <a:t>sequences from this distribution. The new </a:t>
+            </a:r>
+            <a:r>
+              <a:rPr lang="en-US" altLang="zh-CN" sz="2000">
+                <a:latin typeface="Times New Roman" panose="02020603050405020304" pitchFamily="18" charset="0"/>
+                <a:cs typeface="Times New Roman" panose="02020603050405020304" pitchFamily="18" charset="0"/>
+              </a:rPr>
+              <a:t>set </a:t>
+            </a:r>
+            <a:r>
+              <a:rPr lang="en-US" altLang="zh-CN" sz="2000" smtClean="0">
+                <a:latin typeface="Times New Roman" panose="02020603050405020304" pitchFamily="18" charset="0"/>
+                <a:cs typeface="Times New Roman" panose="02020603050405020304" pitchFamily="18" charset="0"/>
+              </a:rPr>
+              <a:t>of action sequences </a:t>
+            </a:r>
+            <a:r>
+              <a:rPr lang="en-US" altLang="zh-CN" sz="2000">
+                <a:latin typeface="Times New Roman" panose="02020603050405020304" pitchFamily="18" charset="0"/>
+                <a:cs typeface="Times New Roman" panose="02020603050405020304" pitchFamily="18" charset="0"/>
+              </a:rPr>
+              <a:t>improves on the previous set, and </a:t>
+            </a:r>
+            <a:r>
+              <a:rPr lang="en-US" altLang="zh-CN" sz="2000">
+                <a:latin typeface="Times New Roman" panose="02020603050405020304" pitchFamily="18" charset="0"/>
+                <a:cs typeface="Times New Roman" panose="02020603050405020304" pitchFamily="18" charset="0"/>
+              </a:rPr>
+              <a:t>the </a:t>
+            </a:r>
+            <a:r>
+              <a:rPr lang="en-US" altLang="zh-CN" sz="2000" smtClean="0">
+                <a:latin typeface="Times New Roman" panose="02020603050405020304" pitchFamily="18" charset="0"/>
+                <a:cs typeface="Times New Roman" panose="02020603050405020304" pitchFamily="18" charset="0"/>
+              </a:rPr>
+              <a:t>resampling and </a:t>
+            </a:r>
+            <a:r>
+              <a:rPr lang="en-US" altLang="zh-CN" sz="2000">
+                <a:latin typeface="Times New Roman" panose="02020603050405020304" pitchFamily="18" charset="0"/>
+                <a:cs typeface="Times New Roman" panose="02020603050405020304" pitchFamily="18" charset="0"/>
+              </a:rPr>
+              <a:t>refitting </a:t>
+            </a:r>
+            <a:r>
+              <a:rPr lang="en-US" altLang="zh-CN" sz="2000" smtClean="0">
+                <a:latin typeface="Times New Roman" panose="02020603050405020304" pitchFamily="18" charset="0"/>
+                <a:cs typeface="Times New Roman" panose="02020603050405020304" pitchFamily="18" charset="0"/>
+              </a:rPr>
+              <a:t>process </a:t>
+            </a:r>
+            <a:r>
+              <a:rPr lang="en-US" altLang="zh-CN" sz="2000">
+                <a:latin typeface="Times New Roman" panose="02020603050405020304" pitchFamily="18" charset="0"/>
+                <a:cs typeface="Times New Roman" panose="02020603050405020304" pitchFamily="18" charset="0"/>
+              </a:rPr>
+              <a:t>is repeated for Jt iterations. This corresponds </a:t>
+            </a:r>
+            <a:r>
+              <a:rPr lang="en-US" altLang="zh-CN" sz="2000">
+                <a:latin typeface="Times New Roman" panose="02020603050405020304" pitchFamily="18" charset="0"/>
+                <a:cs typeface="Times New Roman" panose="02020603050405020304" pitchFamily="18" charset="0"/>
+              </a:rPr>
+              <a:t>to </a:t>
+            </a:r>
+            <a:endParaRPr lang="en-US" altLang="zh-CN" sz="2000" smtClean="0">
+              <a:latin typeface="Times New Roman" panose="02020603050405020304" pitchFamily="18" charset="0"/>
+              <a:cs typeface="Times New Roman" panose="02020603050405020304" pitchFamily="18" charset="0"/>
+            </a:endParaRPr>
+          </a:p>
+          <a:p>
+            <a:r>
+              <a:rPr lang="en-US" altLang="zh-CN" sz="2000" smtClean="0">
+                <a:latin typeface="Times New Roman" panose="02020603050405020304" pitchFamily="18" charset="0"/>
+                <a:cs typeface="Times New Roman" panose="02020603050405020304" pitchFamily="18" charset="0"/>
+              </a:rPr>
+              <a:t>                                                                                                the CEM </a:t>
+            </a:r>
+            <a:r>
+              <a:rPr lang="en-US" altLang="zh-CN" sz="2000">
+                <a:latin typeface="Times New Roman" panose="02020603050405020304" pitchFamily="18" charset="0"/>
+                <a:cs typeface="Times New Roman" panose="02020603050405020304" pitchFamily="18" charset="0"/>
+              </a:rPr>
+              <a:t>stochastic optimization algorithm</a:t>
+            </a:r>
+            <a:r>
+              <a:rPr lang="en-US" altLang="zh-CN" sz="2000">
+                <a:latin typeface="Times New Roman" panose="02020603050405020304" pitchFamily="18" charset="0"/>
+                <a:cs typeface="Times New Roman" panose="02020603050405020304" pitchFamily="18" charset="0"/>
+              </a:rPr>
+              <a:t>. </a:t>
+            </a:r>
+            <a:r>
+              <a:rPr lang="en-US" altLang="zh-CN" sz="2000" smtClean="0">
+                <a:latin typeface="Times New Roman" panose="02020603050405020304" pitchFamily="18" charset="0"/>
+                <a:cs typeface="Times New Roman" panose="02020603050405020304" pitchFamily="18" charset="0"/>
+              </a:rPr>
+              <a:t>     </a:t>
+            </a:r>
+          </a:p>
+          <a:p>
+            <a:r>
+              <a:rPr lang="en-US" altLang="zh-CN" sz="2000" smtClean="0">
+                <a:latin typeface="Times New Roman" panose="02020603050405020304" pitchFamily="18" charset="0"/>
+                <a:cs typeface="Times New Roman" panose="02020603050405020304" pitchFamily="18" charset="0"/>
+              </a:rPr>
+              <a:t>                                                                                                At the </a:t>
+            </a:r>
+            <a:r>
+              <a:rPr lang="en-US" altLang="zh-CN" sz="2000">
+                <a:latin typeface="Times New Roman" panose="02020603050405020304" pitchFamily="18" charset="0"/>
+                <a:cs typeface="Times New Roman" panose="02020603050405020304" pitchFamily="18" charset="0"/>
+              </a:rPr>
+              <a:t>end </a:t>
+            </a:r>
+            <a:r>
+              <a:rPr lang="en-US" altLang="zh-CN" sz="2000">
+                <a:latin typeface="Times New Roman" panose="02020603050405020304" pitchFamily="18" charset="0"/>
+                <a:cs typeface="Times New Roman" panose="02020603050405020304" pitchFamily="18" charset="0"/>
+              </a:rPr>
+              <a:t>of </a:t>
+            </a:r>
+            <a:r>
+              <a:rPr lang="en-US" altLang="zh-CN" sz="2000" smtClean="0">
+                <a:latin typeface="Times New Roman" panose="02020603050405020304" pitchFamily="18" charset="0"/>
+                <a:cs typeface="Times New Roman" panose="02020603050405020304" pitchFamily="18" charset="0"/>
+              </a:rPr>
+              <a:t>the </a:t>
+            </a:r>
+            <a:r>
+              <a:rPr lang="en-US" altLang="zh-CN" sz="2000">
+                <a:latin typeface="Times New Roman" panose="02020603050405020304" pitchFamily="18" charset="0"/>
+                <a:cs typeface="Times New Roman" panose="02020603050405020304" pitchFamily="18" charset="0"/>
+              </a:rPr>
+              <a:t>last iteration, we </a:t>
+            </a:r>
+            <a:r>
+              <a:rPr lang="en-US" altLang="zh-CN" sz="2000">
+                <a:latin typeface="Times New Roman" panose="02020603050405020304" pitchFamily="18" charset="0"/>
+                <a:cs typeface="Times New Roman" panose="02020603050405020304" pitchFamily="18" charset="0"/>
+              </a:rPr>
+              <a:t>take </a:t>
+            </a:r>
+            <a:r>
+              <a:rPr lang="en-US" altLang="zh-CN" sz="2000" smtClean="0">
+                <a:latin typeface="Times New Roman" panose="02020603050405020304" pitchFamily="18" charset="0"/>
+                <a:cs typeface="Times New Roman" panose="02020603050405020304" pitchFamily="18" charset="0"/>
+              </a:rPr>
+              <a:t>the     </a:t>
+            </a:r>
+          </a:p>
+          <a:p>
+            <a:r>
+              <a:rPr lang="en-US" altLang="zh-CN" sz="2000" smtClean="0">
+                <a:latin typeface="Times New Roman" panose="02020603050405020304" pitchFamily="18" charset="0"/>
+                <a:cs typeface="Times New Roman" panose="02020603050405020304" pitchFamily="18" charset="0"/>
+              </a:rPr>
+              <a:t>                                                                                                sampled action sequence </a:t>
+            </a:r>
+          </a:p>
+          <a:p>
+            <a:r>
+              <a:rPr lang="en-US" altLang="zh-CN" sz="2000" smtClean="0">
+                <a:latin typeface="Times New Roman" panose="02020603050405020304" pitchFamily="18" charset="0"/>
+                <a:cs typeface="Times New Roman" panose="02020603050405020304" pitchFamily="18" charset="0"/>
+              </a:rPr>
+              <a:t>                                                                                                that </a:t>
+            </a:r>
+            <a:r>
+              <a:rPr lang="en-US" altLang="zh-CN" sz="2000">
+                <a:latin typeface="Times New Roman" panose="02020603050405020304" pitchFamily="18" charset="0"/>
+                <a:cs typeface="Times New Roman" panose="02020603050405020304" pitchFamily="18" charset="0"/>
+              </a:rPr>
+              <a:t>is most likely to </a:t>
+            </a:r>
+            <a:r>
+              <a:rPr lang="en-US" altLang="zh-CN" sz="2000">
+                <a:latin typeface="Times New Roman" panose="02020603050405020304" pitchFamily="18" charset="0"/>
+                <a:cs typeface="Times New Roman" panose="02020603050405020304" pitchFamily="18" charset="0"/>
+              </a:rPr>
+              <a:t>be </a:t>
+            </a:r>
+            <a:r>
+              <a:rPr lang="en-US" altLang="zh-CN" sz="2000" smtClean="0">
+                <a:latin typeface="Times New Roman" panose="02020603050405020304" pitchFamily="18" charset="0"/>
+                <a:cs typeface="Times New Roman" panose="02020603050405020304" pitchFamily="18" charset="0"/>
+              </a:rPr>
+              <a:t>successful, and    </a:t>
+            </a:r>
+          </a:p>
+          <a:p>
+            <a:r>
+              <a:rPr lang="en-US" altLang="zh-CN" sz="2000" smtClean="0">
+                <a:latin typeface="Times New Roman" panose="02020603050405020304" pitchFamily="18" charset="0"/>
+                <a:cs typeface="Times New Roman" panose="02020603050405020304" pitchFamily="18" charset="0"/>
+              </a:rPr>
+              <a:t>                                                                                                execute      on </a:t>
+            </a:r>
+            <a:r>
+              <a:rPr lang="en-US" altLang="zh-CN" sz="2000">
+                <a:latin typeface="Times New Roman" panose="02020603050405020304" pitchFamily="18" charset="0"/>
+                <a:cs typeface="Times New Roman" panose="02020603050405020304" pitchFamily="18" charset="0"/>
+              </a:rPr>
+              <a:t>the robot. We use Jt = </a:t>
+            </a:r>
+            <a:r>
+              <a:rPr lang="en-US" altLang="zh-CN" sz="2000">
+                <a:latin typeface="Times New Roman" panose="02020603050405020304" pitchFamily="18" charset="0"/>
+                <a:cs typeface="Times New Roman" panose="02020603050405020304" pitchFamily="18" charset="0"/>
+              </a:rPr>
+              <a:t>4 </a:t>
+            </a:r>
+            <a:endParaRPr lang="en-US" altLang="zh-CN" sz="2000" smtClean="0">
+              <a:latin typeface="Times New Roman" panose="02020603050405020304" pitchFamily="18" charset="0"/>
+              <a:cs typeface="Times New Roman" panose="02020603050405020304" pitchFamily="18" charset="0"/>
+            </a:endParaRPr>
+          </a:p>
+          <a:p>
+            <a:r>
+              <a:rPr lang="en-US" altLang="zh-CN" sz="2000" smtClean="0">
+                <a:latin typeface="Times New Roman" panose="02020603050405020304" pitchFamily="18" charset="0"/>
+                <a:cs typeface="Times New Roman" panose="02020603050405020304" pitchFamily="18" charset="0"/>
+              </a:rPr>
+              <a:t>                                                                                                iterations, M </a:t>
+            </a:r>
+            <a:r>
+              <a:rPr lang="en-US" altLang="zh-CN" sz="2000">
+                <a:latin typeface="Times New Roman" panose="02020603050405020304" pitchFamily="18" charset="0"/>
+                <a:cs typeface="Times New Roman" panose="02020603050405020304" pitchFamily="18" charset="0"/>
+              </a:rPr>
+              <a:t>= </a:t>
+            </a:r>
+            <a:r>
+              <a:rPr lang="en-US" altLang="zh-CN" sz="2000" smtClean="0">
+                <a:latin typeface="Times New Roman" panose="02020603050405020304" pitchFamily="18" charset="0"/>
+                <a:cs typeface="Times New Roman" panose="02020603050405020304" pitchFamily="18" charset="0"/>
+              </a:rPr>
+              <a:t>40 samples </a:t>
+            </a:r>
+            <a:r>
+              <a:rPr lang="en-US" altLang="zh-CN" sz="2000">
+                <a:latin typeface="Times New Roman" panose="02020603050405020304" pitchFamily="18" charset="0"/>
+                <a:cs typeface="Times New Roman" panose="02020603050405020304" pitchFamily="18" charset="0"/>
+              </a:rPr>
+              <a:t>per </a:t>
+            </a:r>
+            <a:r>
+              <a:rPr lang="en-US" altLang="zh-CN" sz="2000" smtClean="0">
+                <a:latin typeface="Times New Roman" panose="02020603050405020304" pitchFamily="18" charset="0"/>
+                <a:cs typeface="Times New Roman" panose="02020603050405020304" pitchFamily="18" charset="0"/>
+              </a:rPr>
+              <a:t>iteration</a:t>
+            </a:r>
+            <a:r>
+              <a:rPr lang="en-US" altLang="zh-CN" sz="2000">
+                <a:latin typeface="Times New Roman" panose="02020603050405020304" pitchFamily="18" charset="0"/>
+                <a:cs typeface="Times New Roman" panose="02020603050405020304" pitchFamily="18" charset="0"/>
+              </a:rPr>
+              <a:t>, </a:t>
+            </a:r>
+            <a:endParaRPr lang="en-US" altLang="zh-CN" sz="2000" smtClean="0">
+              <a:latin typeface="Times New Roman" panose="02020603050405020304" pitchFamily="18" charset="0"/>
+              <a:cs typeface="Times New Roman" panose="02020603050405020304" pitchFamily="18" charset="0"/>
+            </a:endParaRPr>
+          </a:p>
+          <a:p>
+            <a:r>
+              <a:rPr lang="en-US" altLang="zh-CN" sz="2000" smtClean="0">
+                <a:latin typeface="Times New Roman" panose="02020603050405020304" pitchFamily="18" charset="0"/>
+                <a:cs typeface="Times New Roman" panose="02020603050405020304" pitchFamily="18" charset="0"/>
+              </a:rPr>
+              <a:t>                                                                                                and </a:t>
+            </a:r>
+            <a:r>
+              <a:rPr lang="en-US" altLang="zh-CN" sz="2000">
+                <a:latin typeface="Times New Roman" panose="02020603050405020304" pitchFamily="18" charset="0"/>
+                <a:cs typeface="Times New Roman" panose="02020603050405020304" pitchFamily="18" charset="0"/>
+              </a:rPr>
+              <a:t>K = 10 </a:t>
+            </a:r>
+            <a:r>
+              <a:rPr lang="en-US" altLang="zh-CN" sz="2000">
+                <a:latin typeface="Times New Roman" panose="02020603050405020304" pitchFamily="18" charset="0"/>
+                <a:cs typeface="Times New Roman" panose="02020603050405020304" pitchFamily="18" charset="0"/>
+              </a:rPr>
+              <a:t>samples </a:t>
+            </a:r>
+            <a:r>
+              <a:rPr lang="en-US" altLang="zh-CN" sz="2000" smtClean="0">
+                <a:latin typeface="Times New Roman" panose="02020603050405020304" pitchFamily="18" charset="0"/>
+                <a:cs typeface="Times New Roman" panose="02020603050405020304" pitchFamily="18" charset="0"/>
+              </a:rPr>
+              <a:t>during the initial     </a:t>
+            </a:r>
+          </a:p>
+          <a:p>
+            <a:r>
+              <a:rPr lang="en-US" altLang="zh-CN" sz="2000" smtClean="0">
+                <a:latin typeface="Times New Roman" panose="02020603050405020304" pitchFamily="18" charset="0"/>
+                <a:cs typeface="Times New Roman" panose="02020603050405020304" pitchFamily="18" charset="0"/>
+              </a:rPr>
+              <a:t>                                                                                                planning </a:t>
+            </a:r>
+            <a:r>
+              <a:rPr lang="en-US" altLang="zh-CN" sz="2000">
+                <a:latin typeface="Times New Roman" panose="02020603050405020304" pitchFamily="18" charset="0"/>
+                <a:cs typeface="Times New Roman" panose="02020603050405020304" pitchFamily="18" charset="0"/>
+              </a:rPr>
+              <a:t>phase (t = 0) and, </a:t>
+            </a:r>
+            <a:r>
+              <a:rPr lang="en-US" altLang="zh-CN" sz="2000">
+                <a:latin typeface="Times New Roman" panose="02020603050405020304" pitchFamily="18" charset="0"/>
+                <a:cs typeface="Times New Roman" panose="02020603050405020304" pitchFamily="18" charset="0"/>
+              </a:rPr>
+              <a:t>when </a:t>
+            </a:r>
+            <a:endParaRPr lang="en-US" altLang="zh-CN" sz="2000" smtClean="0">
+              <a:latin typeface="Times New Roman" panose="02020603050405020304" pitchFamily="18" charset="0"/>
+              <a:cs typeface="Times New Roman" panose="02020603050405020304" pitchFamily="18" charset="0"/>
+            </a:endParaRPr>
+          </a:p>
+          <a:p>
+            <a:r>
+              <a:rPr lang="en-US" altLang="zh-CN" sz="2000" smtClean="0">
+                <a:latin typeface="Times New Roman" panose="02020603050405020304" pitchFamily="18" charset="0"/>
+                <a:cs typeface="Times New Roman" panose="02020603050405020304" pitchFamily="18" charset="0"/>
+              </a:rPr>
+              <a:t>                                                                                                replanning in real-time </a:t>
+            </a:r>
+            <a:r>
+              <a:rPr lang="en-US" altLang="zh-CN" sz="2000">
+                <a:latin typeface="Times New Roman" panose="02020603050405020304" pitchFamily="18" charset="0"/>
+                <a:cs typeface="Times New Roman" panose="02020603050405020304" pitchFamily="18" charset="0"/>
+              </a:rPr>
+              <a:t>(t &gt; 0), we take Jt </a:t>
+            </a:r>
+            <a:r>
+              <a:rPr lang="en-US" altLang="zh-CN" sz="2000">
+                <a:latin typeface="Times New Roman" panose="02020603050405020304" pitchFamily="18" charset="0"/>
+                <a:cs typeface="Times New Roman" panose="02020603050405020304" pitchFamily="18" charset="0"/>
+              </a:rPr>
+              <a:t>= </a:t>
+            </a:r>
+            <a:r>
+              <a:rPr lang="en-US" altLang="zh-CN" sz="2000" smtClean="0">
+                <a:latin typeface="Times New Roman" panose="02020603050405020304" pitchFamily="18" charset="0"/>
+                <a:cs typeface="Times New Roman" panose="02020603050405020304" pitchFamily="18" charset="0"/>
+              </a:rPr>
+              <a:t>   </a:t>
+            </a:r>
+          </a:p>
+          <a:p>
+            <a:r>
+              <a:rPr lang="en-US" altLang="zh-CN" sz="2000" smtClean="0">
+                <a:latin typeface="Times New Roman" panose="02020603050405020304" pitchFamily="18" charset="0"/>
+                <a:cs typeface="Times New Roman" panose="02020603050405020304" pitchFamily="18" charset="0"/>
+              </a:rPr>
+              <a:t>                                                                                                1 </a:t>
+            </a:r>
+            <a:r>
+              <a:rPr lang="en-US" altLang="zh-CN" sz="2000">
+                <a:latin typeface="Times New Roman" panose="02020603050405020304" pitchFamily="18" charset="0"/>
+                <a:cs typeface="Times New Roman" panose="02020603050405020304" pitchFamily="18" charset="0"/>
+              </a:rPr>
+              <a:t>iteration of M </a:t>
+            </a:r>
+            <a:r>
+              <a:rPr lang="en-US" altLang="zh-CN" sz="2000">
+                <a:latin typeface="Times New Roman" panose="02020603050405020304" pitchFamily="18" charset="0"/>
+                <a:cs typeface="Times New Roman" panose="02020603050405020304" pitchFamily="18" charset="0"/>
+              </a:rPr>
+              <a:t>= </a:t>
+            </a:r>
+            <a:r>
+              <a:rPr lang="en-US" altLang="zh-CN" sz="2000" smtClean="0">
+                <a:latin typeface="Times New Roman" panose="02020603050405020304" pitchFamily="18" charset="0"/>
+                <a:cs typeface="Times New Roman" panose="02020603050405020304" pitchFamily="18" charset="0"/>
+              </a:rPr>
+              <a:t>20 samples, performing </a:t>
+            </a:r>
+          </a:p>
+          <a:p>
+            <a:r>
+              <a:rPr lang="en-US" altLang="zh-CN" sz="2000" smtClean="0">
+                <a:latin typeface="Times New Roman" panose="02020603050405020304" pitchFamily="18" charset="0"/>
+                <a:cs typeface="Times New Roman" panose="02020603050405020304" pitchFamily="18" charset="0"/>
+              </a:rPr>
+              <a:t>                                                                                                just </a:t>
+            </a:r>
+            <a:r>
+              <a:rPr lang="en-US" altLang="zh-CN" sz="2000">
+                <a:latin typeface="Times New Roman" panose="02020603050405020304" pitchFamily="18" charset="0"/>
+                <a:cs typeface="Times New Roman" panose="02020603050405020304" pitchFamily="18" charset="0"/>
+              </a:rPr>
+              <a:t>one round of sampling. </a:t>
+            </a:r>
+            <a:r>
+              <a:rPr lang="en-US" altLang="zh-CN" sz="2000">
+                <a:latin typeface="Times New Roman" panose="02020603050405020304" pitchFamily="18" charset="0"/>
+                <a:cs typeface="Times New Roman" panose="02020603050405020304" pitchFamily="18" charset="0"/>
+              </a:rPr>
+              <a:t>Note </a:t>
+            </a:r>
+            <a:r>
+              <a:rPr lang="en-US" altLang="zh-CN" sz="2000" smtClean="0">
+                <a:latin typeface="Times New Roman" panose="02020603050405020304" pitchFamily="18" charset="0"/>
+                <a:cs typeface="Times New Roman" panose="02020603050405020304" pitchFamily="18" charset="0"/>
+              </a:rPr>
+              <a:t>that </a:t>
+            </a:r>
+            <a:r>
+              <a:rPr lang="en-US" altLang="zh-CN" sz="2000">
+                <a:latin typeface="Times New Roman" panose="02020603050405020304" pitchFamily="18" charset="0"/>
+                <a:cs typeface="Times New Roman" panose="02020603050405020304" pitchFamily="18" charset="0"/>
+              </a:rPr>
+              <a:t>each </a:t>
+            </a:r>
+            <a:r>
+              <a:rPr lang="en-US" altLang="zh-CN" sz="2000" smtClean="0">
+                <a:latin typeface="Times New Roman" panose="02020603050405020304" pitchFamily="18" charset="0"/>
+                <a:cs typeface="Times New Roman" panose="02020603050405020304" pitchFamily="18" charset="0"/>
+              </a:rPr>
+              <a:t> </a:t>
+            </a:r>
+          </a:p>
+          <a:p>
+            <a:r>
+              <a:rPr lang="en-US" altLang="zh-CN" sz="2000" smtClean="0">
+                <a:latin typeface="Times New Roman" panose="02020603050405020304" pitchFamily="18" charset="0"/>
+                <a:cs typeface="Times New Roman" panose="02020603050405020304" pitchFamily="18" charset="0"/>
+              </a:rPr>
+              <a:t>                                                                                                batch of </a:t>
+            </a:r>
+            <a:r>
+              <a:rPr lang="en-US" altLang="zh-CN" sz="2000">
+                <a:latin typeface="Times New Roman" panose="02020603050405020304" pitchFamily="18" charset="0"/>
+                <a:cs typeface="Times New Roman" panose="02020603050405020304" pitchFamily="18" charset="0"/>
+              </a:rPr>
+              <a:t>M samples </a:t>
+            </a:r>
+            <a:r>
+              <a:rPr lang="en-US" altLang="zh-CN" sz="2000">
+                <a:latin typeface="Times New Roman" panose="02020603050405020304" pitchFamily="18" charset="0"/>
+                <a:cs typeface="Times New Roman" panose="02020603050405020304" pitchFamily="18" charset="0"/>
+              </a:rPr>
+              <a:t>corresponds </a:t>
+            </a:r>
+            <a:r>
+              <a:rPr lang="en-US" altLang="zh-CN" sz="2000" smtClean="0">
+                <a:latin typeface="Times New Roman" panose="02020603050405020304" pitchFamily="18" charset="0"/>
+                <a:cs typeface="Times New Roman" panose="02020603050405020304" pitchFamily="18" charset="0"/>
+              </a:rPr>
+              <a:t>to a </a:t>
+            </a:r>
+          </a:p>
+          <a:p>
+            <a:r>
+              <a:rPr lang="en-US" altLang="zh-CN" sz="2000">
+                <a:latin typeface="Times New Roman" panose="02020603050405020304" pitchFamily="18" charset="0"/>
+                <a:cs typeface="Times New Roman" panose="02020603050405020304" pitchFamily="18" charset="0"/>
+              </a:rPr>
+              <a:t> </a:t>
+            </a:r>
+            <a:r>
+              <a:rPr lang="en-US" altLang="zh-CN" sz="2000" smtClean="0">
+                <a:latin typeface="Times New Roman" panose="02020603050405020304" pitchFamily="18" charset="0"/>
+                <a:cs typeface="Times New Roman" panose="02020603050405020304" pitchFamily="18" charset="0"/>
+              </a:rPr>
+              <a:t>                                                                                               forward pass </a:t>
+            </a:r>
+            <a:r>
+              <a:rPr lang="en-US" altLang="zh-CN" sz="2000">
+                <a:latin typeface="Times New Roman" panose="02020603050405020304" pitchFamily="18" charset="0"/>
+                <a:cs typeface="Times New Roman" panose="02020603050405020304" pitchFamily="18" charset="0"/>
+              </a:rPr>
+              <a:t>through </a:t>
+            </a:r>
+            <a:r>
+              <a:rPr lang="en-US" altLang="zh-CN" sz="2000" smtClean="0">
+                <a:latin typeface="Times New Roman" panose="02020603050405020304" pitchFamily="18" charset="0"/>
+                <a:cs typeface="Times New Roman" panose="02020603050405020304" pitchFamily="18" charset="0"/>
+              </a:rPr>
+              <a:t>deep recurrent    </a:t>
+            </a:r>
+          </a:p>
+          <a:p>
+            <a:r>
+              <a:rPr lang="en-US" altLang="zh-CN" sz="2000" smtClean="0">
+                <a:latin typeface="Times New Roman" panose="02020603050405020304" pitchFamily="18" charset="0"/>
+                <a:cs typeface="Times New Roman" panose="02020603050405020304" pitchFamily="18" charset="0"/>
+              </a:rPr>
+              <a:t>                                                                                                network </a:t>
+            </a:r>
+            <a:r>
+              <a:rPr lang="en-US" altLang="zh-CN" sz="2000">
+                <a:latin typeface="Times New Roman" panose="02020603050405020304" pitchFamily="18" charset="0"/>
+                <a:cs typeface="Times New Roman" panose="02020603050405020304" pitchFamily="18" charset="0"/>
+              </a:rPr>
+              <a:t>with </a:t>
+            </a:r>
+            <a:r>
+              <a:rPr lang="en-US" altLang="zh-CN" sz="2000" smtClean="0">
+                <a:latin typeface="Times New Roman" panose="02020603050405020304" pitchFamily="18" charset="0"/>
+                <a:cs typeface="Times New Roman" panose="02020603050405020304" pitchFamily="18" charset="0"/>
+              </a:rPr>
+              <a:t>a batch </a:t>
+            </a:r>
+            <a:r>
+              <a:rPr lang="en-US" altLang="zh-CN" sz="2000">
+                <a:latin typeface="Times New Roman" panose="02020603050405020304" pitchFamily="18" charset="0"/>
+                <a:cs typeface="Times New Roman" panose="02020603050405020304" pitchFamily="18" charset="0"/>
+              </a:rPr>
+              <a:t>size </a:t>
+            </a:r>
+            <a:r>
+              <a:rPr lang="en-US" altLang="zh-CN" sz="2000" smtClean="0">
+                <a:latin typeface="Times New Roman" panose="02020603050405020304" pitchFamily="18" charset="0"/>
+                <a:cs typeface="Times New Roman" panose="02020603050405020304" pitchFamily="18" charset="0"/>
+              </a:rPr>
+              <a:t>of M</a:t>
+            </a:r>
+            <a:r>
+              <a:rPr lang="en-US" altLang="zh-CN" sz="2000">
+                <a:latin typeface="Times New Roman" panose="02020603050405020304" pitchFamily="18" charset="0"/>
+                <a:cs typeface="Times New Roman" panose="02020603050405020304" pitchFamily="18" charset="0"/>
+              </a:rPr>
+              <a:t>, </a:t>
+            </a:r>
+            <a:r>
+              <a:rPr lang="en-US" altLang="zh-CN" sz="2000">
+                <a:latin typeface="Times New Roman" panose="02020603050405020304" pitchFamily="18" charset="0"/>
+                <a:cs typeface="Times New Roman" panose="02020603050405020304" pitchFamily="18" charset="0"/>
+              </a:rPr>
+              <a:t>and </a:t>
+            </a:r>
+            <a:endParaRPr lang="en-US" altLang="zh-CN" sz="2000" smtClean="0">
+              <a:latin typeface="Times New Roman" panose="02020603050405020304" pitchFamily="18" charset="0"/>
+              <a:cs typeface="Times New Roman" panose="02020603050405020304" pitchFamily="18" charset="0"/>
+            </a:endParaRPr>
+          </a:p>
+          <a:p>
+            <a:r>
+              <a:rPr lang="en-US" altLang="zh-CN" sz="2000" smtClean="0">
+                <a:latin typeface="Times New Roman" panose="02020603050405020304" pitchFamily="18" charset="0"/>
+                <a:cs typeface="Times New Roman" panose="02020603050405020304" pitchFamily="18" charset="0"/>
+              </a:rPr>
+              <a:t>                                                                                                therefore can be </a:t>
+            </a:r>
+            <a:r>
+              <a:rPr lang="en-US" altLang="zh-CN" sz="2000">
+                <a:latin typeface="Times New Roman" panose="02020603050405020304" pitchFamily="18" charset="0"/>
+                <a:cs typeface="Times New Roman" panose="02020603050405020304" pitchFamily="18" charset="0"/>
+              </a:rPr>
+              <a:t>parallelized </a:t>
+            </a:r>
+            <a:r>
+              <a:rPr lang="en-US" altLang="zh-CN" sz="2000">
+                <a:latin typeface="Times New Roman" panose="02020603050405020304" pitchFamily="18" charset="0"/>
+                <a:cs typeface="Times New Roman" panose="02020603050405020304" pitchFamily="18" charset="0"/>
+              </a:rPr>
+              <a:t>very </a:t>
+            </a:r>
+            <a:endParaRPr lang="en-US" altLang="zh-CN" sz="2000" smtClean="0">
+              <a:latin typeface="Times New Roman" panose="02020603050405020304" pitchFamily="18" charset="0"/>
+              <a:cs typeface="Times New Roman" panose="02020603050405020304" pitchFamily="18" charset="0"/>
+            </a:endParaRPr>
+          </a:p>
+          <a:p>
+            <a:r>
+              <a:rPr lang="en-US" altLang="zh-CN" sz="2000" smtClean="0">
+                <a:latin typeface="Times New Roman" panose="02020603050405020304" pitchFamily="18" charset="0"/>
+                <a:cs typeface="Times New Roman" panose="02020603050405020304" pitchFamily="18" charset="0"/>
+              </a:rPr>
+              <a:t>                                                                                                efficiently</a:t>
+            </a:r>
+            <a:endParaRPr lang="zh-CN" altLang="en-US" sz="2000">
+              <a:latin typeface="Times New Roman" panose="02020603050405020304" pitchFamily="18" charset="0"/>
+              <a:cs typeface="Times New Roman" panose="02020603050405020304" pitchFamily="18" charset="0"/>
+            </a:endParaRPr>
+          </a:p>
+        </p:txBody>
+      </p:sp>
+      <p:pic>
+        <p:nvPicPr>
+          <p:cNvPr id="7" name="图片 6"/>
+          <p:cNvPicPr>
+            <a:picLocks noChangeAspect="1"/>
+          </p:cNvPicPr>
+          <p:nvPr/>
+        </p:nvPicPr>
+        <p:blipFill>
+          <a:blip r:embed="rId2"/>
+          <a:stretch>
+            <a:fillRect/>
+          </a:stretch>
+        </p:blipFill>
+        <p:spPr>
+          <a:xfrm>
+            <a:off x="1028919" y="2105741"/>
+            <a:ext cx="6088076" cy="4610943"/>
+          </a:xfrm>
+          <a:prstGeom prst="rect">
+            <a:avLst/>
+          </a:prstGeom>
+        </p:spPr>
+      </p:pic>
+      <p:pic>
+        <p:nvPicPr>
+          <p:cNvPr id="8" name="图片 7"/>
+          <p:cNvPicPr>
+            <a:picLocks noChangeAspect="1"/>
+          </p:cNvPicPr>
+          <p:nvPr/>
+        </p:nvPicPr>
+        <p:blipFill>
+          <a:blip r:embed="rId3"/>
+          <a:stretch>
+            <a:fillRect/>
+          </a:stretch>
+        </p:blipFill>
+        <p:spPr>
+          <a:xfrm>
+            <a:off x="7747462" y="138030"/>
+            <a:ext cx="1525979" cy="299746"/>
+          </a:xfrm>
+          <a:prstGeom prst="rect">
+            <a:avLst/>
+          </a:prstGeom>
+        </p:spPr>
+      </p:pic>
+      <p:pic>
+        <p:nvPicPr>
+          <p:cNvPr id="9" name="图片 8"/>
+          <p:cNvPicPr>
+            <a:picLocks noChangeAspect="1"/>
+          </p:cNvPicPr>
+          <p:nvPr/>
+        </p:nvPicPr>
+        <p:blipFill>
+          <a:blip r:embed="rId4"/>
+          <a:stretch>
+            <a:fillRect/>
+          </a:stretch>
+        </p:blipFill>
+        <p:spPr>
+          <a:xfrm>
+            <a:off x="6421693" y="437776"/>
+            <a:ext cx="4552381" cy="304762"/>
+          </a:xfrm>
+          <a:prstGeom prst="rect">
+            <a:avLst/>
+          </a:prstGeom>
+        </p:spPr>
+      </p:pic>
+      <p:pic>
+        <p:nvPicPr>
+          <p:cNvPr id="10" name="图片 9"/>
+          <p:cNvPicPr>
+            <a:picLocks noChangeAspect="1"/>
+          </p:cNvPicPr>
+          <p:nvPr/>
+        </p:nvPicPr>
+        <p:blipFill>
+          <a:blip r:embed="rId5"/>
+          <a:stretch>
+            <a:fillRect/>
+          </a:stretch>
+        </p:blipFill>
+        <p:spPr>
+          <a:xfrm>
+            <a:off x="8048546" y="754836"/>
+            <a:ext cx="923810" cy="295238"/>
+          </a:xfrm>
+          <a:prstGeom prst="rect">
+            <a:avLst/>
+          </a:prstGeom>
+        </p:spPr>
+      </p:pic>
+      <p:pic>
+        <p:nvPicPr>
+          <p:cNvPr id="11" name="图片 10"/>
+          <p:cNvPicPr>
+            <a:picLocks noChangeAspect="1"/>
+          </p:cNvPicPr>
+          <p:nvPr/>
+        </p:nvPicPr>
+        <p:blipFill>
+          <a:blip r:embed="rId6"/>
+          <a:stretch>
+            <a:fillRect/>
+          </a:stretch>
+        </p:blipFill>
+        <p:spPr>
+          <a:xfrm>
+            <a:off x="10063238" y="2601399"/>
+            <a:ext cx="1209524" cy="266667"/>
+          </a:xfrm>
+          <a:prstGeom prst="rect">
+            <a:avLst/>
+          </a:prstGeom>
+        </p:spPr>
+      </p:pic>
+      <p:pic>
+        <p:nvPicPr>
+          <p:cNvPr id="12" name="图片 11"/>
+          <p:cNvPicPr>
+            <a:picLocks noChangeAspect="1"/>
+          </p:cNvPicPr>
+          <p:nvPr/>
+        </p:nvPicPr>
+        <p:blipFill>
+          <a:blip r:embed="rId7"/>
+          <a:stretch>
+            <a:fillRect/>
+          </a:stretch>
+        </p:blipFill>
+        <p:spPr>
+          <a:xfrm>
+            <a:off x="8190116" y="3209285"/>
+            <a:ext cx="266667" cy="295238"/>
+          </a:xfrm>
+          <a:prstGeom prst="rect">
+            <a:avLst/>
+          </a:prstGeom>
+        </p:spPr>
+      </p:pic>
+    </p:spTree>
+    <p:extLst>
+      <p:ext uri="{BB962C8B-B14F-4D97-AF65-F5344CB8AC3E}">
+        <p14:creationId xmlns:p14="http://schemas.microsoft.com/office/powerpoint/2010/main" val="438749067"/>
+      </p:ext>
+    </p:extLst>
+  </p:cSld>
+  <p:clrMapOvr>
+    <a:masterClrMapping/>
+  </p:clrMapOvr>
+  <p:timing>
+    <p:tnLst>
+      <p:par>
+        <p:cTn id="1" dur="indefinite" restart="never" nodeType="tmRoot"/>
+      </p:par>
+    </p:tnLst>
+  </p:timing>
+</p:sld>
+</file>
+
+<file path=ppt/slides/slide21.xml><?xml version="1.0" encoding="utf-8"?>
+<p:sld xmlns:a="http://schemas.openxmlformats.org/drawingml/2006/main" xmlns:r="http://schemas.openxmlformats.org/officeDocument/2006/relationships" xmlns:p="http://schemas.openxmlformats.org/presentationml/2006/main">
+  <p:cSld>
+    <p:spTree>
+      <p:nvGrpSpPr>
+        <p:cNvPr id="1" name=""/>
+        <p:cNvGrpSpPr/>
+        <p:nvPr/>
+      </p:nvGrpSpPr>
+      <p:grpSpPr>
+        <a:xfrm>
+          <a:off x="0" y="0"/>
+          <a:ext cx="0" cy="0"/>
+          <a:chOff x="0" y="0"/>
+          <a:chExt cx="0" cy="0"/>
+        </a:xfrm>
+      </p:grpSpPr>
+      <p:pic>
+        <p:nvPicPr>
+          <p:cNvPr id="4" name="图片 3"/>
+          <p:cNvPicPr>
+            <a:picLocks noChangeAspect="1"/>
+          </p:cNvPicPr>
+          <p:nvPr/>
+        </p:nvPicPr>
+        <p:blipFill>
+          <a:blip r:embed="rId2"/>
+          <a:stretch>
+            <a:fillRect/>
+          </a:stretch>
+        </p:blipFill>
+        <p:spPr>
+          <a:xfrm>
+            <a:off x="367571" y="190219"/>
+            <a:ext cx="5276190" cy="3971429"/>
+          </a:xfrm>
+          <a:prstGeom prst="rect">
+            <a:avLst/>
+          </a:prstGeom>
+        </p:spPr>
+      </p:pic>
+      <p:pic>
+        <p:nvPicPr>
+          <p:cNvPr id="5" name="图片 4"/>
+          <p:cNvPicPr>
+            <a:picLocks noChangeAspect="1"/>
+          </p:cNvPicPr>
+          <p:nvPr/>
+        </p:nvPicPr>
+        <p:blipFill>
+          <a:blip r:embed="rId3"/>
+          <a:stretch>
+            <a:fillRect/>
+          </a:stretch>
+        </p:blipFill>
+        <p:spPr>
+          <a:xfrm>
+            <a:off x="5824343" y="410352"/>
+            <a:ext cx="5352381" cy="3390476"/>
+          </a:xfrm>
+          <a:prstGeom prst="rect">
+            <a:avLst/>
+          </a:prstGeom>
+        </p:spPr>
+      </p:pic>
+      <p:sp>
+        <p:nvSpPr>
+          <p:cNvPr id="6" name="矩形 5"/>
+          <p:cNvSpPr/>
+          <p:nvPr/>
+        </p:nvSpPr>
+        <p:spPr>
+          <a:xfrm>
+            <a:off x="3529484" y="5200134"/>
+            <a:ext cx="4589718" cy="369332"/>
+          </a:xfrm>
+          <a:prstGeom prst="rect">
+            <a:avLst/>
+          </a:prstGeom>
+        </p:spPr>
+        <p:txBody>
+          <a:bodyPr wrap="none">
+            <a:spAutoFit/>
+          </a:bodyPr>
+          <a:lstStyle/>
+          <a:p>
+            <a:r>
+              <a:rPr lang="en-US" altLang="zh-CN">
+                <a:latin typeface="Times New Roman" panose="02020603050405020304" pitchFamily="18" charset="0"/>
+                <a:cs typeface="Times New Roman" panose="02020603050405020304" pitchFamily="18" charset="0"/>
+              </a:rPr>
+              <a:t>See </a:t>
+            </a:r>
+            <a:r>
+              <a:rPr lang="en-US" altLang="zh-CN">
+                <a:latin typeface="Times New Roman" panose="02020603050405020304" pitchFamily="18" charset="0"/>
+                <a:cs typeface="Times New Roman" panose="02020603050405020304" pitchFamily="18" charset="0"/>
+                <a:hlinkClick r:id="rId4"/>
+              </a:rPr>
+              <a:t>https://sites.google.com/site/robotforesight</a:t>
+            </a:r>
+            <a:r>
+              <a:rPr lang="en-US" altLang="zh-CN">
+                <a:latin typeface="Times New Roman" panose="02020603050405020304" pitchFamily="18" charset="0"/>
+                <a:cs typeface="Times New Roman" panose="02020603050405020304" pitchFamily="18" charset="0"/>
+              </a:rPr>
+              <a:t>/</a:t>
+            </a:r>
+            <a:endParaRPr lang="zh-CN" altLang="en-US">
+              <a:latin typeface="Times New Roman" panose="02020603050405020304" pitchFamily="18" charset="0"/>
+              <a:cs typeface="Times New Roman" panose="02020603050405020304" pitchFamily="18" charset="0"/>
+            </a:endParaRPr>
+          </a:p>
+        </p:txBody>
+      </p:sp>
+    </p:spTree>
+    <p:extLst>
+      <p:ext uri="{BB962C8B-B14F-4D97-AF65-F5344CB8AC3E}">
+        <p14:creationId xmlns:p14="http://schemas.microsoft.com/office/powerpoint/2010/main" val="4089674872"/>
+      </p:ext>
+    </p:extLst>
+  </p:cSld>
+  <p:clrMapOvr>
+    <a:masterClrMapping/>
+  </p:clrMapOvr>
+  <p:timing>
+    <p:tnLst>
+      <p:par>
+        <p:cTn id="1" dur="indefinite" restart="never" nodeType="tmRoot"/>
+      </p:par>
+    </p:tnLst>
+  </p:timing>
 </p:sld>
 </file>
 
@@ -4473,51 +7895,23 @@
                 <a:latin typeface="Times New Roman" panose="02020603050405020304" pitchFamily="18" charset="0"/>
                 <a:cs typeface="Times New Roman" panose="02020603050405020304" pitchFamily="18" charset="0"/>
               </a:rPr>
-              <a:t>Paper 1: this paper that introduced the Guided policy search (GPS) </a:t>
+              <a:t>Paper 1: this paper that introduced the Guided policy search (GPS) algorithm.The policy search is </a:t>
+            </a:r>
+          </a:p>
+          <a:p>
+            <a:r>
+              <a:rPr lang="en-US" altLang="zh-CN" sz="2000" dirty="0">
+                <a:latin typeface="Times New Roman" panose="02020603050405020304" pitchFamily="18" charset="0"/>
+                <a:cs typeface="Times New Roman" panose="02020603050405020304" pitchFamily="18" charset="0"/>
+              </a:rPr>
+              <a:t> </a:t>
             </a:r>
             <a:r>
               <a:rPr lang="en-US" altLang="zh-CN" sz="2000" dirty="0" smtClean="0">
                 <a:latin typeface="Times New Roman" panose="02020603050405020304" pitchFamily="18" charset="0"/>
                 <a:cs typeface="Times New Roman" panose="02020603050405020304" pitchFamily="18" charset="0"/>
               </a:rPr>
-              <a:t>algorithm.The </a:t>
-            </a:r>
-            <a:r>
-              <a:rPr lang="en-US" altLang="zh-CN" sz="2000" dirty="0" smtClean="0">
-                <a:latin typeface="Times New Roman" panose="02020603050405020304" pitchFamily="18" charset="0"/>
-                <a:cs typeface="Times New Roman" panose="02020603050405020304" pitchFamily="18" charset="0"/>
-              </a:rPr>
-              <a:t>policy search is </a:t>
-            </a:r>
-          </a:p>
-          <a:p>
-            <a:r>
-              <a:rPr lang="en-US" altLang="zh-CN" sz="2000" dirty="0">
-                <a:latin typeface="Times New Roman" panose="02020603050405020304" pitchFamily="18" charset="0"/>
-                <a:cs typeface="Times New Roman" panose="02020603050405020304" pitchFamily="18" charset="0"/>
-              </a:rPr>
-              <a:t> </a:t>
-            </a:r>
-            <a:r>
-              <a:rPr lang="en-US" altLang="zh-CN" sz="2000" dirty="0" smtClean="0">
-                <a:latin typeface="Times New Roman" panose="02020603050405020304" pitchFamily="18" charset="0"/>
-                <a:cs typeface="Times New Roman" panose="02020603050405020304" pitchFamily="18" charset="0"/>
-              </a:rPr>
-              <a:t>             model-free, it is guided by a model-based DDP </a:t>
-            </a:r>
-            <a:r>
-              <a:rPr lang="en-US" altLang="zh-CN" sz="2000" dirty="0" smtClean="0">
-                <a:latin typeface="Times New Roman" panose="02020603050405020304" pitchFamily="18" charset="0"/>
-                <a:cs typeface="Times New Roman" panose="02020603050405020304" pitchFamily="18" charset="0"/>
-              </a:rPr>
-              <a:t>algorithm</a:t>
-            </a:r>
-            <a:r>
-              <a:rPr lang="en-US" altLang="zh-CN" sz="2000" dirty="0" smtClean="0">
-                <a:latin typeface="Times New Roman" panose="02020603050405020304" pitchFamily="18" charset="0"/>
-                <a:cs typeface="Times New Roman" panose="02020603050405020304" pitchFamily="18" charset="0"/>
-              </a:rPr>
-              <a:t>, which generate the guided </a:t>
+              <a:t>             model-free, it is guided by a model-based DDP algorithm, which generate the guided </a:t>
             </a:r>
           </a:p>
           <a:p>
@@ -4571,21 +7965,7 @@
                 <a:latin typeface="Times New Roman" panose="02020603050405020304" pitchFamily="18" charset="0"/>
                 <a:cs typeface="Times New Roman" panose="02020603050405020304" pitchFamily="18" charset="0"/>
               </a:rPr>
-              <a:t>Search </a:t>
-            </a:r>
-            <a:r>
-              <a:rPr lang="en-US" altLang="zh-CN" sz="2000" dirty="0" smtClean="0">
-                <a:latin typeface="Times New Roman" panose="02020603050405020304" pitchFamily="18" charset="0"/>
-                <a:cs typeface="Times New Roman" panose="02020603050405020304" pitchFamily="18" charset="0"/>
-              </a:rPr>
-              <a:t>algorithm </a:t>
-            </a:r>
-            <a:r>
-              <a:rPr lang="en-US" altLang="zh-CN" sz="2000" dirty="0" smtClean="0">
-                <a:latin typeface="Times New Roman" panose="02020603050405020304" pitchFamily="18" charset="0"/>
-                <a:cs typeface="Times New Roman" panose="02020603050405020304" pitchFamily="18" charset="0"/>
-              </a:rPr>
-              <a:t>based on trajectory  </a:t>
+              <a:t>Search algorithm based on trajectory  </a:t>
             </a:r>
           </a:p>
           <a:p>
@@ -4644,21 +8024,7 @@
                 <a:latin typeface="Times New Roman" panose="02020603050405020304" pitchFamily="18" charset="0"/>
                 <a:cs typeface="Times New Roman" panose="02020603050405020304" pitchFamily="18" charset="0"/>
               </a:rPr>
-              <a:t>search </a:t>
-            </a:r>
-            <a:r>
-              <a:rPr lang="en-US" altLang="zh-CN" sz="2000" dirty="0" smtClean="0">
-                <a:latin typeface="Times New Roman" panose="02020603050405020304" pitchFamily="18" charset="0"/>
-                <a:cs typeface="Times New Roman" panose="02020603050405020304" pitchFamily="18" charset="0"/>
-              </a:rPr>
-              <a:t>algorithm </a:t>
-            </a:r>
-            <a:r>
-              <a:rPr lang="en-US" altLang="zh-CN" sz="2000" dirty="0" smtClean="0">
-                <a:latin typeface="Times New Roman" panose="02020603050405020304" pitchFamily="18" charset="0"/>
-                <a:cs typeface="Times New Roman" panose="02020603050405020304" pitchFamily="18" charset="0"/>
-              </a:rPr>
-              <a:t>based on trajectory </a:t>
+              <a:t>search algorithm based on trajectory </a:t>
             </a:r>
           </a:p>
           <a:p>
@@ -4691,35 +8057,7 @@
                 <a:latin typeface="Times New Roman" panose="02020603050405020304" pitchFamily="18" charset="0"/>
                 <a:cs typeface="Times New Roman" panose="02020603050405020304" pitchFamily="18" charset="0"/>
               </a:rPr>
-              <a:t>              in the GPS </a:t>
-            </a:r>
-            <a:r>
-              <a:rPr lang="en-US" altLang="zh-CN" sz="2000" dirty="0" smtClean="0">
-                <a:latin typeface="Times New Roman" panose="02020603050405020304" pitchFamily="18" charset="0"/>
-                <a:cs typeface="Times New Roman" panose="02020603050405020304" pitchFamily="18" charset="0"/>
-              </a:rPr>
-              <a:t>algorithm</a:t>
-            </a:r>
-            <a:r>
-              <a:rPr lang="en-US" altLang="zh-CN" sz="2000" dirty="0" smtClean="0">
-                <a:latin typeface="Times New Roman" panose="02020603050405020304" pitchFamily="18" charset="0"/>
-                <a:cs typeface="Times New Roman" panose="02020603050405020304" pitchFamily="18" charset="0"/>
-              </a:rPr>
-              <a:t>, the guided </a:t>
-            </a:r>
-            <a:r>
-              <a:rPr lang="en-US" altLang="zh-CN" sz="2000" dirty="0" smtClean="0">
-                <a:latin typeface="Times New Roman" panose="02020603050405020304" pitchFamily="18" charset="0"/>
-                <a:cs typeface="Times New Roman" panose="02020603050405020304" pitchFamily="18" charset="0"/>
-              </a:rPr>
-              <a:t>algorithm </a:t>
-            </a:r>
-            <a:r>
-              <a:rPr lang="en-US" altLang="zh-CN" sz="2000" dirty="0" smtClean="0">
-                <a:latin typeface="Times New Roman" panose="02020603050405020304" pitchFamily="18" charset="0"/>
-                <a:cs typeface="Times New Roman" panose="02020603050405020304" pitchFamily="18" charset="0"/>
-              </a:rPr>
-              <a:t>can work model-free.</a:t>
+              <a:t>              in the GPS algorithm, the guided algorithm can work model-free.</a:t>
             </a:r>
             <a:endParaRPr lang="en-US" altLang="zh-CN" sz="2000" dirty="0">
               <a:latin typeface="Times New Roman" panose="02020603050405020304" pitchFamily="18" charset="0"/>
@@ -4738,123 +8076,88 @@
                 <a:latin typeface="Times New Roman" panose="02020603050405020304" pitchFamily="18" charset="0"/>
                 <a:cs typeface="Times New Roman" panose="02020603050405020304" pitchFamily="18" charset="0"/>
               </a:rPr>
-              <a:t>Paper 5: </a:t>
+              <a:t>Paper 5: the above are all execute </a:t>
+            </a:r>
+            <a:r>
+              <a:rPr lang="en-US" altLang="zh-CN" sz="2000" dirty="0">
+                <a:latin typeface="Times New Roman" panose="02020603050405020304" pitchFamily="18" charset="0"/>
+                <a:cs typeface="Times New Roman" panose="02020603050405020304" pitchFamily="18" charset="0"/>
+              </a:rPr>
+              <a:t>simulated robotic manipulation </a:t>
             </a:r>
             <a:r>
               <a:rPr lang="en-US" altLang="zh-CN" sz="2000" dirty="0" smtClean="0">
                 <a:latin typeface="Times New Roman" panose="02020603050405020304" pitchFamily="18" charset="0"/>
                 <a:cs typeface="Times New Roman" panose="02020603050405020304" pitchFamily="18" charset="0"/>
               </a:rPr>
-              <a:t>the </a:t>
-            </a:r>
+              <a:t>tasks. This paper introduced several </a:t>
+            </a:r>
+          </a:p>
+          <a:p>
             <a:r>
               <a:rPr lang="en-US" altLang="zh-CN" sz="2000" dirty="0" smtClean="0">
                 <a:latin typeface="Times New Roman" panose="02020603050405020304" pitchFamily="18" charset="0"/>
                 <a:cs typeface="Times New Roman" panose="02020603050405020304" pitchFamily="18" charset="0"/>
               </a:rPr>
-              <a:t>above are all execute </a:t>
+              <a:t>              improvements </a:t>
             </a:r>
             <a:r>
               <a:rPr lang="en-US" altLang="zh-CN" sz="2000" dirty="0">
                 <a:latin typeface="Times New Roman" panose="02020603050405020304" pitchFamily="18" charset="0"/>
                 <a:cs typeface="Times New Roman" panose="02020603050405020304" pitchFamily="18" charset="0"/>
               </a:rPr>
-              <a:t>simulated robotic manipulation </a:t>
+              <a:t>to </a:t>
             </a:r>
             <a:r>
               <a:rPr lang="en-US" altLang="zh-CN" sz="2000" dirty="0" smtClean="0">
                 <a:latin typeface="Times New Roman" panose="02020603050405020304" pitchFamily="18" charset="0"/>
                 <a:cs typeface="Times New Roman" panose="02020603050405020304" pitchFamily="18" charset="0"/>
               </a:rPr>
-              <a:t>tasks. This paper introduced </a:t>
+              <a:t>the guided </a:t>
+            </a:r>
+            <a:r>
+              <a:rPr lang="en-US" altLang="zh-CN" sz="2000" dirty="0">
+                <a:latin typeface="Times New Roman" panose="02020603050405020304" pitchFamily="18" charset="0"/>
+                <a:cs typeface="Times New Roman" panose="02020603050405020304" pitchFamily="18" charset="0"/>
+              </a:rPr>
+              <a:t>policy </a:t>
             </a:r>
             <a:r>
               <a:rPr lang="en-US" altLang="zh-CN" sz="2000" dirty="0" smtClean="0">
                 <a:latin typeface="Times New Roman" panose="02020603050405020304" pitchFamily="18" charset="0"/>
                 <a:cs typeface="Times New Roman" panose="02020603050405020304" pitchFamily="18" charset="0"/>
               </a:rPr>
-              <a:t>several </a:t>
-            </a:r>
-          </a:p>
-          <a:p>
+              <a:t>search alogrithm in paper 4 </a:t>
+            </a:r>
+            <a:r>
+              <a:rPr lang="en-US" altLang="zh-CN" sz="2000" dirty="0">
+                <a:latin typeface="Times New Roman" panose="02020603050405020304" pitchFamily="18" charset="0"/>
+                <a:cs typeface="Times New Roman" panose="02020603050405020304" pitchFamily="18" charset="0"/>
+              </a:rPr>
+              <a:t>to make it more practical </a:t>
+            </a:r>
             <a:r>
               <a:rPr lang="en-US" altLang="zh-CN" sz="2000" dirty="0" smtClean="0">
                 <a:latin typeface="Times New Roman" panose="02020603050405020304" pitchFamily="18" charset="0"/>
                 <a:cs typeface="Times New Roman" panose="02020603050405020304" pitchFamily="18" charset="0"/>
               </a:rPr>
-              <a:t>              improvements </a:t>
-            </a:r>
+              <a:t>for</a:t>
+            </a:r>
+          </a:p>
+          <a:p>
             <a:r>
               <a:rPr lang="en-US" altLang="zh-CN" sz="2000" dirty="0">
                 <a:latin typeface="Times New Roman" panose="02020603050405020304" pitchFamily="18" charset="0"/>
                 <a:cs typeface="Times New Roman" panose="02020603050405020304" pitchFamily="18" charset="0"/>
               </a:rPr>
-              <a:t>to </a:t>
+              <a:t> </a:t>
             </a:r>
             <a:r>
               <a:rPr lang="en-US" altLang="zh-CN" sz="2000" dirty="0" smtClean="0">
                 <a:latin typeface="Times New Roman" panose="02020603050405020304" pitchFamily="18" charset="0"/>
                 <a:cs typeface="Times New Roman" panose="02020603050405020304" pitchFamily="18" charset="0"/>
               </a:rPr>
-              <a:t>the guided </a:t>
-            </a:r>
-            <a:r>
-              <a:rPr lang="en-US" altLang="zh-CN" sz="2000" dirty="0">
-                <a:latin typeface="Times New Roman" panose="02020603050405020304" pitchFamily="18" charset="0"/>
-                <a:cs typeface="Times New Roman" panose="02020603050405020304" pitchFamily="18" charset="0"/>
-              </a:rPr>
-              <a:t>policy </a:t>
-            </a:r>
-            <a:r>
-              <a:rPr lang="en-US" altLang="zh-CN" sz="2000" dirty="0" smtClean="0">
-                <a:latin typeface="Times New Roman" panose="02020603050405020304" pitchFamily="18" charset="0"/>
-                <a:cs typeface="Times New Roman" panose="02020603050405020304" pitchFamily="18" charset="0"/>
-              </a:rPr>
-              <a:t>search alogrithm in paper 4 </a:t>
-            </a:r>
-            <a:r>
-              <a:rPr lang="en-US" altLang="zh-CN" sz="2000" dirty="0">
-                <a:latin typeface="Times New Roman" panose="02020603050405020304" pitchFamily="18" charset="0"/>
-                <a:cs typeface="Times New Roman" panose="02020603050405020304" pitchFamily="18" charset="0"/>
-              </a:rPr>
-              <a:t>to make it more practical </a:t>
-            </a:r>
-            <a:r>
-              <a:rPr lang="en-US" altLang="zh-CN" sz="2000" dirty="0" smtClean="0">
-                <a:latin typeface="Times New Roman" panose="02020603050405020304" pitchFamily="18" charset="0"/>
-                <a:cs typeface="Times New Roman" panose="02020603050405020304" pitchFamily="18" charset="0"/>
-              </a:rPr>
-              <a:t>for</a:t>
-            </a:r>
-          </a:p>
-          <a:p>
-            <a:r>
-              <a:rPr lang="en-US" altLang="zh-CN" sz="2000" dirty="0">
-                <a:latin typeface="Times New Roman" panose="02020603050405020304" pitchFamily="18" charset="0"/>
-                <a:cs typeface="Times New Roman" panose="02020603050405020304" pitchFamily="18" charset="0"/>
-              </a:rPr>
-              <a:t> </a:t>
-            </a:r>
-            <a:r>
-              <a:rPr lang="en-US" altLang="zh-CN" sz="2000" dirty="0" smtClean="0">
-                <a:latin typeface="Times New Roman" panose="02020603050405020304" pitchFamily="18" charset="0"/>
-                <a:cs typeface="Times New Roman" panose="02020603050405020304" pitchFamily="18" charset="0"/>
-              </a:rPr>
-              <a:t>            </a:t>
-            </a:r>
-            <a:r>
-              <a:rPr lang="en-US" altLang="zh-CN" sz="2000" dirty="0" smtClean="0">
-                <a:latin typeface="Times New Roman" panose="02020603050405020304" pitchFamily="18" charset="0"/>
-                <a:cs typeface="Times New Roman" panose="02020603050405020304" pitchFamily="18" charset="0"/>
-              </a:rPr>
-              <a:t> </a:t>
-            </a:r>
-            <a:r>
-              <a:rPr lang="en-US" altLang="zh-CN" sz="2000" dirty="0" smtClean="0">
-                <a:latin typeface="Times New Roman" panose="02020603050405020304" pitchFamily="18" charset="0"/>
-                <a:cs typeface="Times New Roman" panose="02020603050405020304" pitchFamily="18" charset="0"/>
-              </a:rPr>
-              <a:t>robotic applications, and successfully run on a </a:t>
+              <a:t>             robotic applications, and successfully run on a </a:t>
             </a:r>
             <a:r>
               <a:rPr lang="en-US" altLang="zh-CN" sz="2000" dirty="0">

</xml_diff>